<commit_message>
Añadido input, output y PEP 8.
</commit_message>
<xml_diff>
--- a/presentaciones/02-TiposBasicosSintaxisFunciones.pptx
+++ b/presentaciones/02-TiposBasicosSintaxisFunciones.pptx
@@ -196,7 +196,7 @@
           <a:p>
             <a:fld id="{99EBDB7E-22A8-4EDB-9E23-57D60215A7DB}" type="datetimeFigureOut">
               <a:rPr lang="es-ES" smtClean="0"/>
-              <a:t>09/05/2021</a:t>
+              <a:t>15/05/2021</a:t>
             </a:fld>
             <a:endParaRPr lang="es-ES"/>
           </a:p>
@@ -611,7 +611,7 @@
           <a:graphicData uri="http://schemas.openxmlformats.org/presentationml/2006/ole">
             <mc:AlternateContent xmlns:mc="http://schemas.openxmlformats.org/markup-compatibility/2006">
               <mc:Choice xmlns:v="urn:schemas-microsoft-com:vml" Requires="v">
-                <p:oleObj spid="_x0000_s12334" name="think-cell Slide" r:id="rId4" imgW="270" imgH="270" progId="TCLayout.ActiveDocument.1">
+                <p:oleObj spid="_x0000_s12337" name="think-cell Slide" r:id="rId4" imgW="270" imgH="270" progId="TCLayout.ActiveDocument.1">
                   <p:embed/>
                 </p:oleObj>
               </mc:Choice>
@@ -3203,7 +3203,7 @@
           <a:graphicData uri="http://schemas.openxmlformats.org/presentationml/2006/ole">
             <mc:AlternateContent xmlns:mc="http://schemas.openxmlformats.org/markup-compatibility/2006">
               <mc:Choice xmlns:v="urn:schemas-microsoft-com:vml" Requires="v">
-                <p:oleObj spid="_x0000_s14377" name="think-cell Slide" r:id="rId4" imgW="270" imgH="270" progId="TCLayout.ActiveDocument.1">
+                <p:oleObj spid="_x0000_s14380" name="think-cell Slide" r:id="rId4" imgW="270" imgH="270" progId="TCLayout.ActiveDocument.1">
                   <p:embed/>
                 </p:oleObj>
               </mc:Choice>
@@ -4392,7 +4392,7 @@
           <a:graphicData uri="http://schemas.openxmlformats.org/presentationml/2006/ole">
             <mc:AlternateContent xmlns:mc="http://schemas.openxmlformats.org/markup-compatibility/2006">
               <mc:Choice xmlns:v="urn:schemas-microsoft-com:vml" Requires="v">
-                <p:oleObj spid="_x0000_s15401" name="think-cell Slide" r:id="rId4" imgW="270" imgH="270" progId="TCLayout.ActiveDocument.1">
+                <p:oleObj spid="_x0000_s15404" name="think-cell Slide" r:id="rId4" imgW="270" imgH="270" progId="TCLayout.ActiveDocument.1">
                   <p:embed/>
                 </p:oleObj>
               </mc:Choice>
@@ -5337,7 +5337,7 @@
           <a:graphicData uri="http://schemas.openxmlformats.org/presentationml/2006/ole">
             <mc:AlternateContent xmlns:mc="http://schemas.openxmlformats.org/markup-compatibility/2006">
               <mc:Choice xmlns:v="urn:schemas-microsoft-com:vml" Requires="v">
-                <p:oleObj spid="_x0000_s16425" name="think-cell Slide" r:id="rId4" imgW="270" imgH="270" progId="TCLayout.ActiveDocument.1">
+                <p:oleObj spid="_x0000_s16428" name="think-cell Slide" r:id="rId4" imgW="270" imgH="270" progId="TCLayout.ActiveDocument.1">
                   <p:embed/>
                 </p:oleObj>
               </mc:Choice>
@@ -6609,7 +6609,7 @@
           <a:graphicData uri="http://schemas.openxmlformats.org/presentationml/2006/ole">
             <mc:AlternateContent xmlns:mc="http://schemas.openxmlformats.org/markup-compatibility/2006">
               <mc:Choice xmlns:v="urn:schemas-microsoft-com:vml" Requires="v">
-                <p:oleObj spid="_x0000_s17449" name="think-cell Slide" r:id="rId4" imgW="270" imgH="270" progId="TCLayout.ActiveDocument.1">
+                <p:oleObj spid="_x0000_s17452" name="think-cell Slide" r:id="rId4" imgW="270" imgH="270" progId="TCLayout.ActiveDocument.1">
                   <p:embed/>
                 </p:oleObj>
               </mc:Choice>
@@ -6736,7 +6736,7 @@
           <a:graphicData uri="http://schemas.openxmlformats.org/presentationml/2006/ole">
             <mc:AlternateContent xmlns:mc="http://schemas.openxmlformats.org/markup-compatibility/2006">
               <mc:Choice xmlns:v="urn:schemas-microsoft-com:vml" Requires="v">
-                <p:oleObj spid="_x0000_s18473" name="think-cell Slide" r:id="rId4" imgW="270" imgH="270" progId="TCLayout.ActiveDocument.1">
+                <p:oleObj spid="_x0000_s18476" name="think-cell Slide" r:id="rId4" imgW="270" imgH="270" progId="TCLayout.ActiveDocument.1">
                   <p:embed/>
                 </p:oleObj>
               </mc:Choice>
@@ -9259,7 +9259,7 @@
           <a:graphicData uri="http://schemas.openxmlformats.org/presentationml/2006/ole">
             <mc:AlternateContent xmlns:mc="http://schemas.openxmlformats.org/markup-compatibility/2006">
               <mc:Choice xmlns:v="urn:schemas-microsoft-com:vml" Requires="v">
-                <p:oleObj spid="_x0000_s8238" name="think-cell Slide" r:id="rId4" imgW="270" imgH="270" progId="TCLayout.ActiveDocument.1">
+                <p:oleObj spid="_x0000_s8241" name="think-cell Slide" r:id="rId4" imgW="270" imgH="270" progId="TCLayout.ActiveDocument.1">
                   <p:embed/>
                 </p:oleObj>
               </mc:Choice>
@@ -10448,7 +10448,7 @@
           <a:graphicData uri="http://schemas.openxmlformats.org/presentationml/2006/ole">
             <mc:AlternateContent xmlns:mc="http://schemas.openxmlformats.org/markup-compatibility/2006">
               <mc:Choice xmlns:v="urn:schemas-microsoft-com:vml" Requires="v">
-                <p:oleObj spid="_x0000_s9262" name="think-cell Slide" r:id="rId4" imgW="270" imgH="270" progId="TCLayout.ActiveDocument.1">
+                <p:oleObj spid="_x0000_s9265" name="think-cell Slide" r:id="rId4" imgW="270" imgH="270" progId="TCLayout.ActiveDocument.1">
                   <p:embed/>
                 </p:oleObj>
               </mc:Choice>
@@ -11393,7 +11393,7 @@
           <a:graphicData uri="http://schemas.openxmlformats.org/presentationml/2006/ole">
             <mc:AlternateContent xmlns:mc="http://schemas.openxmlformats.org/markup-compatibility/2006">
               <mc:Choice xmlns:v="urn:schemas-microsoft-com:vml" Requires="v">
-                <p:oleObj spid="_x0000_s10286" name="think-cell Slide" r:id="rId4" imgW="270" imgH="270" progId="TCLayout.ActiveDocument.1">
+                <p:oleObj spid="_x0000_s10289" name="think-cell Slide" r:id="rId4" imgW="270" imgH="270" progId="TCLayout.ActiveDocument.1">
                   <p:embed/>
                 </p:oleObj>
               </mc:Choice>
@@ -12511,7 +12511,7 @@
           <a:graphicData uri="http://schemas.openxmlformats.org/presentationml/2006/ole">
             <mc:AlternateContent xmlns:mc="http://schemas.openxmlformats.org/markup-compatibility/2006">
               <mc:Choice xmlns:v="urn:schemas-microsoft-com:vml" Requires="v">
-                <p:oleObj spid="_x0000_s11310" name="think-cell Slide" r:id="rId4" imgW="270" imgH="270" progId="TCLayout.ActiveDocument.1">
+                <p:oleObj spid="_x0000_s11313" name="think-cell Slide" r:id="rId4" imgW="270" imgH="270" progId="TCLayout.ActiveDocument.1">
                   <p:embed/>
                 </p:oleObj>
               </mc:Choice>
@@ -12646,7 +12646,7 @@
           <a:graphicData uri="http://schemas.openxmlformats.org/presentationml/2006/ole">
             <mc:AlternateContent xmlns:mc="http://schemas.openxmlformats.org/markup-compatibility/2006">
               <mc:Choice xmlns:v="urn:schemas-microsoft-com:vml" Requires="v">
-                <p:oleObj spid="_x0000_s7214" name="think-cell Slide" r:id="rId15" imgW="270" imgH="270" progId="TCLayout.ActiveDocument.1">
+                <p:oleObj spid="_x0000_s7217" name="think-cell Slide" r:id="rId15" imgW="270" imgH="270" progId="TCLayout.ActiveDocument.1">
                   <p:embed/>
                 </p:oleObj>
               </mc:Choice>
@@ -15041,7 +15041,7 @@
           <a:graphicData uri="http://schemas.openxmlformats.org/presentationml/2006/ole">
             <mc:AlternateContent xmlns:mc="http://schemas.openxmlformats.org/markup-compatibility/2006">
               <mc:Choice xmlns:v="urn:schemas-microsoft-com:vml" Requires="v">
-                <p:oleObj spid="_x0000_s13354" name="think-cell Slide" r:id="rId16" imgW="270" imgH="270" progId="TCLayout.ActiveDocument.1">
+                <p:oleObj spid="_x0000_s13357" name="think-cell Slide" r:id="rId16" imgW="270" imgH="270" progId="TCLayout.ActiveDocument.1">
                   <p:embed/>
                 </p:oleObj>
               </mc:Choice>
@@ -18611,7 +18611,7 @@
         <p:spPr>
           <a:xfrm>
             <a:off x="683568" y="1491630"/>
-            <a:ext cx="6840760" cy="1908215"/>
+            <a:ext cx="6840760" cy="2185214"/>
           </a:xfrm>
           <a:prstGeom prst="rect">
             <a:avLst/>
@@ -18624,9 +18624,9 @@
           </a:bodyPr>
           <a:lstStyle/>
           <a:p>
-            <a:pPr marL="742760" lvl="1" indent="-285750">
-              <a:buFont typeface="Arial" panose="020B0604020202020204" pitchFamily="34" charset="0"/>
-              <a:buChar char="•"/>
+            <a:pPr marL="799910" lvl="1" indent="-342900">
+              <a:buFont typeface="+mj-lt"/>
+              <a:buAutoNum type="arabicPeriod"/>
             </a:pPr>
             <a:r>
               <a:rPr lang="es-ES" dirty="0" smtClean="0"/>
@@ -18635,9 +18635,9 @@
             <a:endParaRPr lang="es-ES" dirty="0"/>
           </a:p>
           <a:p>
-            <a:pPr marL="742760" lvl="1" indent="-285750">
-              <a:buFont typeface="Arial" panose="020B0604020202020204" pitchFamily="34" charset="0"/>
-              <a:buChar char="•"/>
+            <a:pPr marL="799910" lvl="1" indent="-342900">
+              <a:buFont typeface="+mj-lt"/>
+              <a:buAutoNum type="arabicPeriod"/>
             </a:pPr>
             <a:r>
               <a:rPr lang="es-ES" dirty="0"/>
@@ -18645,13 +18645,17 @@
             </a:r>
           </a:p>
           <a:p>
-            <a:pPr marL="742760" lvl="1" indent="-285750">
-              <a:buFont typeface="Arial" panose="020B0604020202020204" pitchFamily="34" charset="0"/>
-              <a:buChar char="•"/>
+            <a:pPr marL="799910" lvl="1" indent="-342900">
+              <a:buFont typeface="+mj-lt"/>
+              <a:buAutoNum type="arabicPeriod"/>
             </a:pPr>
             <a:r>
+              <a:rPr lang="es-ES" dirty="0" smtClean="0"/>
+              <a:t>Sentencias, líneas </a:t>
+            </a:r>
+            <a:r>
               <a:rPr lang="es-ES" dirty="0"/>
-              <a:t>Líneas e </a:t>
+              <a:t>e </a:t>
             </a:r>
             <a:r>
               <a:rPr lang="es-ES" dirty="0" err="1"/>
@@ -18660,20 +18664,24 @@
             <a:endParaRPr lang="es-ES" dirty="0"/>
           </a:p>
           <a:p>
-            <a:pPr marL="742760" lvl="1" indent="-285750">
-              <a:buFont typeface="Arial" panose="020B0604020202020204" pitchFamily="34" charset="0"/>
-              <a:buChar char="•"/>
+            <a:pPr marL="799910" lvl="1" indent="-342900">
+              <a:buFont typeface="+mj-lt"/>
+              <a:buAutoNum type="arabicPeriod"/>
             </a:pPr>
             <a:r>
-              <a:rPr lang="es-ES" dirty="0" err="1"/>
-              <a:t>Multilínea</a:t>
+              <a:rPr lang="es-ES" dirty="0" smtClean="0"/>
+              <a:t>Sentencias </a:t>
+            </a:r>
+            <a:r>
+              <a:rPr lang="es-ES" dirty="0" err="1" smtClean="0"/>
+              <a:t>multilínea</a:t>
             </a:r>
             <a:endParaRPr lang="es-ES" dirty="0"/>
           </a:p>
           <a:p>
-            <a:pPr marL="742760" lvl="1" indent="-285750">
-              <a:buFont typeface="Arial" panose="020B0604020202020204" pitchFamily="34" charset="0"/>
-              <a:buChar char="•"/>
+            <a:pPr marL="799910" lvl="1" indent="-342900">
+              <a:buFont typeface="+mj-lt"/>
+              <a:buAutoNum type="arabicPeriod"/>
             </a:pPr>
             <a:r>
               <a:rPr lang="es-ES" dirty="0" smtClean="0"/>
@@ -18681,9 +18689,9 @@
             </a:r>
           </a:p>
           <a:p>
-            <a:pPr marL="742760" lvl="1" indent="-285750">
-              <a:buFont typeface="Arial" panose="020B0604020202020204" pitchFamily="34" charset="0"/>
-              <a:buChar char="•"/>
+            <a:pPr marL="799910" lvl="1" indent="-342900">
+              <a:buFont typeface="+mj-lt"/>
+              <a:buAutoNum type="arabicPeriod"/>
             </a:pPr>
             <a:r>
               <a:rPr lang="es-ES" dirty="0"/>
@@ -18692,6 +18700,16 @@
             <a:r>
               <a:rPr lang="es-ES" dirty="0" smtClean="0"/>
               <a:t>salida</a:t>
+            </a:r>
+          </a:p>
+          <a:p>
+            <a:pPr marL="799910" lvl="1" indent="-342900">
+              <a:buFont typeface="+mj-lt"/>
+              <a:buAutoNum type="arabicPeriod"/>
+            </a:pPr>
+            <a:r>
+              <a:rPr lang="es-ES" dirty="0" smtClean="0"/>
+              <a:t>PEP 8. Guía de estilo</a:t>
             </a:r>
             <a:endParaRPr lang="es-ES" dirty="0"/>
           </a:p>
@@ -18714,6 +18732,13 @@
   <p:clrMapOvr>
     <a:masterClrMapping/>
   </p:clrMapOvr>
+  <p:timing>
+    <p:tnLst>
+      <p:par>
+        <p:cTn id="1" dur="indefinite" restart="never" nodeType="tmRoot"/>
+      </p:par>
+    </p:tnLst>
+  </p:timing>
 </p:sld>
 </file>
 
@@ -18804,9 +18829,9 @@
           </a:bodyPr>
           <a:lstStyle/>
           <a:p>
-            <a:pPr marL="742760" lvl="1" indent="-285750">
-              <a:buFont typeface="Arial" panose="020B0604020202020204" pitchFamily="34" charset="0"/>
-              <a:buChar char="•"/>
+            <a:pPr marL="799910" lvl="1" indent="-342900">
+              <a:buFont typeface="+mj-lt"/>
+              <a:buAutoNum type="arabicPeriod"/>
             </a:pPr>
             <a:r>
               <a:rPr lang="es-ES" dirty="0"/>
@@ -18814,9 +18839,9 @@
             </a:r>
           </a:p>
           <a:p>
-            <a:pPr marL="742760" lvl="1" indent="-285750">
-              <a:buFont typeface="Arial" panose="020B0604020202020204" pitchFamily="34" charset="0"/>
-              <a:buChar char="•"/>
+            <a:pPr marL="799910" lvl="1" indent="-342900">
+              <a:buFont typeface="+mj-lt"/>
+              <a:buAutoNum type="arabicPeriod"/>
             </a:pPr>
             <a:r>
               <a:rPr lang="es-ES" dirty="0"/>
@@ -18824,9 +18849,9 @@
             </a:r>
           </a:p>
           <a:p>
-            <a:pPr marL="742760" lvl="1" indent="-285750">
-              <a:buFont typeface="Arial" panose="020B0604020202020204" pitchFamily="34" charset="0"/>
-              <a:buChar char="•"/>
+            <a:pPr marL="799910" lvl="1" indent="-342900">
+              <a:buFont typeface="+mj-lt"/>
+              <a:buAutoNum type="arabicPeriod"/>
             </a:pPr>
             <a:r>
               <a:rPr lang="es-ES" dirty="0"/>
@@ -18852,6 +18877,13 @@
   <p:clrMapOvr>
     <a:masterClrMapping/>
   </p:clrMapOvr>
+  <p:timing>
+    <p:tnLst>
+      <p:par>
+        <p:cTn id="1" dur="indefinite" restart="never" nodeType="tmRoot"/>
+      </p:par>
+    </p:tnLst>
+  </p:timing>
 </p:sld>
 </file>
 
@@ -18942,9 +18974,9 @@
           </a:bodyPr>
           <a:lstStyle/>
           <a:p>
-            <a:pPr marL="742760" lvl="1" indent="-285750">
-              <a:buFont typeface="Arial" panose="020B0604020202020204" pitchFamily="34" charset="0"/>
-              <a:buChar char="•"/>
+            <a:pPr marL="799910" lvl="1" indent="-342900">
+              <a:buFont typeface="+mj-lt"/>
+              <a:buAutoNum type="arabicPeriod"/>
             </a:pPr>
             <a:r>
               <a:rPr lang="es-ES" dirty="0" smtClean="0"/>
@@ -18956,9 +18988,9 @@
             </a:r>
           </a:p>
           <a:p>
-            <a:pPr marL="742760" lvl="1" indent="-285750">
-              <a:buFont typeface="Arial" panose="020B0604020202020204" pitchFamily="34" charset="0"/>
-              <a:buChar char="•"/>
+            <a:pPr marL="799910" lvl="1" indent="-342900">
+              <a:buFont typeface="+mj-lt"/>
+              <a:buAutoNum type="arabicPeriod"/>
             </a:pPr>
             <a:r>
               <a:rPr lang="es-ES" dirty="0"/>
@@ -18966,9 +18998,9 @@
             </a:r>
           </a:p>
           <a:p>
-            <a:pPr marL="742760" lvl="1" indent="-285750">
-              <a:buFont typeface="Arial" panose="020B0604020202020204" pitchFamily="34" charset="0"/>
-              <a:buChar char="•"/>
+            <a:pPr marL="799910" lvl="1" indent="-342900">
+              <a:buFont typeface="+mj-lt"/>
+              <a:buAutoNum type="arabicPeriod"/>
             </a:pPr>
             <a:r>
               <a:rPr lang="es-ES" dirty="0"/>
@@ -18994,6 +19026,13 @@
   <p:clrMapOvr>
     <a:masterClrMapping/>
   </p:clrMapOvr>
+  <p:timing>
+    <p:tnLst>
+      <p:par>
+        <p:cTn id="1" dur="indefinite" restart="never" nodeType="tmRoot"/>
+      </p:par>
+    </p:tnLst>
+  </p:timing>
 </p:sld>
 </file>
 

</xml_diff>

<commit_message>
Notebook de variables comenzado
</commit_message>
<xml_diff>
--- a/presentaciones/02-TiposBasicosSintaxisFunciones.pptx
+++ b/presentaciones/02-TiposBasicosSintaxisFunciones.pptx
@@ -611,7 +611,7 @@
           <a:graphicData uri="http://schemas.openxmlformats.org/presentationml/2006/ole">
             <mc:AlternateContent xmlns:mc="http://schemas.openxmlformats.org/markup-compatibility/2006">
               <mc:Choice xmlns:v="urn:schemas-microsoft-com:vml" Requires="v">
-                <p:oleObj spid="_x0000_s12337" name="think-cell Slide" r:id="rId4" imgW="270" imgH="270" progId="TCLayout.ActiveDocument.1">
+                <p:oleObj spid="_x0000_s12340" name="think-cell Slide" r:id="rId4" imgW="270" imgH="270" progId="TCLayout.ActiveDocument.1">
                   <p:embed/>
                 </p:oleObj>
               </mc:Choice>
@@ -1333,7 +1333,7 @@
           <p:cNvPr id="24" name="Rectangle 57">
             <a:extLst>
               <a:ext uri="{FF2B5EF4-FFF2-40B4-BE49-F238E27FC236}">
-                <a16:creationId xmlns="" xmlns:a16="http://schemas.microsoft.com/office/drawing/2014/main" id="{E84F61DF-65CA-45BF-9A0B-34B97F6A97EA}"/>
+                <a16:creationId xmlns:a16="http://schemas.microsoft.com/office/drawing/2014/main" xmlns="" id="{E84F61DF-65CA-45BF-9A0B-34B97F6A97EA}"/>
               </a:ext>
             </a:extLst>
           </p:cNvPr>
@@ -1434,7 +1434,7 @@
           <p:cNvPr id="20" name="Text Placeholder 7">
             <a:extLst>
               <a:ext uri="{FF2B5EF4-FFF2-40B4-BE49-F238E27FC236}">
-                <a16:creationId xmlns="" xmlns:a16="http://schemas.microsoft.com/office/drawing/2014/main" id="{27CE2609-37DA-4C4C-BF45-E56CE85AA41D}"/>
+                <a16:creationId xmlns:a16="http://schemas.microsoft.com/office/drawing/2014/main" xmlns="" id="{27CE2609-37DA-4C4C-BF45-E56CE85AA41D}"/>
               </a:ext>
             </a:extLst>
           </p:cNvPr>
@@ -1556,7 +1556,7 @@
           <p:cNvPr id="29" name="Text Placeholder 7">
             <a:extLst>
               <a:ext uri="{FF2B5EF4-FFF2-40B4-BE49-F238E27FC236}">
-                <a16:creationId xmlns="" xmlns:a16="http://schemas.microsoft.com/office/drawing/2014/main" id="{27CE2609-37DA-4C4C-BF45-E56CE85AA41D}"/>
+                <a16:creationId xmlns:a16="http://schemas.microsoft.com/office/drawing/2014/main" xmlns="" id="{27CE2609-37DA-4C4C-BF45-E56CE85AA41D}"/>
               </a:ext>
             </a:extLst>
           </p:cNvPr>
@@ -1678,7 +1678,7 @@
           <p:cNvPr id="30" name="Text Placeholder 7">
             <a:extLst>
               <a:ext uri="{FF2B5EF4-FFF2-40B4-BE49-F238E27FC236}">
-                <a16:creationId xmlns="" xmlns:a16="http://schemas.microsoft.com/office/drawing/2014/main" id="{27CE2609-37DA-4C4C-BF45-E56CE85AA41D}"/>
+                <a16:creationId xmlns:a16="http://schemas.microsoft.com/office/drawing/2014/main" xmlns="" id="{27CE2609-37DA-4C4C-BF45-E56CE85AA41D}"/>
               </a:ext>
             </a:extLst>
           </p:cNvPr>
@@ -2101,7 +2101,7 @@
           <p:cNvPr id="8" name="Text Placeholder 7">
             <a:extLst>
               <a:ext uri="{FF2B5EF4-FFF2-40B4-BE49-F238E27FC236}">
-                <a16:creationId xmlns="" xmlns:a16="http://schemas.microsoft.com/office/drawing/2014/main" id="{27CE2609-37DA-4C4C-BF45-E56CE85AA41D}"/>
+                <a16:creationId xmlns:a16="http://schemas.microsoft.com/office/drawing/2014/main" xmlns="" id="{27CE2609-37DA-4C4C-BF45-E56CE85AA41D}"/>
               </a:ext>
             </a:extLst>
           </p:cNvPr>
@@ -2215,7 +2215,7 @@
           <p:cNvPr id="13" name="Text Placeholder 7">
             <a:extLst>
               <a:ext uri="{FF2B5EF4-FFF2-40B4-BE49-F238E27FC236}">
-                <a16:creationId xmlns="" xmlns:a16="http://schemas.microsoft.com/office/drawing/2014/main" id="{D8D7F005-BA7C-423E-87B0-6782D88233F6}"/>
+                <a16:creationId xmlns:a16="http://schemas.microsoft.com/office/drawing/2014/main" xmlns="" id="{D8D7F005-BA7C-423E-87B0-6782D88233F6}"/>
               </a:ext>
             </a:extLst>
           </p:cNvPr>
@@ -2289,7 +2289,7 @@
           <p:cNvPr id="14" name="Text Placeholder 7">
             <a:extLst>
               <a:ext uri="{FF2B5EF4-FFF2-40B4-BE49-F238E27FC236}">
-                <a16:creationId xmlns="" xmlns:a16="http://schemas.microsoft.com/office/drawing/2014/main" id="{47BDC0DA-1585-454D-9E74-41D2AFC0FEE5}"/>
+                <a16:creationId xmlns:a16="http://schemas.microsoft.com/office/drawing/2014/main" xmlns="" id="{47BDC0DA-1585-454D-9E74-41D2AFC0FEE5}"/>
               </a:ext>
             </a:extLst>
           </p:cNvPr>
@@ -2391,7 +2391,7 @@
           <p:cNvPr id="16" name="Text Placeholder 7">
             <a:extLst>
               <a:ext uri="{FF2B5EF4-FFF2-40B4-BE49-F238E27FC236}">
-                <a16:creationId xmlns="" xmlns:a16="http://schemas.microsoft.com/office/drawing/2014/main" id="{27CE2609-37DA-4C4C-BF45-E56CE85AA41D}"/>
+                <a16:creationId xmlns:a16="http://schemas.microsoft.com/office/drawing/2014/main" xmlns="" id="{27CE2609-37DA-4C4C-BF45-E56CE85AA41D}"/>
               </a:ext>
             </a:extLst>
           </p:cNvPr>
@@ -2558,7 +2558,7 @@
           <p:cNvPr id="3" name="Text Placeholder 7">
             <a:extLst>
               <a:ext uri="{FF2B5EF4-FFF2-40B4-BE49-F238E27FC236}">
-                <a16:creationId xmlns="" xmlns:a16="http://schemas.microsoft.com/office/drawing/2014/main" id="{27CE2609-37DA-4C4C-BF45-E56CE85AA41D}"/>
+                <a16:creationId xmlns:a16="http://schemas.microsoft.com/office/drawing/2014/main" xmlns="" id="{27CE2609-37DA-4C4C-BF45-E56CE85AA41D}"/>
               </a:ext>
             </a:extLst>
           </p:cNvPr>
@@ -2672,7 +2672,7 @@
           <p:cNvPr id="4" name="Text Placeholder 7">
             <a:extLst>
               <a:ext uri="{FF2B5EF4-FFF2-40B4-BE49-F238E27FC236}">
-                <a16:creationId xmlns="" xmlns:a16="http://schemas.microsoft.com/office/drawing/2014/main" id="{D8D7F005-BA7C-423E-87B0-6782D88233F6}"/>
+                <a16:creationId xmlns:a16="http://schemas.microsoft.com/office/drawing/2014/main" xmlns="" id="{D8D7F005-BA7C-423E-87B0-6782D88233F6}"/>
               </a:ext>
             </a:extLst>
           </p:cNvPr>
@@ -2758,7 +2758,7 @@
           <p:cNvPr id="9" name="Text Placeholder 7">
             <a:extLst>
               <a:ext uri="{FF2B5EF4-FFF2-40B4-BE49-F238E27FC236}">
-                <a16:creationId xmlns="" xmlns:a16="http://schemas.microsoft.com/office/drawing/2014/main" id="{27CE2609-37DA-4C4C-BF45-E56CE85AA41D}"/>
+                <a16:creationId xmlns:a16="http://schemas.microsoft.com/office/drawing/2014/main" xmlns="" id="{27CE2609-37DA-4C4C-BF45-E56CE85AA41D}"/>
               </a:ext>
             </a:extLst>
           </p:cNvPr>
@@ -2872,7 +2872,7 @@
           <p:cNvPr id="10" name="Text Placeholder 7">
             <a:extLst>
               <a:ext uri="{FF2B5EF4-FFF2-40B4-BE49-F238E27FC236}">
-                <a16:creationId xmlns="" xmlns:a16="http://schemas.microsoft.com/office/drawing/2014/main" id="{D8D7F005-BA7C-423E-87B0-6782D88233F6}"/>
+                <a16:creationId xmlns:a16="http://schemas.microsoft.com/office/drawing/2014/main" xmlns="" id="{D8D7F005-BA7C-423E-87B0-6782D88233F6}"/>
               </a:ext>
             </a:extLst>
           </p:cNvPr>
@@ -2958,7 +2958,7 @@
           <p:cNvPr id="11" name="Text Placeholder 7">
             <a:extLst>
               <a:ext uri="{FF2B5EF4-FFF2-40B4-BE49-F238E27FC236}">
-                <a16:creationId xmlns="" xmlns:a16="http://schemas.microsoft.com/office/drawing/2014/main" id="{27CE2609-37DA-4C4C-BF45-E56CE85AA41D}"/>
+                <a16:creationId xmlns:a16="http://schemas.microsoft.com/office/drawing/2014/main" xmlns="" id="{27CE2609-37DA-4C4C-BF45-E56CE85AA41D}"/>
               </a:ext>
             </a:extLst>
           </p:cNvPr>
@@ -3072,7 +3072,7 @@
           <p:cNvPr id="12" name="Text Placeholder 7">
             <a:extLst>
               <a:ext uri="{FF2B5EF4-FFF2-40B4-BE49-F238E27FC236}">
-                <a16:creationId xmlns="" xmlns:a16="http://schemas.microsoft.com/office/drawing/2014/main" id="{D8D7F005-BA7C-423E-87B0-6782D88233F6}"/>
+                <a16:creationId xmlns:a16="http://schemas.microsoft.com/office/drawing/2014/main" xmlns="" id="{D8D7F005-BA7C-423E-87B0-6782D88233F6}"/>
               </a:ext>
             </a:extLst>
           </p:cNvPr>
@@ -3203,7 +3203,7 @@
           <a:graphicData uri="http://schemas.openxmlformats.org/presentationml/2006/ole">
             <mc:AlternateContent xmlns:mc="http://schemas.openxmlformats.org/markup-compatibility/2006">
               <mc:Choice xmlns:v="urn:schemas-microsoft-com:vml" Requires="v">
-                <p:oleObj spid="_x0000_s14380" name="think-cell Slide" r:id="rId4" imgW="270" imgH="270" progId="TCLayout.ActiveDocument.1">
+                <p:oleObj spid="_x0000_s14383" name="think-cell Slide" r:id="rId4" imgW="270" imgH="270" progId="TCLayout.ActiveDocument.1">
                   <p:embed/>
                 </p:oleObj>
               </mc:Choice>
@@ -3671,7 +3671,7 @@
           <p:cNvPr id="12" name="Freeform: Shape 11">
             <a:extLst>
               <a:ext uri="{FF2B5EF4-FFF2-40B4-BE49-F238E27FC236}">
-                <a16:creationId xmlns="" xmlns:a16="http://schemas.microsoft.com/office/drawing/2014/main" id="{F5F5AEA1-6A77-4676-B8B3-EF658F5F8430}"/>
+                <a16:creationId xmlns:a16="http://schemas.microsoft.com/office/drawing/2014/main" xmlns="" id="{F5F5AEA1-6A77-4676-B8B3-EF658F5F8430}"/>
               </a:ext>
             </a:extLst>
           </p:cNvPr>
@@ -3864,7 +3864,7 @@
           <p:cNvPr id="26" name="Text Placeholder 4">
             <a:extLst>
               <a:ext uri="{FF2B5EF4-FFF2-40B4-BE49-F238E27FC236}">
-                <a16:creationId xmlns="" xmlns:a16="http://schemas.microsoft.com/office/drawing/2014/main" id="{7E551D69-F21D-4601-B4BD-97ECB52F39D6}"/>
+                <a16:creationId xmlns:a16="http://schemas.microsoft.com/office/drawing/2014/main" xmlns="" id="{7E551D69-F21D-4601-B4BD-97ECB52F39D6}"/>
               </a:ext>
             </a:extLst>
           </p:cNvPr>
@@ -3924,7 +3924,7 @@
           <p:cNvPr id="23" name="Text Placeholder 4">
             <a:extLst>
               <a:ext uri="{FF2B5EF4-FFF2-40B4-BE49-F238E27FC236}">
-                <a16:creationId xmlns="" xmlns:a16="http://schemas.microsoft.com/office/drawing/2014/main" id="{BC359575-5CC3-4B2F-91E7-19D6A150BE7B}"/>
+                <a16:creationId xmlns:a16="http://schemas.microsoft.com/office/drawing/2014/main" xmlns="" id="{BC359575-5CC3-4B2F-91E7-19D6A150BE7B}"/>
               </a:ext>
             </a:extLst>
           </p:cNvPr>
@@ -3984,7 +3984,7 @@
           <p:cNvPr id="24" name="Text Placeholder 7">
             <a:extLst>
               <a:ext uri="{FF2B5EF4-FFF2-40B4-BE49-F238E27FC236}">
-                <a16:creationId xmlns="" xmlns:a16="http://schemas.microsoft.com/office/drawing/2014/main" id="{53745724-67BB-4475-9660-FEEE12268615}"/>
+                <a16:creationId xmlns:a16="http://schemas.microsoft.com/office/drawing/2014/main" xmlns="" id="{53745724-67BB-4475-9660-FEEE12268615}"/>
               </a:ext>
             </a:extLst>
           </p:cNvPr>
@@ -4058,7 +4058,7 @@
           <p:cNvPr id="27" name="Text Placeholder 7">
             <a:extLst>
               <a:ext uri="{FF2B5EF4-FFF2-40B4-BE49-F238E27FC236}">
-                <a16:creationId xmlns="" xmlns:a16="http://schemas.microsoft.com/office/drawing/2014/main" id="{C78431F2-3F85-4748-A6BC-A08250A6D354}"/>
+                <a16:creationId xmlns:a16="http://schemas.microsoft.com/office/drawing/2014/main" xmlns="" id="{C78431F2-3F85-4748-A6BC-A08250A6D354}"/>
               </a:ext>
             </a:extLst>
           </p:cNvPr>
@@ -4132,7 +4132,7 @@
           <p:cNvPr id="13" name="Oval 20">
             <a:extLst>
               <a:ext uri="{FF2B5EF4-FFF2-40B4-BE49-F238E27FC236}">
-                <a16:creationId xmlns="" xmlns:a16="http://schemas.microsoft.com/office/drawing/2014/main" id="{1EFB3510-D39A-47CF-8191-109DDF9E53D5}"/>
+                <a16:creationId xmlns:a16="http://schemas.microsoft.com/office/drawing/2014/main" xmlns="" id="{1EFB3510-D39A-47CF-8191-109DDF9E53D5}"/>
               </a:ext>
             </a:extLst>
           </p:cNvPr>
@@ -4392,7 +4392,7 @@
           <a:graphicData uri="http://schemas.openxmlformats.org/presentationml/2006/ole">
             <mc:AlternateContent xmlns:mc="http://schemas.openxmlformats.org/markup-compatibility/2006">
               <mc:Choice xmlns:v="urn:schemas-microsoft-com:vml" Requires="v">
-                <p:oleObj spid="_x0000_s15404" name="think-cell Slide" r:id="rId4" imgW="270" imgH="270" progId="TCLayout.ActiveDocument.1">
+                <p:oleObj spid="_x0000_s15407" name="think-cell Slide" r:id="rId4" imgW="270" imgH="270" progId="TCLayout.ActiveDocument.1">
                   <p:embed/>
                 </p:oleObj>
               </mc:Choice>
@@ -4501,7 +4501,7 @@
           <p:cNvPr id="3" name="Freeform: Shape 9">
             <a:extLst>
               <a:ext uri="{FF2B5EF4-FFF2-40B4-BE49-F238E27FC236}">
-                <a16:creationId xmlns="" xmlns:a16="http://schemas.microsoft.com/office/drawing/2014/main" id="{531E77B6-0DD5-446F-A826-892DFC23D785}"/>
+                <a16:creationId xmlns:a16="http://schemas.microsoft.com/office/drawing/2014/main" xmlns="" id="{531E77B6-0DD5-446F-A826-892DFC23D785}"/>
               </a:ext>
             </a:extLst>
           </p:cNvPr>
@@ -4674,7 +4674,7 @@
           <p:cNvPr id="7" name="Retângulo 43">
             <a:extLst>
               <a:ext uri="{FF2B5EF4-FFF2-40B4-BE49-F238E27FC236}">
-                <a16:creationId xmlns="" xmlns:a16="http://schemas.microsoft.com/office/drawing/2014/main" id="{25FC8637-25BD-4C09-AF25-56B4243DAB3D}"/>
+                <a16:creationId xmlns:a16="http://schemas.microsoft.com/office/drawing/2014/main" xmlns="" id="{25FC8637-25BD-4C09-AF25-56B4243DAB3D}"/>
               </a:ext>
             </a:extLst>
           </p:cNvPr>
@@ -4725,7 +4725,7 @@
           <p:cNvPr id="8" name="Text Placeholder 7">
             <a:extLst>
               <a:ext uri="{FF2B5EF4-FFF2-40B4-BE49-F238E27FC236}">
-                <a16:creationId xmlns="" xmlns:a16="http://schemas.microsoft.com/office/drawing/2014/main" id="{E824319D-02CC-441E-87B5-E9D15DE8CA35}"/>
+                <a16:creationId xmlns:a16="http://schemas.microsoft.com/office/drawing/2014/main" xmlns="" id="{E824319D-02CC-441E-87B5-E9D15DE8CA35}"/>
               </a:ext>
             </a:extLst>
           </p:cNvPr>
@@ -5337,7 +5337,7 @@
           <a:graphicData uri="http://schemas.openxmlformats.org/presentationml/2006/ole">
             <mc:AlternateContent xmlns:mc="http://schemas.openxmlformats.org/markup-compatibility/2006">
               <mc:Choice xmlns:v="urn:schemas-microsoft-com:vml" Requires="v">
-                <p:oleObj spid="_x0000_s16428" name="think-cell Slide" r:id="rId4" imgW="270" imgH="270" progId="TCLayout.ActiveDocument.1">
+                <p:oleObj spid="_x0000_s16431" name="think-cell Slide" r:id="rId4" imgW="270" imgH="270" progId="TCLayout.ActiveDocument.1">
                   <p:embed/>
                 </p:oleObj>
               </mc:Choice>
@@ -5396,7 +5396,7 @@
           <p:cNvPr id="13" name="Rectangle 12">
             <a:extLst>
               <a:ext uri="{FF2B5EF4-FFF2-40B4-BE49-F238E27FC236}">
-                <a16:creationId xmlns="" xmlns:a16="http://schemas.microsoft.com/office/drawing/2014/main" id="{9455EBB8-DB3C-45D2-B02F-0B36A58E555B}"/>
+                <a16:creationId xmlns:a16="http://schemas.microsoft.com/office/drawing/2014/main" xmlns="" id="{9455EBB8-DB3C-45D2-B02F-0B36A58E555B}"/>
               </a:ext>
             </a:extLst>
           </p:cNvPr>
@@ -5686,7 +5686,7 @@
           <p:cNvPr id="14" name="Text Placeholder 7">
             <a:extLst>
               <a:ext uri="{FF2B5EF4-FFF2-40B4-BE49-F238E27FC236}">
-                <a16:creationId xmlns="" xmlns:a16="http://schemas.microsoft.com/office/drawing/2014/main" id="{9949BCD6-E419-4ED2-9061-402DD5FF2406}"/>
+                <a16:creationId xmlns:a16="http://schemas.microsoft.com/office/drawing/2014/main" xmlns="" id="{9949BCD6-E419-4ED2-9061-402DD5FF2406}"/>
               </a:ext>
             </a:extLst>
           </p:cNvPr>
@@ -5777,7 +5777,7 @@
           <p:cNvPr id="15" name="Text Placeholder 4">
             <a:extLst>
               <a:ext uri="{FF2B5EF4-FFF2-40B4-BE49-F238E27FC236}">
-                <a16:creationId xmlns="" xmlns:a16="http://schemas.microsoft.com/office/drawing/2014/main" id="{3F6EE60C-2261-45A0-AD6F-B5F767C57B57}"/>
+                <a16:creationId xmlns:a16="http://schemas.microsoft.com/office/drawing/2014/main" xmlns="" id="{3F6EE60C-2261-45A0-AD6F-B5F767C57B57}"/>
               </a:ext>
             </a:extLst>
           </p:cNvPr>
@@ -5837,7 +5837,7 @@
           <p:cNvPr id="16" name="Text Placeholder 7">
             <a:extLst>
               <a:ext uri="{FF2B5EF4-FFF2-40B4-BE49-F238E27FC236}">
-                <a16:creationId xmlns="" xmlns:a16="http://schemas.microsoft.com/office/drawing/2014/main" id="{ABE7F41D-73F9-4353-AE3F-71AB8377048D}"/>
+                <a16:creationId xmlns:a16="http://schemas.microsoft.com/office/drawing/2014/main" xmlns="" id="{ABE7F41D-73F9-4353-AE3F-71AB8377048D}"/>
               </a:ext>
             </a:extLst>
           </p:cNvPr>
@@ -5928,7 +5928,7 @@
           <p:cNvPr id="17" name="Text Placeholder 4">
             <a:extLst>
               <a:ext uri="{FF2B5EF4-FFF2-40B4-BE49-F238E27FC236}">
-                <a16:creationId xmlns="" xmlns:a16="http://schemas.microsoft.com/office/drawing/2014/main" id="{83D9B326-443F-495A-B788-21C48AC85AE2}"/>
+                <a16:creationId xmlns:a16="http://schemas.microsoft.com/office/drawing/2014/main" xmlns="" id="{83D9B326-443F-495A-B788-21C48AC85AE2}"/>
               </a:ext>
             </a:extLst>
           </p:cNvPr>
@@ -5988,7 +5988,7 @@
           <p:cNvPr id="18" name="Text Placeholder 7">
             <a:extLst>
               <a:ext uri="{FF2B5EF4-FFF2-40B4-BE49-F238E27FC236}">
-                <a16:creationId xmlns="" xmlns:a16="http://schemas.microsoft.com/office/drawing/2014/main" id="{00358894-025F-4D0E-AF6E-F99EDF29800A}"/>
+                <a16:creationId xmlns:a16="http://schemas.microsoft.com/office/drawing/2014/main" xmlns="" id="{00358894-025F-4D0E-AF6E-F99EDF29800A}"/>
               </a:ext>
             </a:extLst>
           </p:cNvPr>
@@ -6079,7 +6079,7 @@
           <p:cNvPr id="19" name="Text Placeholder 4">
             <a:extLst>
               <a:ext uri="{FF2B5EF4-FFF2-40B4-BE49-F238E27FC236}">
-                <a16:creationId xmlns="" xmlns:a16="http://schemas.microsoft.com/office/drawing/2014/main" id="{EE5AF299-5A92-48E3-B18F-F7FE7AB9EED4}"/>
+                <a16:creationId xmlns:a16="http://schemas.microsoft.com/office/drawing/2014/main" xmlns="" id="{EE5AF299-5A92-48E3-B18F-F7FE7AB9EED4}"/>
               </a:ext>
             </a:extLst>
           </p:cNvPr>
@@ -6139,7 +6139,7 @@
           <p:cNvPr id="20" name="Text Placeholder 7">
             <a:extLst>
               <a:ext uri="{FF2B5EF4-FFF2-40B4-BE49-F238E27FC236}">
-                <a16:creationId xmlns="" xmlns:a16="http://schemas.microsoft.com/office/drawing/2014/main" id="{F951F368-6540-4675-9A52-0824638E0EF4}"/>
+                <a16:creationId xmlns:a16="http://schemas.microsoft.com/office/drawing/2014/main" xmlns="" id="{F951F368-6540-4675-9A52-0824638E0EF4}"/>
               </a:ext>
             </a:extLst>
           </p:cNvPr>
@@ -6230,7 +6230,7 @@
           <p:cNvPr id="21" name="Text Placeholder 4">
             <a:extLst>
               <a:ext uri="{FF2B5EF4-FFF2-40B4-BE49-F238E27FC236}">
-                <a16:creationId xmlns="" xmlns:a16="http://schemas.microsoft.com/office/drawing/2014/main" id="{B7C16A20-D927-494E-94A9-49AF2E1FA010}"/>
+                <a16:creationId xmlns:a16="http://schemas.microsoft.com/office/drawing/2014/main" xmlns="" id="{B7C16A20-D927-494E-94A9-49AF2E1FA010}"/>
               </a:ext>
             </a:extLst>
           </p:cNvPr>
@@ -6290,7 +6290,7 @@
           <p:cNvPr id="22" name="Text Placeholder 4">
             <a:extLst>
               <a:ext uri="{FF2B5EF4-FFF2-40B4-BE49-F238E27FC236}">
-                <a16:creationId xmlns="" xmlns:a16="http://schemas.microsoft.com/office/drawing/2014/main" id="{936BACCD-6FBF-486E-81CB-3462560DA2CE}"/>
+                <a16:creationId xmlns:a16="http://schemas.microsoft.com/office/drawing/2014/main" xmlns="" id="{936BACCD-6FBF-486E-81CB-3462560DA2CE}"/>
               </a:ext>
             </a:extLst>
           </p:cNvPr>
@@ -6350,7 +6350,7 @@
           <p:cNvPr id="23" name="Text Placeholder 4">
             <a:extLst>
               <a:ext uri="{FF2B5EF4-FFF2-40B4-BE49-F238E27FC236}">
-                <a16:creationId xmlns="" xmlns:a16="http://schemas.microsoft.com/office/drawing/2014/main" id="{48E9C506-31EA-4D04-B660-3B4DB0704112}"/>
+                <a16:creationId xmlns:a16="http://schemas.microsoft.com/office/drawing/2014/main" xmlns="" id="{48E9C506-31EA-4D04-B660-3B4DB0704112}"/>
               </a:ext>
             </a:extLst>
           </p:cNvPr>
@@ -6609,7 +6609,7 @@
           <a:graphicData uri="http://schemas.openxmlformats.org/presentationml/2006/ole">
             <mc:AlternateContent xmlns:mc="http://schemas.openxmlformats.org/markup-compatibility/2006">
               <mc:Choice xmlns:v="urn:schemas-microsoft-com:vml" Requires="v">
-                <p:oleObj spid="_x0000_s17452" name="think-cell Slide" r:id="rId4" imgW="270" imgH="270" progId="TCLayout.ActiveDocument.1">
+                <p:oleObj spid="_x0000_s17455" name="think-cell Slide" r:id="rId4" imgW="270" imgH="270" progId="TCLayout.ActiveDocument.1">
                   <p:embed/>
                 </p:oleObj>
               </mc:Choice>
@@ -6736,7 +6736,7 @@
           <a:graphicData uri="http://schemas.openxmlformats.org/presentationml/2006/ole">
             <mc:AlternateContent xmlns:mc="http://schemas.openxmlformats.org/markup-compatibility/2006">
               <mc:Choice xmlns:v="urn:schemas-microsoft-com:vml" Requires="v">
-                <p:oleObj spid="_x0000_s18476" name="think-cell Slide" r:id="rId4" imgW="270" imgH="270" progId="TCLayout.ActiveDocument.1">
+                <p:oleObj spid="_x0000_s18479" name="think-cell Slide" r:id="rId4" imgW="270" imgH="270" progId="TCLayout.ActiveDocument.1">
                   <p:embed/>
                 </p:oleObj>
               </mc:Choice>
@@ -7281,7 +7281,7 @@
           <p:cNvPr id="24" name="Rectangle 57">
             <a:extLst>
               <a:ext uri="{FF2B5EF4-FFF2-40B4-BE49-F238E27FC236}">
-                <a16:creationId xmlns="" xmlns:a16="http://schemas.microsoft.com/office/drawing/2014/main" id="{E84F61DF-65CA-45BF-9A0B-34B97F6A97EA}"/>
+                <a16:creationId xmlns:a16="http://schemas.microsoft.com/office/drawing/2014/main" xmlns="" id="{E84F61DF-65CA-45BF-9A0B-34B97F6A97EA}"/>
               </a:ext>
             </a:extLst>
           </p:cNvPr>
@@ -7382,7 +7382,7 @@
           <p:cNvPr id="20" name="Text Placeholder 7">
             <a:extLst>
               <a:ext uri="{FF2B5EF4-FFF2-40B4-BE49-F238E27FC236}">
-                <a16:creationId xmlns="" xmlns:a16="http://schemas.microsoft.com/office/drawing/2014/main" id="{27CE2609-37DA-4C4C-BF45-E56CE85AA41D}"/>
+                <a16:creationId xmlns:a16="http://schemas.microsoft.com/office/drawing/2014/main" xmlns="" id="{27CE2609-37DA-4C4C-BF45-E56CE85AA41D}"/>
               </a:ext>
             </a:extLst>
           </p:cNvPr>
@@ -7504,7 +7504,7 @@
           <p:cNvPr id="29" name="Text Placeholder 7">
             <a:extLst>
               <a:ext uri="{FF2B5EF4-FFF2-40B4-BE49-F238E27FC236}">
-                <a16:creationId xmlns="" xmlns:a16="http://schemas.microsoft.com/office/drawing/2014/main" id="{27CE2609-37DA-4C4C-BF45-E56CE85AA41D}"/>
+                <a16:creationId xmlns:a16="http://schemas.microsoft.com/office/drawing/2014/main" xmlns="" id="{27CE2609-37DA-4C4C-BF45-E56CE85AA41D}"/>
               </a:ext>
             </a:extLst>
           </p:cNvPr>
@@ -7626,7 +7626,7 @@
           <p:cNvPr id="30" name="Text Placeholder 7">
             <a:extLst>
               <a:ext uri="{FF2B5EF4-FFF2-40B4-BE49-F238E27FC236}">
-                <a16:creationId xmlns="" xmlns:a16="http://schemas.microsoft.com/office/drawing/2014/main" id="{27CE2609-37DA-4C4C-BF45-E56CE85AA41D}"/>
+                <a16:creationId xmlns:a16="http://schemas.microsoft.com/office/drawing/2014/main" xmlns="" id="{27CE2609-37DA-4C4C-BF45-E56CE85AA41D}"/>
               </a:ext>
             </a:extLst>
           </p:cNvPr>
@@ -8064,7 +8064,7 @@
           <p:cNvPr id="24" name="Rectangle 57">
             <a:extLst>
               <a:ext uri="{FF2B5EF4-FFF2-40B4-BE49-F238E27FC236}">
-                <a16:creationId xmlns="" xmlns:a16="http://schemas.microsoft.com/office/drawing/2014/main" id="{E84F61DF-65CA-45BF-9A0B-34B97F6A97EA}"/>
+                <a16:creationId xmlns:a16="http://schemas.microsoft.com/office/drawing/2014/main" xmlns="" id="{E84F61DF-65CA-45BF-9A0B-34B97F6A97EA}"/>
               </a:ext>
             </a:extLst>
           </p:cNvPr>
@@ -8157,7 +8157,7 @@
           <p:cNvPr id="8" name="Text Placeholder 7">
             <a:extLst>
               <a:ext uri="{FF2B5EF4-FFF2-40B4-BE49-F238E27FC236}">
-                <a16:creationId xmlns="" xmlns:a16="http://schemas.microsoft.com/office/drawing/2014/main" id="{27CE2609-37DA-4C4C-BF45-E56CE85AA41D}"/>
+                <a16:creationId xmlns:a16="http://schemas.microsoft.com/office/drawing/2014/main" xmlns="" id="{27CE2609-37DA-4C4C-BF45-E56CE85AA41D}"/>
               </a:ext>
             </a:extLst>
           </p:cNvPr>
@@ -8271,7 +8271,7 @@
           <p:cNvPr id="13" name="Text Placeholder 7">
             <a:extLst>
               <a:ext uri="{FF2B5EF4-FFF2-40B4-BE49-F238E27FC236}">
-                <a16:creationId xmlns="" xmlns:a16="http://schemas.microsoft.com/office/drawing/2014/main" id="{D8D7F005-BA7C-423E-87B0-6782D88233F6}"/>
+                <a16:creationId xmlns:a16="http://schemas.microsoft.com/office/drawing/2014/main" xmlns="" id="{D8D7F005-BA7C-423E-87B0-6782D88233F6}"/>
               </a:ext>
             </a:extLst>
           </p:cNvPr>
@@ -8345,7 +8345,7 @@
           <p:cNvPr id="14" name="Text Placeholder 7">
             <a:extLst>
               <a:ext uri="{FF2B5EF4-FFF2-40B4-BE49-F238E27FC236}">
-                <a16:creationId xmlns="" xmlns:a16="http://schemas.microsoft.com/office/drawing/2014/main" id="{47BDC0DA-1585-454D-9E74-41D2AFC0FEE5}"/>
+                <a16:creationId xmlns:a16="http://schemas.microsoft.com/office/drawing/2014/main" xmlns="" id="{47BDC0DA-1585-454D-9E74-41D2AFC0FEE5}"/>
               </a:ext>
             </a:extLst>
           </p:cNvPr>
@@ -8447,7 +8447,7 @@
           <p:cNvPr id="16" name="Text Placeholder 7">
             <a:extLst>
               <a:ext uri="{FF2B5EF4-FFF2-40B4-BE49-F238E27FC236}">
-                <a16:creationId xmlns="" xmlns:a16="http://schemas.microsoft.com/office/drawing/2014/main" id="{27CE2609-37DA-4C4C-BF45-E56CE85AA41D}"/>
+                <a16:creationId xmlns:a16="http://schemas.microsoft.com/office/drawing/2014/main" xmlns="" id="{27CE2609-37DA-4C4C-BF45-E56CE85AA41D}"/>
               </a:ext>
             </a:extLst>
           </p:cNvPr>
@@ -8614,7 +8614,7 @@
           <p:cNvPr id="3" name="Text Placeholder 7">
             <a:extLst>
               <a:ext uri="{FF2B5EF4-FFF2-40B4-BE49-F238E27FC236}">
-                <a16:creationId xmlns="" xmlns:a16="http://schemas.microsoft.com/office/drawing/2014/main" id="{27CE2609-37DA-4C4C-BF45-E56CE85AA41D}"/>
+                <a16:creationId xmlns:a16="http://schemas.microsoft.com/office/drawing/2014/main" xmlns="" id="{27CE2609-37DA-4C4C-BF45-E56CE85AA41D}"/>
               </a:ext>
             </a:extLst>
           </p:cNvPr>
@@ -8728,7 +8728,7 @@
           <p:cNvPr id="4" name="Text Placeholder 7">
             <a:extLst>
               <a:ext uri="{FF2B5EF4-FFF2-40B4-BE49-F238E27FC236}">
-                <a16:creationId xmlns="" xmlns:a16="http://schemas.microsoft.com/office/drawing/2014/main" id="{D8D7F005-BA7C-423E-87B0-6782D88233F6}"/>
+                <a16:creationId xmlns:a16="http://schemas.microsoft.com/office/drawing/2014/main" xmlns="" id="{D8D7F005-BA7C-423E-87B0-6782D88233F6}"/>
               </a:ext>
             </a:extLst>
           </p:cNvPr>
@@ -8814,7 +8814,7 @@
           <p:cNvPr id="9" name="Text Placeholder 7">
             <a:extLst>
               <a:ext uri="{FF2B5EF4-FFF2-40B4-BE49-F238E27FC236}">
-                <a16:creationId xmlns="" xmlns:a16="http://schemas.microsoft.com/office/drawing/2014/main" id="{27CE2609-37DA-4C4C-BF45-E56CE85AA41D}"/>
+                <a16:creationId xmlns:a16="http://schemas.microsoft.com/office/drawing/2014/main" xmlns="" id="{27CE2609-37DA-4C4C-BF45-E56CE85AA41D}"/>
               </a:ext>
             </a:extLst>
           </p:cNvPr>
@@ -8928,7 +8928,7 @@
           <p:cNvPr id="10" name="Text Placeholder 7">
             <a:extLst>
               <a:ext uri="{FF2B5EF4-FFF2-40B4-BE49-F238E27FC236}">
-                <a16:creationId xmlns="" xmlns:a16="http://schemas.microsoft.com/office/drawing/2014/main" id="{D8D7F005-BA7C-423E-87B0-6782D88233F6}"/>
+                <a16:creationId xmlns:a16="http://schemas.microsoft.com/office/drawing/2014/main" xmlns="" id="{D8D7F005-BA7C-423E-87B0-6782D88233F6}"/>
               </a:ext>
             </a:extLst>
           </p:cNvPr>
@@ -9014,7 +9014,7 @@
           <p:cNvPr id="11" name="Text Placeholder 7">
             <a:extLst>
               <a:ext uri="{FF2B5EF4-FFF2-40B4-BE49-F238E27FC236}">
-                <a16:creationId xmlns="" xmlns:a16="http://schemas.microsoft.com/office/drawing/2014/main" id="{27CE2609-37DA-4C4C-BF45-E56CE85AA41D}"/>
+                <a16:creationId xmlns:a16="http://schemas.microsoft.com/office/drawing/2014/main" xmlns="" id="{27CE2609-37DA-4C4C-BF45-E56CE85AA41D}"/>
               </a:ext>
             </a:extLst>
           </p:cNvPr>
@@ -9128,7 +9128,7 @@
           <p:cNvPr id="12" name="Text Placeholder 7">
             <a:extLst>
               <a:ext uri="{FF2B5EF4-FFF2-40B4-BE49-F238E27FC236}">
-                <a16:creationId xmlns="" xmlns:a16="http://schemas.microsoft.com/office/drawing/2014/main" id="{D8D7F005-BA7C-423E-87B0-6782D88233F6}"/>
+                <a16:creationId xmlns:a16="http://schemas.microsoft.com/office/drawing/2014/main" xmlns="" id="{D8D7F005-BA7C-423E-87B0-6782D88233F6}"/>
               </a:ext>
             </a:extLst>
           </p:cNvPr>
@@ -9259,7 +9259,7 @@
           <a:graphicData uri="http://schemas.openxmlformats.org/presentationml/2006/ole">
             <mc:AlternateContent xmlns:mc="http://schemas.openxmlformats.org/markup-compatibility/2006">
               <mc:Choice xmlns:v="urn:schemas-microsoft-com:vml" Requires="v">
-                <p:oleObj spid="_x0000_s8241" name="think-cell Slide" r:id="rId4" imgW="270" imgH="270" progId="TCLayout.ActiveDocument.1">
+                <p:oleObj spid="_x0000_s8244" name="think-cell Slide" r:id="rId4" imgW="270" imgH="270" progId="TCLayout.ActiveDocument.1">
                   <p:embed/>
                 </p:oleObj>
               </mc:Choice>
@@ -9727,7 +9727,7 @@
           <p:cNvPr id="12" name="Freeform: Shape 11">
             <a:extLst>
               <a:ext uri="{FF2B5EF4-FFF2-40B4-BE49-F238E27FC236}">
-                <a16:creationId xmlns="" xmlns:a16="http://schemas.microsoft.com/office/drawing/2014/main" id="{F5F5AEA1-6A77-4676-B8B3-EF658F5F8430}"/>
+                <a16:creationId xmlns:a16="http://schemas.microsoft.com/office/drawing/2014/main" xmlns="" id="{F5F5AEA1-6A77-4676-B8B3-EF658F5F8430}"/>
               </a:ext>
             </a:extLst>
           </p:cNvPr>
@@ -9920,7 +9920,7 @@
           <p:cNvPr id="26" name="Text Placeholder 4">
             <a:extLst>
               <a:ext uri="{FF2B5EF4-FFF2-40B4-BE49-F238E27FC236}">
-                <a16:creationId xmlns="" xmlns:a16="http://schemas.microsoft.com/office/drawing/2014/main" id="{7E551D69-F21D-4601-B4BD-97ECB52F39D6}"/>
+                <a16:creationId xmlns:a16="http://schemas.microsoft.com/office/drawing/2014/main" xmlns="" id="{7E551D69-F21D-4601-B4BD-97ECB52F39D6}"/>
               </a:ext>
             </a:extLst>
           </p:cNvPr>
@@ -9980,7 +9980,7 @@
           <p:cNvPr id="23" name="Text Placeholder 4">
             <a:extLst>
               <a:ext uri="{FF2B5EF4-FFF2-40B4-BE49-F238E27FC236}">
-                <a16:creationId xmlns="" xmlns:a16="http://schemas.microsoft.com/office/drawing/2014/main" id="{BC359575-5CC3-4B2F-91E7-19D6A150BE7B}"/>
+                <a16:creationId xmlns:a16="http://schemas.microsoft.com/office/drawing/2014/main" xmlns="" id="{BC359575-5CC3-4B2F-91E7-19D6A150BE7B}"/>
               </a:ext>
             </a:extLst>
           </p:cNvPr>
@@ -10040,7 +10040,7 @@
           <p:cNvPr id="24" name="Text Placeholder 7">
             <a:extLst>
               <a:ext uri="{FF2B5EF4-FFF2-40B4-BE49-F238E27FC236}">
-                <a16:creationId xmlns="" xmlns:a16="http://schemas.microsoft.com/office/drawing/2014/main" id="{53745724-67BB-4475-9660-FEEE12268615}"/>
+                <a16:creationId xmlns:a16="http://schemas.microsoft.com/office/drawing/2014/main" xmlns="" id="{53745724-67BB-4475-9660-FEEE12268615}"/>
               </a:ext>
             </a:extLst>
           </p:cNvPr>
@@ -10114,7 +10114,7 @@
           <p:cNvPr id="27" name="Text Placeholder 7">
             <a:extLst>
               <a:ext uri="{FF2B5EF4-FFF2-40B4-BE49-F238E27FC236}">
-                <a16:creationId xmlns="" xmlns:a16="http://schemas.microsoft.com/office/drawing/2014/main" id="{C78431F2-3F85-4748-A6BC-A08250A6D354}"/>
+                <a16:creationId xmlns:a16="http://schemas.microsoft.com/office/drawing/2014/main" xmlns="" id="{C78431F2-3F85-4748-A6BC-A08250A6D354}"/>
               </a:ext>
             </a:extLst>
           </p:cNvPr>
@@ -10188,7 +10188,7 @@
           <p:cNvPr id="13" name="Oval 20">
             <a:extLst>
               <a:ext uri="{FF2B5EF4-FFF2-40B4-BE49-F238E27FC236}">
-                <a16:creationId xmlns="" xmlns:a16="http://schemas.microsoft.com/office/drawing/2014/main" id="{1EFB3510-D39A-47CF-8191-109DDF9E53D5}"/>
+                <a16:creationId xmlns:a16="http://schemas.microsoft.com/office/drawing/2014/main" xmlns="" id="{1EFB3510-D39A-47CF-8191-109DDF9E53D5}"/>
               </a:ext>
             </a:extLst>
           </p:cNvPr>
@@ -10448,7 +10448,7 @@
           <a:graphicData uri="http://schemas.openxmlformats.org/presentationml/2006/ole">
             <mc:AlternateContent xmlns:mc="http://schemas.openxmlformats.org/markup-compatibility/2006">
               <mc:Choice xmlns:v="urn:schemas-microsoft-com:vml" Requires="v">
-                <p:oleObj spid="_x0000_s9265" name="think-cell Slide" r:id="rId4" imgW="270" imgH="270" progId="TCLayout.ActiveDocument.1">
+                <p:oleObj spid="_x0000_s9268" name="think-cell Slide" r:id="rId4" imgW="270" imgH="270" progId="TCLayout.ActiveDocument.1">
                   <p:embed/>
                 </p:oleObj>
               </mc:Choice>
@@ -10557,7 +10557,7 @@
           <p:cNvPr id="3" name="Freeform: Shape 9">
             <a:extLst>
               <a:ext uri="{FF2B5EF4-FFF2-40B4-BE49-F238E27FC236}">
-                <a16:creationId xmlns="" xmlns:a16="http://schemas.microsoft.com/office/drawing/2014/main" id="{531E77B6-0DD5-446F-A826-892DFC23D785}"/>
+                <a16:creationId xmlns:a16="http://schemas.microsoft.com/office/drawing/2014/main" xmlns="" id="{531E77B6-0DD5-446F-A826-892DFC23D785}"/>
               </a:ext>
             </a:extLst>
           </p:cNvPr>
@@ -10730,7 +10730,7 @@
           <p:cNvPr id="7" name="Retângulo 43">
             <a:extLst>
               <a:ext uri="{FF2B5EF4-FFF2-40B4-BE49-F238E27FC236}">
-                <a16:creationId xmlns="" xmlns:a16="http://schemas.microsoft.com/office/drawing/2014/main" id="{25FC8637-25BD-4C09-AF25-56B4243DAB3D}"/>
+                <a16:creationId xmlns:a16="http://schemas.microsoft.com/office/drawing/2014/main" xmlns="" id="{25FC8637-25BD-4C09-AF25-56B4243DAB3D}"/>
               </a:ext>
             </a:extLst>
           </p:cNvPr>
@@ -10781,7 +10781,7 @@
           <p:cNvPr id="8" name="Text Placeholder 7">
             <a:extLst>
               <a:ext uri="{FF2B5EF4-FFF2-40B4-BE49-F238E27FC236}">
-                <a16:creationId xmlns="" xmlns:a16="http://schemas.microsoft.com/office/drawing/2014/main" id="{E824319D-02CC-441E-87B5-E9D15DE8CA35}"/>
+                <a16:creationId xmlns:a16="http://schemas.microsoft.com/office/drawing/2014/main" xmlns="" id="{E824319D-02CC-441E-87B5-E9D15DE8CA35}"/>
               </a:ext>
             </a:extLst>
           </p:cNvPr>
@@ -11393,7 +11393,7 @@
           <a:graphicData uri="http://schemas.openxmlformats.org/presentationml/2006/ole">
             <mc:AlternateContent xmlns:mc="http://schemas.openxmlformats.org/markup-compatibility/2006">
               <mc:Choice xmlns:v="urn:schemas-microsoft-com:vml" Requires="v">
-                <p:oleObj spid="_x0000_s10289" name="think-cell Slide" r:id="rId4" imgW="270" imgH="270" progId="TCLayout.ActiveDocument.1">
+                <p:oleObj spid="_x0000_s10292" name="think-cell Slide" r:id="rId4" imgW="270" imgH="270" progId="TCLayout.ActiveDocument.1">
                   <p:embed/>
                 </p:oleObj>
               </mc:Choice>
@@ -11452,7 +11452,7 @@
           <p:cNvPr id="13" name="Rectangle 12">
             <a:extLst>
               <a:ext uri="{FF2B5EF4-FFF2-40B4-BE49-F238E27FC236}">
-                <a16:creationId xmlns="" xmlns:a16="http://schemas.microsoft.com/office/drawing/2014/main" id="{9455EBB8-DB3C-45D2-B02F-0B36A58E555B}"/>
+                <a16:creationId xmlns:a16="http://schemas.microsoft.com/office/drawing/2014/main" xmlns="" id="{9455EBB8-DB3C-45D2-B02F-0B36A58E555B}"/>
               </a:ext>
             </a:extLst>
           </p:cNvPr>
@@ -11742,7 +11742,7 @@
           <p:cNvPr id="14" name="Text Placeholder 7">
             <a:extLst>
               <a:ext uri="{FF2B5EF4-FFF2-40B4-BE49-F238E27FC236}">
-                <a16:creationId xmlns="" xmlns:a16="http://schemas.microsoft.com/office/drawing/2014/main" id="{9949BCD6-E419-4ED2-9061-402DD5FF2406}"/>
+                <a16:creationId xmlns:a16="http://schemas.microsoft.com/office/drawing/2014/main" xmlns="" id="{9949BCD6-E419-4ED2-9061-402DD5FF2406}"/>
               </a:ext>
             </a:extLst>
           </p:cNvPr>
@@ -11833,7 +11833,7 @@
           <p:cNvPr id="15" name="Text Placeholder 4">
             <a:extLst>
               <a:ext uri="{FF2B5EF4-FFF2-40B4-BE49-F238E27FC236}">
-                <a16:creationId xmlns="" xmlns:a16="http://schemas.microsoft.com/office/drawing/2014/main" id="{3F6EE60C-2261-45A0-AD6F-B5F767C57B57}"/>
+                <a16:creationId xmlns:a16="http://schemas.microsoft.com/office/drawing/2014/main" xmlns="" id="{3F6EE60C-2261-45A0-AD6F-B5F767C57B57}"/>
               </a:ext>
             </a:extLst>
           </p:cNvPr>
@@ -11893,7 +11893,7 @@
           <p:cNvPr id="16" name="Text Placeholder 7">
             <a:extLst>
               <a:ext uri="{FF2B5EF4-FFF2-40B4-BE49-F238E27FC236}">
-                <a16:creationId xmlns="" xmlns:a16="http://schemas.microsoft.com/office/drawing/2014/main" id="{ABE7F41D-73F9-4353-AE3F-71AB8377048D}"/>
+                <a16:creationId xmlns:a16="http://schemas.microsoft.com/office/drawing/2014/main" xmlns="" id="{ABE7F41D-73F9-4353-AE3F-71AB8377048D}"/>
               </a:ext>
             </a:extLst>
           </p:cNvPr>
@@ -11984,7 +11984,7 @@
           <p:cNvPr id="17" name="Text Placeholder 4">
             <a:extLst>
               <a:ext uri="{FF2B5EF4-FFF2-40B4-BE49-F238E27FC236}">
-                <a16:creationId xmlns="" xmlns:a16="http://schemas.microsoft.com/office/drawing/2014/main" id="{83D9B326-443F-495A-B788-21C48AC85AE2}"/>
+                <a16:creationId xmlns:a16="http://schemas.microsoft.com/office/drawing/2014/main" xmlns="" id="{83D9B326-443F-495A-B788-21C48AC85AE2}"/>
               </a:ext>
             </a:extLst>
           </p:cNvPr>
@@ -12044,7 +12044,7 @@
           <p:cNvPr id="18" name="Text Placeholder 7">
             <a:extLst>
               <a:ext uri="{FF2B5EF4-FFF2-40B4-BE49-F238E27FC236}">
-                <a16:creationId xmlns="" xmlns:a16="http://schemas.microsoft.com/office/drawing/2014/main" id="{00358894-025F-4D0E-AF6E-F99EDF29800A}"/>
+                <a16:creationId xmlns:a16="http://schemas.microsoft.com/office/drawing/2014/main" xmlns="" id="{00358894-025F-4D0E-AF6E-F99EDF29800A}"/>
               </a:ext>
             </a:extLst>
           </p:cNvPr>
@@ -12135,7 +12135,7 @@
           <p:cNvPr id="19" name="Text Placeholder 4">
             <a:extLst>
               <a:ext uri="{FF2B5EF4-FFF2-40B4-BE49-F238E27FC236}">
-                <a16:creationId xmlns="" xmlns:a16="http://schemas.microsoft.com/office/drawing/2014/main" id="{EE5AF299-5A92-48E3-B18F-F7FE7AB9EED4}"/>
+                <a16:creationId xmlns:a16="http://schemas.microsoft.com/office/drawing/2014/main" xmlns="" id="{EE5AF299-5A92-48E3-B18F-F7FE7AB9EED4}"/>
               </a:ext>
             </a:extLst>
           </p:cNvPr>
@@ -12195,7 +12195,7 @@
           <p:cNvPr id="20" name="Text Placeholder 7">
             <a:extLst>
               <a:ext uri="{FF2B5EF4-FFF2-40B4-BE49-F238E27FC236}">
-                <a16:creationId xmlns="" xmlns:a16="http://schemas.microsoft.com/office/drawing/2014/main" id="{F951F368-6540-4675-9A52-0824638E0EF4}"/>
+                <a16:creationId xmlns:a16="http://schemas.microsoft.com/office/drawing/2014/main" xmlns="" id="{F951F368-6540-4675-9A52-0824638E0EF4}"/>
               </a:ext>
             </a:extLst>
           </p:cNvPr>
@@ -12286,7 +12286,7 @@
           <p:cNvPr id="21" name="Text Placeholder 4">
             <a:extLst>
               <a:ext uri="{FF2B5EF4-FFF2-40B4-BE49-F238E27FC236}">
-                <a16:creationId xmlns="" xmlns:a16="http://schemas.microsoft.com/office/drawing/2014/main" id="{B7C16A20-D927-494E-94A9-49AF2E1FA010}"/>
+                <a16:creationId xmlns:a16="http://schemas.microsoft.com/office/drawing/2014/main" xmlns="" id="{B7C16A20-D927-494E-94A9-49AF2E1FA010}"/>
               </a:ext>
             </a:extLst>
           </p:cNvPr>
@@ -12346,7 +12346,7 @@
           <p:cNvPr id="22" name="Text Placeholder 4">
             <a:extLst>
               <a:ext uri="{FF2B5EF4-FFF2-40B4-BE49-F238E27FC236}">
-                <a16:creationId xmlns="" xmlns:a16="http://schemas.microsoft.com/office/drawing/2014/main" id="{936BACCD-6FBF-486E-81CB-3462560DA2CE}"/>
+                <a16:creationId xmlns:a16="http://schemas.microsoft.com/office/drawing/2014/main" xmlns="" id="{936BACCD-6FBF-486E-81CB-3462560DA2CE}"/>
               </a:ext>
             </a:extLst>
           </p:cNvPr>
@@ -12406,7 +12406,7 @@
           <p:cNvPr id="23" name="Text Placeholder 4">
             <a:extLst>
               <a:ext uri="{FF2B5EF4-FFF2-40B4-BE49-F238E27FC236}">
-                <a16:creationId xmlns="" xmlns:a16="http://schemas.microsoft.com/office/drawing/2014/main" id="{48E9C506-31EA-4D04-B660-3B4DB0704112}"/>
+                <a16:creationId xmlns:a16="http://schemas.microsoft.com/office/drawing/2014/main" xmlns="" id="{48E9C506-31EA-4D04-B660-3B4DB0704112}"/>
               </a:ext>
             </a:extLst>
           </p:cNvPr>
@@ -12511,7 +12511,7 @@
           <a:graphicData uri="http://schemas.openxmlformats.org/presentationml/2006/ole">
             <mc:AlternateContent xmlns:mc="http://schemas.openxmlformats.org/markup-compatibility/2006">
               <mc:Choice xmlns:v="urn:schemas-microsoft-com:vml" Requires="v">
-                <p:oleObj spid="_x0000_s11313" name="think-cell Slide" r:id="rId4" imgW="270" imgH="270" progId="TCLayout.ActiveDocument.1">
+                <p:oleObj spid="_x0000_s11316" name="think-cell Slide" r:id="rId4" imgW="270" imgH="270" progId="TCLayout.ActiveDocument.1">
                   <p:embed/>
                 </p:oleObj>
               </mc:Choice>
@@ -12646,7 +12646,7 @@
           <a:graphicData uri="http://schemas.openxmlformats.org/presentationml/2006/ole">
             <mc:AlternateContent xmlns:mc="http://schemas.openxmlformats.org/markup-compatibility/2006">
               <mc:Choice xmlns:v="urn:schemas-microsoft-com:vml" Requires="v">
-                <p:oleObj spid="_x0000_s7217" name="think-cell Slide" r:id="rId15" imgW="270" imgH="270" progId="TCLayout.ActiveDocument.1">
+                <p:oleObj spid="_x0000_s7220" name="think-cell Slide" r:id="rId15" imgW="270" imgH="270" progId="TCLayout.ActiveDocument.1">
                   <p:embed/>
                 </p:oleObj>
               </mc:Choice>
@@ -12988,7 +12988,7 @@
           <p:cNvPr id="7" name="Retângulo 43">
             <a:extLst>
               <a:ext uri="{FF2B5EF4-FFF2-40B4-BE49-F238E27FC236}">
-                <a16:creationId xmlns="" xmlns:a16="http://schemas.microsoft.com/office/drawing/2014/main" id="{25FC8637-25BD-4C09-AF25-56B4243DAB3D}"/>
+                <a16:creationId xmlns:a16="http://schemas.microsoft.com/office/drawing/2014/main" xmlns="" id="{25FC8637-25BD-4C09-AF25-56B4243DAB3D}"/>
               </a:ext>
             </a:extLst>
           </p:cNvPr>
@@ -13039,7 +13039,7 @@
           <p:cNvPr id="6" name="Text Placeholder 7">
             <a:extLst>
               <a:ext uri="{FF2B5EF4-FFF2-40B4-BE49-F238E27FC236}">
-                <a16:creationId xmlns="" xmlns:a16="http://schemas.microsoft.com/office/drawing/2014/main" id="{E824319D-02CC-441E-87B5-E9D15DE8CA35}"/>
+                <a16:creationId xmlns:a16="http://schemas.microsoft.com/office/drawing/2014/main" xmlns="" id="{E824319D-02CC-441E-87B5-E9D15DE8CA35}"/>
               </a:ext>
             </a:extLst>
           </p:cNvPr>
@@ -13258,7 +13258,7 @@
           <p:cNvPr id="8" name="Text Placeholder 7">
             <a:extLst>
               <a:ext uri="{FF2B5EF4-FFF2-40B4-BE49-F238E27FC236}">
-                <a16:creationId xmlns="" xmlns:a16="http://schemas.microsoft.com/office/drawing/2014/main" id="{E824319D-02CC-441E-87B5-E9D15DE8CA35}"/>
+                <a16:creationId xmlns:a16="http://schemas.microsoft.com/office/drawing/2014/main" xmlns="" id="{E824319D-02CC-441E-87B5-E9D15DE8CA35}"/>
               </a:ext>
             </a:extLst>
           </p:cNvPr>
@@ -13579,7 +13579,7 @@
           <p:cNvPr id="3" name="Groupe 2">
             <a:extLst>
               <a:ext uri="{FF2B5EF4-FFF2-40B4-BE49-F238E27FC236}">
-                <a16:creationId xmlns="" xmlns:a16="http://schemas.microsoft.com/office/drawing/2014/main" id="{231F4250-75BE-456B-A9D8-680BA4145249}"/>
+                <a16:creationId xmlns:a16="http://schemas.microsoft.com/office/drawing/2014/main" xmlns="" id="{231F4250-75BE-456B-A9D8-680BA4145249}"/>
               </a:ext>
             </a:extLst>
           </p:cNvPr>
@@ -13599,7 +13599,7 @@
             <p:cNvPr id="11" name="Rectangle 10">
               <a:extLst>
                 <a:ext uri="{FF2B5EF4-FFF2-40B4-BE49-F238E27FC236}">
-                  <a16:creationId xmlns="" xmlns:a16="http://schemas.microsoft.com/office/drawing/2014/main" id="{EF1244FD-1856-4971-9A73-AD6DF3F42A90}"/>
+                  <a16:creationId xmlns:a16="http://schemas.microsoft.com/office/drawing/2014/main" xmlns="" id="{EF1244FD-1856-4971-9A73-AD6DF3F42A90}"/>
                 </a:ext>
               </a:extLst>
             </p:cNvPr>
@@ -13659,7 +13659,7 @@
             <p:cNvPr id="12" name="Rectangle 11">
               <a:extLst>
                 <a:ext uri="{FF2B5EF4-FFF2-40B4-BE49-F238E27FC236}">
-                  <a16:creationId xmlns="" xmlns:a16="http://schemas.microsoft.com/office/drawing/2014/main" id="{22B40C78-6F20-4C95-AB26-B29FEC0FF747}"/>
+                  <a16:creationId xmlns:a16="http://schemas.microsoft.com/office/drawing/2014/main" xmlns="" id="{22B40C78-6F20-4C95-AB26-B29FEC0FF747}"/>
                 </a:ext>
               </a:extLst>
             </p:cNvPr>
@@ -13719,7 +13719,7 @@
             <p:cNvPr id="13" name="Rectangle 12">
               <a:extLst>
                 <a:ext uri="{FF2B5EF4-FFF2-40B4-BE49-F238E27FC236}">
-                  <a16:creationId xmlns="" xmlns:a16="http://schemas.microsoft.com/office/drawing/2014/main" id="{1AED4E7D-39CE-49AE-9D4C-16EA940CBE5F}"/>
+                  <a16:creationId xmlns:a16="http://schemas.microsoft.com/office/drawing/2014/main" xmlns="" id="{1AED4E7D-39CE-49AE-9D4C-16EA940CBE5F}"/>
                 </a:ext>
               </a:extLst>
             </p:cNvPr>
@@ -13780,7 +13780,7 @@
           <p:cNvPr id="5" name="Groupe 4">
             <a:extLst>
               <a:ext uri="{FF2B5EF4-FFF2-40B4-BE49-F238E27FC236}">
-                <a16:creationId xmlns="" xmlns:a16="http://schemas.microsoft.com/office/drawing/2014/main" id="{CC6ACEFF-8651-4C08-BAF6-3BFAE6473DAF}"/>
+                <a16:creationId xmlns:a16="http://schemas.microsoft.com/office/drawing/2014/main" xmlns="" id="{CC6ACEFF-8651-4C08-BAF6-3BFAE6473DAF}"/>
               </a:ext>
             </a:extLst>
           </p:cNvPr>
@@ -13800,7 +13800,7 @@
             <p:cNvPr id="16" name="Rectangle 15">
               <a:extLst>
                 <a:ext uri="{FF2B5EF4-FFF2-40B4-BE49-F238E27FC236}">
-                  <a16:creationId xmlns="" xmlns:a16="http://schemas.microsoft.com/office/drawing/2014/main" id="{D27E2B2B-AB85-4173-AB1F-61084925AA83}"/>
+                  <a16:creationId xmlns:a16="http://schemas.microsoft.com/office/drawing/2014/main" xmlns="" id="{D27E2B2B-AB85-4173-AB1F-61084925AA83}"/>
                 </a:ext>
               </a:extLst>
             </p:cNvPr>
@@ -13860,7 +13860,7 @@
             <p:cNvPr id="17" name="Rectangle 16">
               <a:extLst>
                 <a:ext uri="{FF2B5EF4-FFF2-40B4-BE49-F238E27FC236}">
-                  <a16:creationId xmlns="" xmlns:a16="http://schemas.microsoft.com/office/drawing/2014/main" id="{0DDEBD8A-CA0B-4D62-9426-DFB2D4742184}"/>
+                  <a16:creationId xmlns:a16="http://schemas.microsoft.com/office/drawing/2014/main" xmlns="" id="{0DDEBD8A-CA0B-4D62-9426-DFB2D4742184}"/>
                 </a:ext>
               </a:extLst>
             </p:cNvPr>
@@ -13920,7 +13920,7 @@
             <p:cNvPr id="18" name="Rectangle 17">
               <a:extLst>
                 <a:ext uri="{FF2B5EF4-FFF2-40B4-BE49-F238E27FC236}">
-                  <a16:creationId xmlns="" xmlns:a16="http://schemas.microsoft.com/office/drawing/2014/main" id="{65515214-3AFD-4A2B-95C5-2FDFF59A1BE2}"/>
+                  <a16:creationId xmlns:a16="http://schemas.microsoft.com/office/drawing/2014/main" xmlns="" id="{65515214-3AFD-4A2B-95C5-2FDFF59A1BE2}"/>
                 </a:ext>
               </a:extLst>
             </p:cNvPr>
@@ -13980,7 +13980,7 @@
             <p:cNvPr id="19" name="Rectangle 18">
               <a:extLst>
                 <a:ext uri="{FF2B5EF4-FFF2-40B4-BE49-F238E27FC236}">
-                  <a16:creationId xmlns="" xmlns:a16="http://schemas.microsoft.com/office/drawing/2014/main" id="{D674829A-E5EF-4140-B9ED-AC7745AB028D}"/>
+                  <a16:creationId xmlns:a16="http://schemas.microsoft.com/office/drawing/2014/main" xmlns="" id="{D674829A-E5EF-4140-B9ED-AC7745AB028D}"/>
                 </a:ext>
               </a:extLst>
             </p:cNvPr>
@@ -14040,7 +14040,7 @@
             <p:cNvPr id="20" name="Rectangle 19">
               <a:extLst>
                 <a:ext uri="{FF2B5EF4-FFF2-40B4-BE49-F238E27FC236}">
-                  <a16:creationId xmlns="" xmlns:a16="http://schemas.microsoft.com/office/drawing/2014/main" id="{E59B3FCE-0262-45FE-BE39-9459C5BC7FEE}"/>
+                  <a16:creationId xmlns:a16="http://schemas.microsoft.com/office/drawing/2014/main" xmlns="" id="{E59B3FCE-0262-45FE-BE39-9459C5BC7FEE}"/>
                 </a:ext>
               </a:extLst>
             </p:cNvPr>
@@ -14100,7 +14100,7 @@
             <p:cNvPr id="22" name="Rectangle 21">
               <a:extLst>
                 <a:ext uri="{FF2B5EF4-FFF2-40B4-BE49-F238E27FC236}">
-                  <a16:creationId xmlns="" xmlns:a16="http://schemas.microsoft.com/office/drawing/2014/main" id="{F5D692DE-D6DE-4022-9F2F-5F8C1403E4D0}"/>
+                  <a16:creationId xmlns:a16="http://schemas.microsoft.com/office/drawing/2014/main" xmlns="" id="{F5D692DE-D6DE-4022-9F2F-5F8C1403E4D0}"/>
                 </a:ext>
               </a:extLst>
             </p:cNvPr>
@@ -14160,7 +14160,7 @@
             <p:cNvPr id="23" name="Rectangle 22">
               <a:extLst>
                 <a:ext uri="{FF2B5EF4-FFF2-40B4-BE49-F238E27FC236}">
-                  <a16:creationId xmlns="" xmlns:a16="http://schemas.microsoft.com/office/drawing/2014/main" id="{35EEF2F0-E01D-4851-96E7-30214EC78A3B}"/>
+                  <a16:creationId xmlns:a16="http://schemas.microsoft.com/office/drawing/2014/main" xmlns="" id="{35EEF2F0-E01D-4851-96E7-30214EC78A3B}"/>
                 </a:ext>
               </a:extLst>
             </p:cNvPr>
@@ -14220,7 +14220,7 @@
             <p:cNvPr id="24" name="Rectangle 23">
               <a:extLst>
                 <a:ext uri="{FF2B5EF4-FFF2-40B4-BE49-F238E27FC236}">
-                  <a16:creationId xmlns="" xmlns:a16="http://schemas.microsoft.com/office/drawing/2014/main" id="{468B1DDD-74B0-4453-A996-5BA8693FF545}"/>
+                  <a16:creationId xmlns:a16="http://schemas.microsoft.com/office/drawing/2014/main" xmlns="" id="{468B1DDD-74B0-4453-A996-5BA8693FF545}"/>
                 </a:ext>
               </a:extLst>
             </p:cNvPr>
@@ -14280,7 +14280,7 @@
             <p:cNvPr id="25" name="Rectangle 24">
               <a:extLst>
                 <a:ext uri="{FF2B5EF4-FFF2-40B4-BE49-F238E27FC236}">
-                  <a16:creationId xmlns="" xmlns:a16="http://schemas.microsoft.com/office/drawing/2014/main" id="{8809D5E9-1B2A-4D30-A4DD-47B7C9BBCEDC}"/>
+                  <a16:creationId xmlns:a16="http://schemas.microsoft.com/office/drawing/2014/main" xmlns="" id="{8809D5E9-1B2A-4D30-A4DD-47B7C9BBCEDC}"/>
                 </a:ext>
               </a:extLst>
             </p:cNvPr>
@@ -14340,7 +14340,7 @@
             <p:cNvPr id="26" name="Rectangle 25">
               <a:extLst>
                 <a:ext uri="{FF2B5EF4-FFF2-40B4-BE49-F238E27FC236}">
-                  <a16:creationId xmlns="" xmlns:a16="http://schemas.microsoft.com/office/drawing/2014/main" id="{995FF3A0-94CA-40BA-AF81-B777FF5FD489}"/>
+                  <a16:creationId xmlns:a16="http://schemas.microsoft.com/office/drawing/2014/main" xmlns="" id="{995FF3A0-94CA-40BA-AF81-B777FF5FD489}"/>
                 </a:ext>
               </a:extLst>
             </p:cNvPr>
@@ -14400,7 +14400,7 @@
             <p:cNvPr id="27" name="Rectangle 26">
               <a:extLst>
                 <a:ext uri="{FF2B5EF4-FFF2-40B4-BE49-F238E27FC236}">
-                  <a16:creationId xmlns="" xmlns:a16="http://schemas.microsoft.com/office/drawing/2014/main" id="{9F83F12C-5135-43B7-B1D8-A0A72DB85AED}"/>
+                  <a16:creationId xmlns:a16="http://schemas.microsoft.com/office/drawing/2014/main" xmlns="" id="{9F83F12C-5135-43B7-B1D8-A0A72DB85AED}"/>
                 </a:ext>
               </a:extLst>
             </p:cNvPr>
@@ -14460,7 +14460,7 @@
             <p:cNvPr id="28" name="Rectangle 27">
               <a:extLst>
                 <a:ext uri="{FF2B5EF4-FFF2-40B4-BE49-F238E27FC236}">
-                  <a16:creationId xmlns="" xmlns:a16="http://schemas.microsoft.com/office/drawing/2014/main" id="{256CA1CF-2C4A-42DA-94F5-CB5E5B47F24B}"/>
+                  <a16:creationId xmlns:a16="http://schemas.microsoft.com/office/drawing/2014/main" xmlns="" id="{256CA1CF-2C4A-42DA-94F5-CB5E5B47F24B}"/>
                 </a:ext>
               </a:extLst>
             </p:cNvPr>
@@ -14520,7 +14520,7 @@
             <p:cNvPr id="29" name="Rectangle 28">
               <a:extLst>
                 <a:ext uri="{FF2B5EF4-FFF2-40B4-BE49-F238E27FC236}">
-                  <a16:creationId xmlns="" xmlns:a16="http://schemas.microsoft.com/office/drawing/2014/main" id="{47F07AFA-8569-4B3B-854A-60B26629D96D}"/>
+                  <a16:creationId xmlns:a16="http://schemas.microsoft.com/office/drawing/2014/main" xmlns="" id="{47F07AFA-8569-4B3B-854A-60B26629D96D}"/>
                 </a:ext>
               </a:extLst>
             </p:cNvPr>
@@ -14580,7 +14580,7 @@
             <p:cNvPr id="30" name="Rectangle 29">
               <a:extLst>
                 <a:ext uri="{FF2B5EF4-FFF2-40B4-BE49-F238E27FC236}">
-                  <a16:creationId xmlns="" xmlns:a16="http://schemas.microsoft.com/office/drawing/2014/main" id="{8103554C-8B73-4C9A-AFFF-55D6E47A0E76}"/>
+                  <a16:creationId xmlns:a16="http://schemas.microsoft.com/office/drawing/2014/main" xmlns="" id="{8103554C-8B73-4C9A-AFFF-55D6E47A0E76}"/>
                 </a:ext>
               </a:extLst>
             </p:cNvPr>
@@ -14964,7 +14964,7 @@
   </p:txStyles>
   <p:extLst mod="1">
     <p:ext uri="{27BBF7A9-308A-43DC-89C8-2F10F3537804}">
-      <p15:sldGuideLst xmlns="" xmlns:p15="http://schemas.microsoft.com/office/powerpoint/2012/main">
+      <p15:sldGuideLst xmlns:p15="http://schemas.microsoft.com/office/powerpoint/2012/main" xmlns="">
         <p15:guide id="1" orient="horz" pos="709">
           <p15:clr>
             <a:srgbClr val="F26B43"/>
@@ -15041,7 +15041,7 @@
           <a:graphicData uri="http://schemas.openxmlformats.org/presentationml/2006/ole">
             <mc:AlternateContent xmlns:mc="http://schemas.openxmlformats.org/markup-compatibility/2006">
               <mc:Choice xmlns:v="urn:schemas-microsoft-com:vml" Requires="v">
-                <p:oleObj spid="_x0000_s13357" name="think-cell Slide" r:id="rId16" imgW="270" imgH="270" progId="TCLayout.ActiveDocument.1">
+                <p:oleObj spid="_x0000_s13360" name="think-cell Slide" r:id="rId16" imgW="270" imgH="270" progId="TCLayout.ActiveDocument.1">
                   <p:embed/>
                 </p:oleObj>
               </mc:Choice>
@@ -15383,7 +15383,7 @@
           <p:cNvPr id="7" name="Retângulo 43">
             <a:extLst>
               <a:ext uri="{FF2B5EF4-FFF2-40B4-BE49-F238E27FC236}">
-                <a16:creationId xmlns="" xmlns:a16="http://schemas.microsoft.com/office/drawing/2014/main" id="{25FC8637-25BD-4C09-AF25-56B4243DAB3D}"/>
+                <a16:creationId xmlns:a16="http://schemas.microsoft.com/office/drawing/2014/main" xmlns="" id="{25FC8637-25BD-4C09-AF25-56B4243DAB3D}"/>
               </a:ext>
             </a:extLst>
           </p:cNvPr>
@@ -15434,7 +15434,7 @@
           <p:cNvPr id="6" name="Text Placeholder 7">
             <a:extLst>
               <a:ext uri="{FF2B5EF4-FFF2-40B4-BE49-F238E27FC236}">
-                <a16:creationId xmlns="" xmlns:a16="http://schemas.microsoft.com/office/drawing/2014/main" id="{E824319D-02CC-441E-87B5-E9D15DE8CA35}"/>
+                <a16:creationId xmlns:a16="http://schemas.microsoft.com/office/drawing/2014/main" xmlns="" id="{E824319D-02CC-441E-87B5-E9D15DE8CA35}"/>
               </a:ext>
             </a:extLst>
           </p:cNvPr>
@@ -15653,7 +15653,7 @@
           <p:cNvPr id="8" name="Text Placeholder 7">
             <a:extLst>
               <a:ext uri="{FF2B5EF4-FFF2-40B4-BE49-F238E27FC236}">
-                <a16:creationId xmlns="" xmlns:a16="http://schemas.microsoft.com/office/drawing/2014/main" id="{E824319D-02CC-441E-87B5-E9D15DE8CA35}"/>
+                <a16:creationId xmlns:a16="http://schemas.microsoft.com/office/drawing/2014/main" xmlns="" id="{E824319D-02CC-441E-87B5-E9D15DE8CA35}"/>
               </a:ext>
             </a:extLst>
           </p:cNvPr>
@@ -15974,7 +15974,7 @@
           <p:cNvPr id="3" name="Groupe 2">
             <a:extLst>
               <a:ext uri="{FF2B5EF4-FFF2-40B4-BE49-F238E27FC236}">
-                <a16:creationId xmlns="" xmlns:a16="http://schemas.microsoft.com/office/drawing/2014/main" id="{231F4250-75BE-456B-A9D8-680BA4145249}"/>
+                <a16:creationId xmlns:a16="http://schemas.microsoft.com/office/drawing/2014/main" xmlns="" id="{231F4250-75BE-456B-A9D8-680BA4145249}"/>
               </a:ext>
             </a:extLst>
           </p:cNvPr>
@@ -15994,7 +15994,7 @@
             <p:cNvPr id="11" name="Rectangle 10">
               <a:extLst>
                 <a:ext uri="{FF2B5EF4-FFF2-40B4-BE49-F238E27FC236}">
-                  <a16:creationId xmlns="" xmlns:a16="http://schemas.microsoft.com/office/drawing/2014/main" id="{EF1244FD-1856-4971-9A73-AD6DF3F42A90}"/>
+                  <a16:creationId xmlns:a16="http://schemas.microsoft.com/office/drawing/2014/main" xmlns="" id="{EF1244FD-1856-4971-9A73-AD6DF3F42A90}"/>
                 </a:ext>
               </a:extLst>
             </p:cNvPr>
@@ -16054,7 +16054,7 @@
             <p:cNvPr id="12" name="Rectangle 11">
               <a:extLst>
                 <a:ext uri="{FF2B5EF4-FFF2-40B4-BE49-F238E27FC236}">
-                  <a16:creationId xmlns="" xmlns:a16="http://schemas.microsoft.com/office/drawing/2014/main" id="{22B40C78-6F20-4C95-AB26-B29FEC0FF747}"/>
+                  <a16:creationId xmlns:a16="http://schemas.microsoft.com/office/drawing/2014/main" xmlns="" id="{22B40C78-6F20-4C95-AB26-B29FEC0FF747}"/>
                 </a:ext>
               </a:extLst>
             </p:cNvPr>
@@ -16114,7 +16114,7 @@
             <p:cNvPr id="13" name="Rectangle 12">
               <a:extLst>
                 <a:ext uri="{FF2B5EF4-FFF2-40B4-BE49-F238E27FC236}">
-                  <a16:creationId xmlns="" xmlns:a16="http://schemas.microsoft.com/office/drawing/2014/main" id="{1AED4E7D-39CE-49AE-9D4C-16EA940CBE5F}"/>
+                  <a16:creationId xmlns:a16="http://schemas.microsoft.com/office/drawing/2014/main" xmlns="" id="{1AED4E7D-39CE-49AE-9D4C-16EA940CBE5F}"/>
                 </a:ext>
               </a:extLst>
             </p:cNvPr>
@@ -16175,7 +16175,7 @@
           <p:cNvPr id="5" name="Groupe 4">
             <a:extLst>
               <a:ext uri="{FF2B5EF4-FFF2-40B4-BE49-F238E27FC236}">
-                <a16:creationId xmlns="" xmlns:a16="http://schemas.microsoft.com/office/drawing/2014/main" id="{CC6ACEFF-8651-4C08-BAF6-3BFAE6473DAF}"/>
+                <a16:creationId xmlns:a16="http://schemas.microsoft.com/office/drawing/2014/main" xmlns="" id="{CC6ACEFF-8651-4C08-BAF6-3BFAE6473DAF}"/>
               </a:ext>
             </a:extLst>
           </p:cNvPr>
@@ -16195,7 +16195,7 @@
             <p:cNvPr id="16" name="Rectangle 15">
               <a:extLst>
                 <a:ext uri="{FF2B5EF4-FFF2-40B4-BE49-F238E27FC236}">
-                  <a16:creationId xmlns="" xmlns:a16="http://schemas.microsoft.com/office/drawing/2014/main" id="{D27E2B2B-AB85-4173-AB1F-61084925AA83}"/>
+                  <a16:creationId xmlns:a16="http://schemas.microsoft.com/office/drawing/2014/main" xmlns="" id="{D27E2B2B-AB85-4173-AB1F-61084925AA83}"/>
                 </a:ext>
               </a:extLst>
             </p:cNvPr>
@@ -16255,7 +16255,7 @@
             <p:cNvPr id="17" name="Rectangle 16">
               <a:extLst>
                 <a:ext uri="{FF2B5EF4-FFF2-40B4-BE49-F238E27FC236}">
-                  <a16:creationId xmlns="" xmlns:a16="http://schemas.microsoft.com/office/drawing/2014/main" id="{0DDEBD8A-CA0B-4D62-9426-DFB2D4742184}"/>
+                  <a16:creationId xmlns:a16="http://schemas.microsoft.com/office/drawing/2014/main" xmlns="" id="{0DDEBD8A-CA0B-4D62-9426-DFB2D4742184}"/>
                 </a:ext>
               </a:extLst>
             </p:cNvPr>
@@ -16315,7 +16315,7 @@
             <p:cNvPr id="18" name="Rectangle 17">
               <a:extLst>
                 <a:ext uri="{FF2B5EF4-FFF2-40B4-BE49-F238E27FC236}">
-                  <a16:creationId xmlns="" xmlns:a16="http://schemas.microsoft.com/office/drawing/2014/main" id="{65515214-3AFD-4A2B-95C5-2FDFF59A1BE2}"/>
+                  <a16:creationId xmlns:a16="http://schemas.microsoft.com/office/drawing/2014/main" xmlns="" id="{65515214-3AFD-4A2B-95C5-2FDFF59A1BE2}"/>
                 </a:ext>
               </a:extLst>
             </p:cNvPr>
@@ -16375,7 +16375,7 @@
             <p:cNvPr id="19" name="Rectangle 18">
               <a:extLst>
                 <a:ext uri="{FF2B5EF4-FFF2-40B4-BE49-F238E27FC236}">
-                  <a16:creationId xmlns="" xmlns:a16="http://schemas.microsoft.com/office/drawing/2014/main" id="{D674829A-E5EF-4140-B9ED-AC7745AB028D}"/>
+                  <a16:creationId xmlns:a16="http://schemas.microsoft.com/office/drawing/2014/main" xmlns="" id="{D674829A-E5EF-4140-B9ED-AC7745AB028D}"/>
                 </a:ext>
               </a:extLst>
             </p:cNvPr>
@@ -16435,7 +16435,7 @@
             <p:cNvPr id="20" name="Rectangle 19">
               <a:extLst>
                 <a:ext uri="{FF2B5EF4-FFF2-40B4-BE49-F238E27FC236}">
-                  <a16:creationId xmlns="" xmlns:a16="http://schemas.microsoft.com/office/drawing/2014/main" id="{E59B3FCE-0262-45FE-BE39-9459C5BC7FEE}"/>
+                  <a16:creationId xmlns:a16="http://schemas.microsoft.com/office/drawing/2014/main" xmlns="" id="{E59B3FCE-0262-45FE-BE39-9459C5BC7FEE}"/>
                 </a:ext>
               </a:extLst>
             </p:cNvPr>
@@ -16495,7 +16495,7 @@
             <p:cNvPr id="22" name="Rectangle 21">
               <a:extLst>
                 <a:ext uri="{FF2B5EF4-FFF2-40B4-BE49-F238E27FC236}">
-                  <a16:creationId xmlns="" xmlns:a16="http://schemas.microsoft.com/office/drawing/2014/main" id="{F5D692DE-D6DE-4022-9F2F-5F8C1403E4D0}"/>
+                  <a16:creationId xmlns:a16="http://schemas.microsoft.com/office/drawing/2014/main" xmlns="" id="{F5D692DE-D6DE-4022-9F2F-5F8C1403E4D0}"/>
                 </a:ext>
               </a:extLst>
             </p:cNvPr>
@@ -16555,7 +16555,7 @@
             <p:cNvPr id="23" name="Rectangle 22">
               <a:extLst>
                 <a:ext uri="{FF2B5EF4-FFF2-40B4-BE49-F238E27FC236}">
-                  <a16:creationId xmlns="" xmlns:a16="http://schemas.microsoft.com/office/drawing/2014/main" id="{35EEF2F0-E01D-4851-96E7-30214EC78A3B}"/>
+                  <a16:creationId xmlns:a16="http://schemas.microsoft.com/office/drawing/2014/main" xmlns="" id="{35EEF2F0-E01D-4851-96E7-30214EC78A3B}"/>
                 </a:ext>
               </a:extLst>
             </p:cNvPr>
@@ -16615,7 +16615,7 @@
             <p:cNvPr id="24" name="Rectangle 23">
               <a:extLst>
                 <a:ext uri="{FF2B5EF4-FFF2-40B4-BE49-F238E27FC236}">
-                  <a16:creationId xmlns="" xmlns:a16="http://schemas.microsoft.com/office/drawing/2014/main" id="{468B1DDD-74B0-4453-A996-5BA8693FF545}"/>
+                  <a16:creationId xmlns:a16="http://schemas.microsoft.com/office/drawing/2014/main" xmlns="" id="{468B1DDD-74B0-4453-A996-5BA8693FF545}"/>
                 </a:ext>
               </a:extLst>
             </p:cNvPr>
@@ -16675,7 +16675,7 @@
             <p:cNvPr id="25" name="Rectangle 24">
               <a:extLst>
                 <a:ext uri="{FF2B5EF4-FFF2-40B4-BE49-F238E27FC236}">
-                  <a16:creationId xmlns="" xmlns:a16="http://schemas.microsoft.com/office/drawing/2014/main" id="{8809D5E9-1B2A-4D30-A4DD-47B7C9BBCEDC}"/>
+                  <a16:creationId xmlns:a16="http://schemas.microsoft.com/office/drawing/2014/main" xmlns="" id="{8809D5E9-1B2A-4D30-A4DD-47B7C9BBCEDC}"/>
                 </a:ext>
               </a:extLst>
             </p:cNvPr>
@@ -16735,7 +16735,7 @@
             <p:cNvPr id="26" name="Rectangle 25">
               <a:extLst>
                 <a:ext uri="{FF2B5EF4-FFF2-40B4-BE49-F238E27FC236}">
-                  <a16:creationId xmlns="" xmlns:a16="http://schemas.microsoft.com/office/drawing/2014/main" id="{995FF3A0-94CA-40BA-AF81-B777FF5FD489}"/>
+                  <a16:creationId xmlns:a16="http://schemas.microsoft.com/office/drawing/2014/main" xmlns="" id="{995FF3A0-94CA-40BA-AF81-B777FF5FD489}"/>
                 </a:ext>
               </a:extLst>
             </p:cNvPr>
@@ -16795,7 +16795,7 @@
             <p:cNvPr id="27" name="Rectangle 26">
               <a:extLst>
                 <a:ext uri="{FF2B5EF4-FFF2-40B4-BE49-F238E27FC236}">
-                  <a16:creationId xmlns="" xmlns:a16="http://schemas.microsoft.com/office/drawing/2014/main" id="{9F83F12C-5135-43B7-B1D8-A0A72DB85AED}"/>
+                  <a16:creationId xmlns:a16="http://schemas.microsoft.com/office/drawing/2014/main" xmlns="" id="{9F83F12C-5135-43B7-B1D8-A0A72DB85AED}"/>
                 </a:ext>
               </a:extLst>
             </p:cNvPr>
@@ -16855,7 +16855,7 @@
             <p:cNvPr id="28" name="Rectangle 27">
               <a:extLst>
                 <a:ext uri="{FF2B5EF4-FFF2-40B4-BE49-F238E27FC236}">
-                  <a16:creationId xmlns="" xmlns:a16="http://schemas.microsoft.com/office/drawing/2014/main" id="{256CA1CF-2C4A-42DA-94F5-CB5E5B47F24B}"/>
+                  <a16:creationId xmlns:a16="http://schemas.microsoft.com/office/drawing/2014/main" xmlns="" id="{256CA1CF-2C4A-42DA-94F5-CB5E5B47F24B}"/>
                 </a:ext>
               </a:extLst>
             </p:cNvPr>
@@ -16915,7 +16915,7 @@
             <p:cNvPr id="29" name="Rectangle 28">
               <a:extLst>
                 <a:ext uri="{FF2B5EF4-FFF2-40B4-BE49-F238E27FC236}">
-                  <a16:creationId xmlns="" xmlns:a16="http://schemas.microsoft.com/office/drawing/2014/main" id="{47F07AFA-8569-4B3B-854A-60B26629D96D}"/>
+                  <a16:creationId xmlns:a16="http://schemas.microsoft.com/office/drawing/2014/main" xmlns="" id="{47F07AFA-8569-4B3B-854A-60B26629D96D}"/>
                 </a:ext>
               </a:extLst>
             </p:cNvPr>
@@ -16975,7 +16975,7 @@
             <p:cNvPr id="30" name="Rectangle 29">
               <a:extLst>
                 <a:ext uri="{FF2B5EF4-FFF2-40B4-BE49-F238E27FC236}">
-                  <a16:creationId xmlns="" xmlns:a16="http://schemas.microsoft.com/office/drawing/2014/main" id="{8103554C-8B73-4C9A-AFFF-55D6E47A0E76}"/>
+                  <a16:creationId xmlns:a16="http://schemas.microsoft.com/office/drawing/2014/main" xmlns="" id="{8103554C-8B73-4C9A-AFFF-55D6E47A0E76}"/>
                 </a:ext>
               </a:extLst>
             </p:cNvPr>
@@ -17360,7 +17360,7 @@
   </p:txStyles>
   <p:extLst mod="1">
     <p:ext uri="{27BBF7A9-308A-43DC-89C8-2F10F3537804}">
-      <p15:sldGuideLst xmlns="" xmlns:p15="http://schemas.microsoft.com/office/powerpoint/2012/main">
+      <p15:sldGuideLst xmlns:p15="http://schemas.microsoft.com/office/powerpoint/2012/main" xmlns="">
         <p15:guide id="1" orient="horz" pos="709">
           <p15:clr>
             <a:srgbClr val="F26B43"/>
@@ -17453,7 +17453,7 @@
           <p:cNvPr id="2" name="Freeform 5">
             <a:extLst>
               <a:ext uri="{FF2B5EF4-FFF2-40B4-BE49-F238E27FC236}">
-                <a16:creationId xmlns="" xmlns:a16="http://schemas.microsoft.com/office/drawing/2014/main" id="{097E2B3C-7165-47CD-8F90-29BD547B5A2B}"/>
+                <a16:creationId xmlns:a16="http://schemas.microsoft.com/office/drawing/2014/main" xmlns="" id="{097E2B3C-7165-47CD-8F90-29BD547B5A2B}"/>
               </a:ext>
             </a:extLst>
           </p:cNvPr>
@@ -17566,7 +17566,7 @@
           <p:cNvPr id="7" name="Espace réservé du texte 1">
             <a:extLst>
               <a:ext uri="{FF2B5EF4-FFF2-40B4-BE49-F238E27FC236}">
-                <a16:creationId xmlns="" xmlns:a16="http://schemas.microsoft.com/office/drawing/2014/main" id="{3E61A40D-4439-4E82-955B-FC636EF3CC80}"/>
+                <a16:creationId xmlns:a16="http://schemas.microsoft.com/office/drawing/2014/main" xmlns="" id="{3E61A40D-4439-4E82-955B-FC636EF3CC80}"/>
               </a:ext>
             </a:extLst>
           </p:cNvPr>
@@ -17808,7 +17808,7 @@
           <p:cNvPr id="8" name="Sous-titre 2">
             <a:extLst>
               <a:ext uri="{FF2B5EF4-FFF2-40B4-BE49-F238E27FC236}">
-                <a16:creationId xmlns="" xmlns:a16="http://schemas.microsoft.com/office/drawing/2014/main" id="{259864C7-43B5-4E4E-B76F-BA3BD78F03AA}"/>
+                <a16:creationId xmlns:a16="http://schemas.microsoft.com/office/drawing/2014/main" xmlns="" id="{259864C7-43B5-4E4E-B76F-BA3BD78F03AA}"/>
               </a:ext>
             </a:extLst>
           </p:cNvPr>
@@ -18188,7 +18188,7 @@
           <p:cNvPr id="13" name="Espace réservé du texte 1">
             <a:extLst>
               <a:ext uri="{FF2B5EF4-FFF2-40B4-BE49-F238E27FC236}">
-                <a16:creationId xmlns="" xmlns:a16="http://schemas.microsoft.com/office/drawing/2014/main" id="{3E61A40D-4439-4E82-955B-FC636EF3CC80}"/>
+                <a16:creationId xmlns:a16="http://schemas.microsoft.com/office/drawing/2014/main" xmlns="" id="{3E61A40D-4439-4E82-955B-FC636EF3CC80}"/>
               </a:ext>
             </a:extLst>
           </p:cNvPr>
@@ -18816,7 +18816,7 @@
         <p:spPr>
           <a:xfrm>
             <a:off x="683568" y="1491630"/>
-            <a:ext cx="6840760" cy="1077218"/>
+            <a:ext cx="6840760" cy="1631216"/>
           </a:xfrm>
           <a:prstGeom prst="rect">
             <a:avLst/>
@@ -18834,8 +18834,8 @@
               <a:buAutoNum type="arabicPeriod"/>
             </a:pPr>
             <a:r>
-              <a:rPr lang="es-ES" dirty="0"/>
-              <a:t>Variables y operaciones lógicas</a:t>
+              <a:rPr lang="es-ES" dirty="0" smtClean="0"/>
+              <a:t>Asignar valores a variables</a:t>
             </a:r>
           </a:p>
           <a:p>
@@ -18844,8 +18844,12 @@
               <a:buAutoNum type="arabicPeriod"/>
             </a:pPr>
             <a:r>
+              <a:rPr lang="es-ES" dirty="0" smtClean="0"/>
+              <a:t>Variables </a:t>
+            </a:r>
+            <a:r>
               <a:rPr lang="es-ES" dirty="0"/>
-              <a:t>Variables y operaciones numéricas</a:t>
+              <a:t>y operaciones numéricas</a:t>
             </a:r>
           </a:p>
           <a:p>
@@ -18855,8 +18859,29 @@
             </a:pPr>
             <a:r>
               <a:rPr lang="es-ES" dirty="0"/>
-              <a:t>Variables y operaciones con cadenas</a:t>
-            </a:r>
+              <a:t>Variables y operaciones con </a:t>
+            </a:r>
+            <a:r>
+              <a:rPr lang="es-ES" dirty="0" smtClean="0"/>
+              <a:t>cadenas</a:t>
+            </a:r>
+          </a:p>
+          <a:p>
+            <a:pPr marL="799910" lvl="1" indent="-342900">
+              <a:buFont typeface="+mj-lt"/>
+              <a:buAutoNum type="arabicPeriod"/>
+            </a:pPr>
+            <a:r>
+              <a:rPr lang="es-ES" dirty="0"/>
+              <a:t>Variables y operaciones lógicas</a:t>
+            </a:r>
+          </a:p>
+          <a:p>
+            <a:pPr marL="799910" lvl="1" indent="-342900">
+              <a:buFont typeface="+mj-lt"/>
+              <a:buAutoNum type="arabicPeriod"/>
+            </a:pPr>
+            <a:endParaRPr lang="es-ES" dirty="0"/>
           </a:p>
           <a:p>
             <a:pPr marL="171450" indent="-171450">
@@ -19303,7 +19328,7 @@
   <a:extraClrSchemeLst/>
   <a:extLst>
     <a:ext uri="{05A4C25C-085E-4340-85A3-A5531E510DB2}">
-      <thm15:themeFamily xmlns="" xmlns:thm15="http://schemas.microsoft.com/office/thememl/2012/main" name="Presentación1" id="{052EE8AA-76EF-4748-835F-A6D187923361}" vid="{370F8B8F-388E-40AB-AD36-3D6D6E70E5A2}"/>
+      <thm15:themeFamily xmlns:thm15="http://schemas.microsoft.com/office/thememl/2012/main" xmlns="" name="Presentación1" id="{052EE8AA-76EF-4748-835F-A6D187923361}" vid="{370F8B8F-388E-40AB-AD36-3D6D6E70E5A2}"/>
     </a:ext>
   </a:extLst>
 </a:theme>
@@ -19504,7 +19529,7 @@
   <a:extraClrSchemeLst/>
   <a:extLst>
     <a:ext uri="{05A4C25C-085E-4340-85A3-A5531E510DB2}">
-      <thm15:themeFamily xmlns="" xmlns:thm15="http://schemas.microsoft.com/office/thememl/2012/main" name="Presentación1" id="{052EE8AA-76EF-4748-835F-A6D187923361}" vid="{370F8B8F-388E-40AB-AD36-3D6D6E70E5A2}"/>
+      <thm15:themeFamily xmlns:thm15="http://schemas.microsoft.com/office/thememl/2012/main" xmlns="" name="Presentación1" id="{052EE8AA-76EF-4748-835F-A6D187923361}" vid="{370F8B8F-388E-40AB-AD36-3D6D6E70E5A2}"/>
     </a:ext>
   </a:extLst>
 </a:theme>

</xml_diff>

<commit_message>
Terminada variables numéricas y añadida cadenas
</commit_message>
<xml_diff>
--- a/presentaciones/02-TiposBasicosSintaxisFunciones.pptx
+++ b/presentaciones/02-TiposBasicosSintaxisFunciones.pptx
@@ -196,7 +196,7 @@
           <a:p>
             <a:fld id="{99EBDB7E-22A8-4EDB-9E23-57D60215A7DB}" type="datetimeFigureOut">
               <a:rPr lang="es-ES" smtClean="0"/>
-              <a:t>15/05/2021</a:t>
+              <a:t>16/05/2021</a:t>
             </a:fld>
             <a:endParaRPr lang="es-ES"/>
           </a:p>
@@ -611,7 +611,7 @@
           <a:graphicData uri="http://schemas.openxmlformats.org/presentationml/2006/ole">
             <mc:AlternateContent xmlns:mc="http://schemas.openxmlformats.org/markup-compatibility/2006">
               <mc:Choice xmlns:v="urn:schemas-microsoft-com:vml" Requires="v">
-                <p:oleObj spid="_x0000_s12340" name="think-cell Slide" r:id="rId4" imgW="270" imgH="270" progId="TCLayout.ActiveDocument.1">
+                <p:oleObj spid="_x0000_s12341" name="think-cell Slide" r:id="rId4" imgW="270" imgH="270" progId="TCLayout.ActiveDocument.1">
                   <p:embed/>
                 </p:oleObj>
               </mc:Choice>
@@ -1333,7 +1333,7 @@
           <p:cNvPr id="24" name="Rectangle 57">
             <a:extLst>
               <a:ext uri="{FF2B5EF4-FFF2-40B4-BE49-F238E27FC236}">
-                <a16:creationId xmlns:a16="http://schemas.microsoft.com/office/drawing/2014/main" xmlns="" id="{E84F61DF-65CA-45BF-9A0B-34B97F6A97EA}"/>
+                <a16:creationId xmlns="" xmlns:a16="http://schemas.microsoft.com/office/drawing/2014/main" id="{E84F61DF-65CA-45BF-9A0B-34B97F6A97EA}"/>
               </a:ext>
             </a:extLst>
           </p:cNvPr>
@@ -1434,7 +1434,7 @@
           <p:cNvPr id="20" name="Text Placeholder 7">
             <a:extLst>
               <a:ext uri="{FF2B5EF4-FFF2-40B4-BE49-F238E27FC236}">
-                <a16:creationId xmlns:a16="http://schemas.microsoft.com/office/drawing/2014/main" xmlns="" id="{27CE2609-37DA-4C4C-BF45-E56CE85AA41D}"/>
+                <a16:creationId xmlns="" xmlns:a16="http://schemas.microsoft.com/office/drawing/2014/main" id="{27CE2609-37DA-4C4C-BF45-E56CE85AA41D}"/>
               </a:ext>
             </a:extLst>
           </p:cNvPr>
@@ -1556,7 +1556,7 @@
           <p:cNvPr id="29" name="Text Placeholder 7">
             <a:extLst>
               <a:ext uri="{FF2B5EF4-FFF2-40B4-BE49-F238E27FC236}">
-                <a16:creationId xmlns:a16="http://schemas.microsoft.com/office/drawing/2014/main" xmlns="" id="{27CE2609-37DA-4C4C-BF45-E56CE85AA41D}"/>
+                <a16:creationId xmlns="" xmlns:a16="http://schemas.microsoft.com/office/drawing/2014/main" id="{27CE2609-37DA-4C4C-BF45-E56CE85AA41D}"/>
               </a:ext>
             </a:extLst>
           </p:cNvPr>
@@ -1678,7 +1678,7 @@
           <p:cNvPr id="30" name="Text Placeholder 7">
             <a:extLst>
               <a:ext uri="{FF2B5EF4-FFF2-40B4-BE49-F238E27FC236}">
-                <a16:creationId xmlns:a16="http://schemas.microsoft.com/office/drawing/2014/main" xmlns="" id="{27CE2609-37DA-4C4C-BF45-E56CE85AA41D}"/>
+                <a16:creationId xmlns="" xmlns:a16="http://schemas.microsoft.com/office/drawing/2014/main" id="{27CE2609-37DA-4C4C-BF45-E56CE85AA41D}"/>
               </a:ext>
             </a:extLst>
           </p:cNvPr>
@@ -2101,7 +2101,7 @@
           <p:cNvPr id="8" name="Text Placeholder 7">
             <a:extLst>
               <a:ext uri="{FF2B5EF4-FFF2-40B4-BE49-F238E27FC236}">
-                <a16:creationId xmlns:a16="http://schemas.microsoft.com/office/drawing/2014/main" xmlns="" id="{27CE2609-37DA-4C4C-BF45-E56CE85AA41D}"/>
+                <a16:creationId xmlns="" xmlns:a16="http://schemas.microsoft.com/office/drawing/2014/main" id="{27CE2609-37DA-4C4C-BF45-E56CE85AA41D}"/>
               </a:ext>
             </a:extLst>
           </p:cNvPr>
@@ -2215,7 +2215,7 @@
           <p:cNvPr id="13" name="Text Placeholder 7">
             <a:extLst>
               <a:ext uri="{FF2B5EF4-FFF2-40B4-BE49-F238E27FC236}">
-                <a16:creationId xmlns:a16="http://schemas.microsoft.com/office/drawing/2014/main" xmlns="" id="{D8D7F005-BA7C-423E-87B0-6782D88233F6}"/>
+                <a16:creationId xmlns="" xmlns:a16="http://schemas.microsoft.com/office/drawing/2014/main" id="{D8D7F005-BA7C-423E-87B0-6782D88233F6}"/>
               </a:ext>
             </a:extLst>
           </p:cNvPr>
@@ -2289,7 +2289,7 @@
           <p:cNvPr id="14" name="Text Placeholder 7">
             <a:extLst>
               <a:ext uri="{FF2B5EF4-FFF2-40B4-BE49-F238E27FC236}">
-                <a16:creationId xmlns:a16="http://schemas.microsoft.com/office/drawing/2014/main" xmlns="" id="{47BDC0DA-1585-454D-9E74-41D2AFC0FEE5}"/>
+                <a16:creationId xmlns="" xmlns:a16="http://schemas.microsoft.com/office/drawing/2014/main" id="{47BDC0DA-1585-454D-9E74-41D2AFC0FEE5}"/>
               </a:ext>
             </a:extLst>
           </p:cNvPr>
@@ -2391,7 +2391,7 @@
           <p:cNvPr id="16" name="Text Placeholder 7">
             <a:extLst>
               <a:ext uri="{FF2B5EF4-FFF2-40B4-BE49-F238E27FC236}">
-                <a16:creationId xmlns:a16="http://schemas.microsoft.com/office/drawing/2014/main" xmlns="" id="{27CE2609-37DA-4C4C-BF45-E56CE85AA41D}"/>
+                <a16:creationId xmlns="" xmlns:a16="http://schemas.microsoft.com/office/drawing/2014/main" id="{27CE2609-37DA-4C4C-BF45-E56CE85AA41D}"/>
               </a:ext>
             </a:extLst>
           </p:cNvPr>
@@ -2558,7 +2558,7 @@
           <p:cNvPr id="3" name="Text Placeholder 7">
             <a:extLst>
               <a:ext uri="{FF2B5EF4-FFF2-40B4-BE49-F238E27FC236}">
-                <a16:creationId xmlns:a16="http://schemas.microsoft.com/office/drawing/2014/main" xmlns="" id="{27CE2609-37DA-4C4C-BF45-E56CE85AA41D}"/>
+                <a16:creationId xmlns="" xmlns:a16="http://schemas.microsoft.com/office/drawing/2014/main" id="{27CE2609-37DA-4C4C-BF45-E56CE85AA41D}"/>
               </a:ext>
             </a:extLst>
           </p:cNvPr>
@@ -2672,7 +2672,7 @@
           <p:cNvPr id="4" name="Text Placeholder 7">
             <a:extLst>
               <a:ext uri="{FF2B5EF4-FFF2-40B4-BE49-F238E27FC236}">
-                <a16:creationId xmlns:a16="http://schemas.microsoft.com/office/drawing/2014/main" xmlns="" id="{D8D7F005-BA7C-423E-87B0-6782D88233F6}"/>
+                <a16:creationId xmlns="" xmlns:a16="http://schemas.microsoft.com/office/drawing/2014/main" id="{D8D7F005-BA7C-423E-87B0-6782D88233F6}"/>
               </a:ext>
             </a:extLst>
           </p:cNvPr>
@@ -2758,7 +2758,7 @@
           <p:cNvPr id="9" name="Text Placeholder 7">
             <a:extLst>
               <a:ext uri="{FF2B5EF4-FFF2-40B4-BE49-F238E27FC236}">
-                <a16:creationId xmlns:a16="http://schemas.microsoft.com/office/drawing/2014/main" xmlns="" id="{27CE2609-37DA-4C4C-BF45-E56CE85AA41D}"/>
+                <a16:creationId xmlns="" xmlns:a16="http://schemas.microsoft.com/office/drawing/2014/main" id="{27CE2609-37DA-4C4C-BF45-E56CE85AA41D}"/>
               </a:ext>
             </a:extLst>
           </p:cNvPr>
@@ -2872,7 +2872,7 @@
           <p:cNvPr id="10" name="Text Placeholder 7">
             <a:extLst>
               <a:ext uri="{FF2B5EF4-FFF2-40B4-BE49-F238E27FC236}">
-                <a16:creationId xmlns:a16="http://schemas.microsoft.com/office/drawing/2014/main" xmlns="" id="{D8D7F005-BA7C-423E-87B0-6782D88233F6}"/>
+                <a16:creationId xmlns="" xmlns:a16="http://schemas.microsoft.com/office/drawing/2014/main" id="{D8D7F005-BA7C-423E-87B0-6782D88233F6}"/>
               </a:ext>
             </a:extLst>
           </p:cNvPr>
@@ -2958,7 +2958,7 @@
           <p:cNvPr id="11" name="Text Placeholder 7">
             <a:extLst>
               <a:ext uri="{FF2B5EF4-FFF2-40B4-BE49-F238E27FC236}">
-                <a16:creationId xmlns:a16="http://schemas.microsoft.com/office/drawing/2014/main" xmlns="" id="{27CE2609-37DA-4C4C-BF45-E56CE85AA41D}"/>
+                <a16:creationId xmlns="" xmlns:a16="http://schemas.microsoft.com/office/drawing/2014/main" id="{27CE2609-37DA-4C4C-BF45-E56CE85AA41D}"/>
               </a:ext>
             </a:extLst>
           </p:cNvPr>
@@ -3072,7 +3072,7 @@
           <p:cNvPr id="12" name="Text Placeholder 7">
             <a:extLst>
               <a:ext uri="{FF2B5EF4-FFF2-40B4-BE49-F238E27FC236}">
-                <a16:creationId xmlns:a16="http://schemas.microsoft.com/office/drawing/2014/main" xmlns="" id="{D8D7F005-BA7C-423E-87B0-6782D88233F6}"/>
+                <a16:creationId xmlns="" xmlns:a16="http://schemas.microsoft.com/office/drawing/2014/main" id="{D8D7F005-BA7C-423E-87B0-6782D88233F6}"/>
               </a:ext>
             </a:extLst>
           </p:cNvPr>
@@ -3203,7 +3203,7 @@
           <a:graphicData uri="http://schemas.openxmlformats.org/presentationml/2006/ole">
             <mc:AlternateContent xmlns:mc="http://schemas.openxmlformats.org/markup-compatibility/2006">
               <mc:Choice xmlns:v="urn:schemas-microsoft-com:vml" Requires="v">
-                <p:oleObj spid="_x0000_s14383" name="think-cell Slide" r:id="rId4" imgW="270" imgH="270" progId="TCLayout.ActiveDocument.1">
+                <p:oleObj spid="_x0000_s14384" name="think-cell Slide" r:id="rId4" imgW="270" imgH="270" progId="TCLayout.ActiveDocument.1">
                   <p:embed/>
                 </p:oleObj>
               </mc:Choice>
@@ -3671,7 +3671,7 @@
           <p:cNvPr id="12" name="Freeform: Shape 11">
             <a:extLst>
               <a:ext uri="{FF2B5EF4-FFF2-40B4-BE49-F238E27FC236}">
-                <a16:creationId xmlns:a16="http://schemas.microsoft.com/office/drawing/2014/main" xmlns="" id="{F5F5AEA1-6A77-4676-B8B3-EF658F5F8430}"/>
+                <a16:creationId xmlns="" xmlns:a16="http://schemas.microsoft.com/office/drawing/2014/main" id="{F5F5AEA1-6A77-4676-B8B3-EF658F5F8430}"/>
               </a:ext>
             </a:extLst>
           </p:cNvPr>
@@ -3864,7 +3864,7 @@
           <p:cNvPr id="26" name="Text Placeholder 4">
             <a:extLst>
               <a:ext uri="{FF2B5EF4-FFF2-40B4-BE49-F238E27FC236}">
-                <a16:creationId xmlns:a16="http://schemas.microsoft.com/office/drawing/2014/main" xmlns="" id="{7E551D69-F21D-4601-B4BD-97ECB52F39D6}"/>
+                <a16:creationId xmlns="" xmlns:a16="http://schemas.microsoft.com/office/drawing/2014/main" id="{7E551D69-F21D-4601-B4BD-97ECB52F39D6}"/>
               </a:ext>
             </a:extLst>
           </p:cNvPr>
@@ -3924,7 +3924,7 @@
           <p:cNvPr id="23" name="Text Placeholder 4">
             <a:extLst>
               <a:ext uri="{FF2B5EF4-FFF2-40B4-BE49-F238E27FC236}">
-                <a16:creationId xmlns:a16="http://schemas.microsoft.com/office/drawing/2014/main" xmlns="" id="{BC359575-5CC3-4B2F-91E7-19D6A150BE7B}"/>
+                <a16:creationId xmlns="" xmlns:a16="http://schemas.microsoft.com/office/drawing/2014/main" id="{BC359575-5CC3-4B2F-91E7-19D6A150BE7B}"/>
               </a:ext>
             </a:extLst>
           </p:cNvPr>
@@ -3984,7 +3984,7 @@
           <p:cNvPr id="24" name="Text Placeholder 7">
             <a:extLst>
               <a:ext uri="{FF2B5EF4-FFF2-40B4-BE49-F238E27FC236}">
-                <a16:creationId xmlns:a16="http://schemas.microsoft.com/office/drawing/2014/main" xmlns="" id="{53745724-67BB-4475-9660-FEEE12268615}"/>
+                <a16:creationId xmlns="" xmlns:a16="http://schemas.microsoft.com/office/drawing/2014/main" id="{53745724-67BB-4475-9660-FEEE12268615}"/>
               </a:ext>
             </a:extLst>
           </p:cNvPr>
@@ -4058,7 +4058,7 @@
           <p:cNvPr id="27" name="Text Placeholder 7">
             <a:extLst>
               <a:ext uri="{FF2B5EF4-FFF2-40B4-BE49-F238E27FC236}">
-                <a16:creationId xmlns:a16="http://schemas.microsoft.com/office/drawing/2014/main" xmlns="" id="{C78431F2-3F85-4748-A6BC-A08250A6D354}"/>
+                <a16:creationId xmlns="" xmlns:a16="http://schemas.microsoft.com/office/drawing/2014/main" id="{C78431F2-3F85-4748-A6BC-A08250A6D354}"/>
               </a:ext>
             </a:extLst>
           </p:cNvPr>
@@ -4132,7 +4132,7 @@
           <p:cNvPr id="13" name="Oval 20">
             <a:extLst>
               <a:ext uri="{FF2B5EF4-FFF2-40B4-BE49-F238E27FC236}">
-                <a16:creationId xmlns:a16="http://schemas.microsoft.com/office/drawing/2014/main" xmlns="" id="{1EFB3510-D39A-47CF-8191-109DDF9E53D5}"/>
+                <a16:creationId xmlns="" xmlns:a16="http://schemas.microsoft.com/office/drawing/2014/main" id="{1EFB3510-D39A-47CF-8191-109DDF9E53D5}"/>
               </a:ext>
             </a:extLst>
           </p:cNvPr>
@@ -4392,7 +4392,7 @@
           <a:graphicData uri="http://schemas.openxmlformats.org/presentationml/2006/ole">
             <mc:AlternateContent xmlns:mc="http://schemas.openxmlformats.org/markup-compatibility/2006">
               <mc:Choice xmlns:v="urn:schemas-microsoft-com:vml" Requires="v">
-                <p:oleObj spid="_x0000_s15407" name="think-cell Slide" r:id="rId4" imgW="270" imgH="270" progId="TCLayout.ActiveDocument.1">
+                <p:oleObj spid="_x0000_s15408" name="think-cell Slide" r:id="rId4" imgW="270" imgH="270" progId="TCLayout.ActiveDocument.1">
                   <p:embed/>
                 </p:oleObj>
               </mc:Choice>
@@ -4501,7 +4501,7 @@
           <p:cNvPr id="3" name="Freeform: Shape 9">
             <a:extLst>
               <a:ext uri="{FF2B5EF4-FFF2-40B4-BE49-F238E27FC236}">
-                <a16:creationId xmlns:a16="http://schemas.microsoft.com/office/drawing/2014/main" xmlns="" id="{531E77B6-0DD5-446F-A826-892DFC23D785}"/>
+                <a16:creationId xmlns="" xmlns:a16="http://schemas.microsoft.com/office/drawing/2014/main" id="{531E77B6-0DD5-446F-A826-892DFC23D785}"/>
               </a:ext>
             </a:extLst>
           </p:cNvPr>
@@ -4674,7 +4674,7 @@
           <p:cNvPr id="7" name="Retângulo 43">
             <a:extLst>
               <a:ext uri="{FF2B5EF4-FFF2-40B4-BE49-F238E27FC236}">
-                <a16:creationId xmlns:a16="http://schemas.microsoft.com/office/drawing/2014/main" xmlns="" id="{25FC8637-25BD-4C09-AF25-56B4243DAB3D}"/>
+                <a16:creationId xmlns="" xmlns:a16="http://schemas.microsoft.com/office/drawing/2014/main" id="{25FC8637-25BD-4C09-AF25-56B4243DAB3D}"/>
               </a:ext>
             </a:extLst>
           </p:cNvPr>
@@ -4725,7 +4725,7 @@
           <p:cNvPr id="8" name="Text Placeholder 7">
             <a:extLst>
               <a:ext uri="{FF2B5EF4-FFF2-40B4-BE49-F238E27FC236}">
-                <a16:creationId xmlns:a16="http://schemas.microsoft.com/office/drawing/2014/main" xmlns="" id="{E824319D-02CC-441E-87B5-E9D15DE8CA35}"/>
+                <a16:creationId xmlns="" xmlns:a16="http://schemas.microsoft.com/office/drawing/2014/main" id="{E824319D-02CC-441E-87B5-E9D15DE8CA35}"/>
               </a:ext>
             </a:extLst>
           </p:cNvPr>
@@ -5337,7 +5337,7 @@
           <a:graphicData uri="http://schemas.openxmlformats.org/presentationml/2006/ole">
             <mc:AlternateContent xmlns:mc="http://schemas.openxmlformats.org/markup-compatibility/2006">
               <mc:Choice xmlns:v="urn:schemas-microsoft-com:vml" Requires="v">
-                <p:oleObj spid="_x0000_s16431" name="think-cell Slide" r:id="rId4" imgW="270" imgH="270" progId="TCLayout.ActiveDocument.1">
+                <p:oleObj spid="_x0000_s16432" name="think-cell Slide" r:id="rId4" imgW="270" imgH="270" progId="TCLayout.ActiveDocument.1">
                   <p:embed/>
                 </p:oleObj>
               </mc:Choice>
@@ -5396,7 +5396,7 @@
           <p:cNvPr id="13" name="Rectangle 12">
             <a:extLst>
               <a:ext uri="{FF2B5EF4-FFF2-40B4-BE49-F238E27FC236}">
-                <a16:creationId xmlns:a16="http://schemas.microsoft.com/office/drawing/2014/main" xmlns="" id="{9455EBB8-DB3C-45D2-B02F-0B36A58E555B}"/>
+                <a16:creationId xmlns="" xmlns:a16="http://schemas.microsoft.com/office/drawing/2014/main" id="{9455EBB8-DB3C-45D2-B02F-0B36A58E555B}"/>
               </a:ext>
             </a:extLst>
           </p:cNvPr>
@@ -5686,7 +5686,7 @@
           <p:cNvPr id="14" name="Text Placeholder 7">
             <a:extLst>
               <a:ext uri="{FF2B5EF4-FFF2-40B4-BE49-F238E27FC236}">
-                <a16:creationId xmlns:a16="http://schemas.microsoft.com/office/drawing/2014/main" xmlns="" id="{9949BCD6-E419-4ED2-9061-402DD5FF2406}"/>
+                <a16:creationId xmlns="" xmlns:a16="http://schemas.microsoft.com/office/drawing/2014/main" id="{9949BCD6-E419-4ED2-9061-402DD5FF2406}"/>
               </a:ext>
             </a:extLst>
           </p:cNvPr>
@@ -5777,7 +5777,7 @@
           <p:cNvPr id="15" name="Text Placeholder 4">
             <a:extLst>
               <a:ext uri="{FF2B5EF4-FFF2-40B4-BE49-F238E27FC236}">
-                <a16:creationId xmlns:a16="http://schemas.microsoft.com/office/drawing/2014/main" xmlns="" id="{3F6EE60C-2261-45A0-AD6F-B5F767C57B57}"/>
+                <a16:creationId xmlns="" xmlns:a16="http://schemas.microsoft.com/office/drawing/2014/main" id="{3F6EE60C-2261-45A0-AD6F-B5F767C57B57}"/>
               </a:ext>
             </a:extLst>
           </p:cNvPr>
@@ -5837,7 +5837,7 @@
           <p:cNvPr id="16" name="Text Placeholder 7">
             <a:extLst>
               <a:ext uri="{FF2B5EF4-FFF2-40B4-BE49-F238E27FC236}">
-                <a16:creationId xmlns:a16="http://schemas.microsoft.com/office/drawing/2014/main" xmlns="" id="{ABE7F41D-73F9-4353-AE3F-71AB8377048D}"/>
+                <a16:creationId xmlns="" xmlns:a16="http://schemas.microsoft.com/office/drawing/2014/main" id="{ABE7F41D-73F9-4353-AE3F-71AB8377048D}"/>
               </a:ext>
             </a:extLst>
           </p:cNvPr>
@@ -5928,7 +5928,7 @@
           <p:cNvPr id="17" name="Text Placeholder 4">
             <a:extLst>
               <a:ext uri="{FF2B5EF4-FFF2-40B4-BE49-F238E27FC236}">
-                <a16:creationId xmlns:a16="http://schemas.microsoft.com/office/drawing/2014/main" xmlns="" id="{83D9B326-443F-495A-B788-21C48AC85AE2}"/>
+                <a16:creationId xmlns="" xmlns:a16="http://schemas.microsoft.com/office/drawing/2014/main" id="{83D9B326-443F-495A-B788-21C48AC85AE2}"/>
               </a:ext>
             </a:extLst>
           </p:cNvPr>
@@ -5988,7 +5988,7 @@
           <p:cNvPr id="18" name="Text Placeholder 7">
             <a:extLst>
               <a:ext uri="{FF2B5EF4-FFF2-40B4-BE49-F238E27FC236}">
-                <a16:creationId xmlns:a16="http://schemas.microsoft.com/office/drawing/2014/main" xmlns="" id="{00358894-025F-4D0E-AF6E-F99EDF29800A}"/>
+                <a16:creationId xmlns="" xmlns:a16="http://schemas.microsoft.com/office/drawing/2014/main" id="{00358894-025F-4D0E-AF6E-F99EDF29800A}"/>
               </a:ext>
             </a:extLst>
           </p:cNvPr>
@@ -6079,7 +6079,7 @@
           <p:cNvPr id="19" name="Text Placeholder 4">
             <a:extLst>
               <a:ext uri="{FF2B5EF4-FFF2-40B4-BE49-F238E27FC236}">
-                <a16:creationId xmlns:a16="http://schemas.microsoft.com/office/drawing/2014/main" xmlns="" id="{EE5AF299-5A92-48E3-B18F-F7FE7AB9EED4}"/>
+                <a16:creationId xmlns="" xmlns:a16="http://schemas.microsoft.com/office/drawing/2014/main" id="{EE5AF299-5A92-48E3-B18F-F7FE7AB9EED4}"/>
               </a:ext>
             </a:extLst>
           </p:cNvPr>
@@ -6139,7 +6139,7 @@
           <p:cNvPr id="20" name="Text Placeholder 7">
             <a:extLst>
               <a:ext uri="{FF2B5EF4-FFF2-40B4-BE49-F238E27FC236}">
-                <a16:creationId xmlns:a16="http://schemas.microsoft.com/office/drawing/2014/main" xmlns="" id="{F951F368-6540-4675-9A52-0824638E0EF4}"/>
+                <a16:creationId xmlns="" xmlns:a16="http://schemas.microsoft.com/office/drawing/2014/main" id="{F951F368-6540-4675-9A52-0824638E0EF4}"/>
               </a:ext>
             </a:extLst>
           </p:cNvPr>
@@ -6230,7 +6230,7 @@
           <p:cNvPr id="21" name="Text Placeholder 4">
             <a:extLst>
               <a:ext uri="{FF2B5EF4-FFF2-40B4-BE49-F238E27FC236}">
-                <a16:creationId xmlns:a16="http://schemas.microsoft.com/office/drawing/2014/main" xmlns="" id="{B7C16A20-D927-494E-94A9-49AF2E1FA010}"/>
+                <a16:creationId xmlns="" xmlns:a16="http://schemas.microsoft.com/office/drawing/2014/main" id="{B7C16A20-D927-494E-94A9-49AF2E1FA010}"/>
               </a:ext>
             </a:extLst>
           </p:cNvPr>
@@ -6290,7 +6290,7 @@
           <p:cNvPr id="22" name="Text Placeholder 4">
             <a:extLst>
               <a:ext uri="{FF2B5EF4-FFF2-40B4-BE49-F238E27FC236}">
-                <a16:creationId xmlns:a16="http://schemas.microsoft.com/office/drawing/2014/main" xmlns="" id="{936BACCD-6FBF-486E-81CB-3462560DA2CE}"/>
+                <a16:creationId xmlns="" xmlns:a16="http://schemas.microsoft.com/office/drawing/2014/main" id="{936BACCD-6FBF-486E-81CB-3462560DA2CE}"/>
               </a:ext>
             </a:extLst>
           </p:cNvPr>
@@ -6350,7 +6350,7 @@
           <p:cNvPr id="23" name="Text Placeholder 4">
             <a:extLst>
               <a:ext uri="{FF2B5EF4-FFF2-40B4-BE49-F238E27FC236}">
-                <a16:creationId xmlns:a16="http://schemas.microsoft.com/office/drawing/2014/main" xmlns="" id="{48E9C506-31EA-4D04-B660-3B4DB0704112}"/>
+                <a16:creationId xmlns="" xmlns:a16="http://schemas.microsoft.com/office/drawing/2014/main" id="{48E9C506-31EA-4D04-B660-3B4DB0704112}"/>
               </a:ext>
             </a:extLst>
           </p:cNvPr>
@@ -6609,7 +6609,7 @@
           <a:graphicData uri="http://schemas.openxmlformats.org/presentationml/2006/ole">
             <mc:AlternateContent xmlns:mc="http://schemas.openxmlformats.org/markup-compatibility/2006">
               <mc:Choice xmlns:v="urn:schemas-microsoft-com:vml" Requires="v">
-                <p:oleObj spid="_x0000_s17455" name="think-cell Slide" r:id="rId4" imgW="270" imgH="270" progId="TCLayout.ActiveDocument.1">
+                <p:oleObj spid="_x0000_s17456" name="think-cell Slide" r:id="rId4" imgW="270" imgH="270" progId="TCLayout.ActiveDocument.1">
                   <p:embed/>
                 </p:oleObj>
               </mc:Choice>
@@ -6736,7 +6736,7 @@
           <a:graphicData uri="http://schemas.openxmlformats.org/presentationml/2006/ole">
             <mc:AlternateContent xmlns:mc="http://schemas.openxmlformats.org/markup-compatibility/2006">
               <mc:Choice xmlns:v="urn:schemas-microsoft-com:vml" Requires="v">
-                <p:oleObj spid="_x0000_s18479" name="think-cell Slide" r:id="rId4" imgW="270" imgH="270" progId="TCLayout.ActiveDocument.1">
+                <p:oleObj spid="_x0000_s18480" name="think-cell Slide" r:id="rId4" imgW="270" imgH="270" progId="TCLayout.ActiveDocument.1">
                   <p:embed/>
                 </p:oleObj>
               </mc:Choice>
@@ -7281,7 +7281,7 @@
           <p:cNvPr id="24" name="Rectangle 57">
             <a:extLst>
               <a:ext uri="{FF2B5EF4-FFF2-40B4-BE49-F238E27FC236}">
-                <a16:creationId xmlns:a16="http://schemas.microsoft.com/office/drawing/2014/main" xmlns="" id="{E84F61DF-65CA-45BF-9A0B-34B97F6A97EA}"/>
+                <a16:creationId xmlns="" xmlns:a16="http://schemas.microsoft.com/office/drawing/2014/main" id="{E84F61DF-65CA-45BF-9A0B-34B97F6A97EA}"/>
               </a:ext>
             </a:extLst>
           </p:cNvPr>
@@ -7382,7 +7382,7 @@
           <p:cNvPr id="20" name="Text Placeholder 7">
             <a:extLst>
               <a:ext uri="{FF2B5EF4-FFF2-40B4-BE49-F238E27FC236}">
-                <a16:creationId xmlns:a16="http://schemas.microsoft.com/office/drawing/2014/main" xmlns="" id="{27CE2609-37DA-4C4C-BF45-E56CE85AA41D}"/>
+                <a16:creationId xmlns="" xmlns:a16="http://schemas.microsoft.com/office/drawing/2014/main" id="{27CE2609-37DA-4C4C-BF45-E56CE85AA41D}"/>
               </a:ext>
             </a:extLst>
           </p:cNvPr>
@@ -7504,7 +7504,7 @@
           <p:cNvPr id="29" name="Text Placeholder 7">
             <a:extLst>
               <a:ext uri="{FF2B5EF4-FFF2-40B4-BE49-F238E27FC236}">
-                <a16:creationId xmlns:a16="http://schemas.microsoft.com/office/drawing/2014/main" xmlns="" id="{27CE2609-37DA-4C4C-BF45-E56CE85AA41D}"/>
+                <a16:creationId xmlns="" xmlns:a16="http://schemas.microsoft.com/office/drawing/2014/main" id="{27CE2609-37DA-4C4C-BF45-E56CE85AA41D}"/>
               </a:ext>
             </a:extLst>
           </p:cNvPr>
@@ -7626,7 +7626,7 @@
           <p:cNvPr id="30" name="Text Placeholder 7">
             <a:extLst>
               <a:ext uri="{FF2B5EF4-FFF2-40B4-BE49-F238E27FC236}">
-                <a16:creationId xmlns:a16="http://schemas.microsoft.com/office/drawing/2014/main" xmlns="" id="{27CE2609-37DA-4C4C-BF45-E56CE85AA41D}"/>
+                <a16:creationId xmlns="" xmlns:a16="http://schemas.microsoft.com/office/drawing/2014/main" id="{27CE2609-37DA-4C4C-BF45-E56CE85AA41D}"/>
               </a:ext>
             </a:extLst>
           </p:cNvPr>
@@ -8064,7 +8064,7 @@
           <p:cNvPr id="24" name="Rectangle 57">
             <a:extLst>
               <a:ext uri="{FF2B5EF4-FFF2-40B4-BE49-F238E27FC236}">
-                <a16:creationId xmlns:a16="http://schemas.microsoft.com/office/drawing/2014/main" xmlns="" id="{E84F61DF-65CA-45BF-9A0B-34B97F6A97EA}"/>
+                <a16:creationId xmlns="" xmlns:a16="http://schemas.microsoft.com/office/drawing/2014/main" id="{E84F61DF-65CA-45BF-9A0B-34B97F6A97EA}"/>
               </a:ext>
             </a:extLst>
           </p:cNvPr>
@@ -8157,7 +8157,7 @@
           <p:cNvPr id="8" name="Text Placeholder 7">
             <a:extLst>
               <a:ext uri="{FF2B5EF4-FFF2-40B4-BE49-F238E27FC236}">
-                <a16:creationId xmlns:a16="http://schemas.microsoft.com/office/drawing/2014/main" xmlns="" id="{27CE2609-37DA-4C4C-BF45-E56CE85AA41D}"/>
+                <a16:creationId xmlns="" xmlns:a16="http://schemas.microsoft.com/office/drawing/2014/main" id="{27CE2609-37DA-4C4C-BF45-E56CE85AA41D}"/>
               </a:ext>
             </a:extLst>
           </p:cNvPr>
@@ -8271,7 +8271,7 @@
           <p:cNvPr id="13" name="Text Placeholder 7">
             <a:extLst>
               <a:ext uri="{FF2B5EF4-FFF2-40B4-BE49-F238E27FC236}">
-                <a16:creationId xmlns:a16="http://schemas.microsoft.com/office/drawing/2014/main" xmlns="" id="{D8D7F005-BA7C-423E-87B0-6782D88233F6}"/>
+                <a16:creationId xmlns="" xmlns:a16="http://schemas.microsoft.com/office/drawing/2014/main" id="{D8D7F005-BA7C-423E-87B0-6782D88233F6}"/>
               </a:ext>
             </a:extLst>
           </p:cNvPr>
@@ -8345,7 +8345,7 @@
           <p:cNvPr id="14" name="Text Placeholder 7">
             <a:extLst>
               <a:ext uri="{FF2B5EF4-FFF2-40B4-BE49-F238E27FC236}">
-                <a16:creationId xmlns:a16="http://schemas.microsoft.com/office/drawing/2014/main" xmlns="" id="{47BDC0DA-1585-454D-9E74-41D2AFC0FEE5}"/>
+                <a16:creationId xmlns="" xmlns:a16="http://schemas.microsoft.com/office/drawing/2014/main" id="{47BDC0DA-1585-454D-9E74-41D2AFC0FEE5}"/>
               </a:ext>
             </a:extLst>
           </p:cNvPr>
@@ -8447,7 +8447,7 @@
           <p:cNvPr id="16" name="Text Placeholder 7">
             <a:extLst>
               <a:ext uri="{FF2B5EF4-FFF2-40B4-BE49-F238E27FC236}">
-                <a16:creationId xmlns:a16="http://schemas.microsoft.com/office/drawing/2014/main" xmlns="" id="{27CE2609-37DA-4C4C-BF45-E56CE85AA41D}"/>
+                <a16:creationId xmlns="" xmlns:a16="http://schemas.microsoft.com/office/drawing/2014/main" id="{27CE2609-37DA-4C4C-BF45-E56CE85AA41D}"/>
               </a:ext>
             </a:extLst>
           </p:cNvPr>
@@ -8614,7 +8614,7 @@
           <p:cNvPr id="3" name="Text Placeholder 7">
             <a:extLst>
               <a:ext uri="{FF2B5EF4-FFF2-40B4-BE49-F238E27FC236}">
-                <a16:creationId xmlns:a16="http://schemas.microsoft.com/office/drawing/2014/main" xmlns="" id="{27CE2609-37DA-4C4C-BF45-E56CE85AA41D}"/>
+                <a16:creationId xmlns="" xmlns:a16="http://schemas.microsoft.com/office/drawing/2014/main" id="{27CE2609-37DA-4C4C-BF45-E56CE85AA41D}"/>
               </a:ext>
             </a:extLst>
           </p:cNvPr>
@@ -8728,7 +8728,7 @@
           <p:cNvPr id="4" name="Text Placeholder 7">
             <a:extLst>
               <a:ext uri="{FF2B5EF4-FFF2-40B4-BE49-F238E27FC236}">
-                <a16:creationId xmlns:a16="http://schemas.microsoft.com/office/drawing/2014/main" xmlns="" id="{D8D7F005-BA7C-423E-87B0-6782D88233F6}"/>
+                <a16:creationId xmlns="" xmlns:a16="http://schemas.microsoft.com/office/drawing/2014/main" id="{D8D7F005-BA7C-423E-87B0-6782D88233F6}"/>
               </a:ext>
             </a:extLst>
           </p:cNvPr>
@@ -8814,7 +8814,7 @@
           <p:cNvPr id="9" name="Text Placeholder 7">
             <a:extLst>
               <a:ext uri="{FF2B5EF4-FFF2-40B4-BE49-F238E27FC236}">
-                <a16:creationId xmlns:a16="http://schemas.microsoft.com/office/drawing/2014/main" xmlns="" id="{27CE2609-37DA-4C4C-BF45-E56CE85AA41D}"/>
+                <a16:creationId xmlns="" xmlns:a16="http://schemas.microsoft.com/office/drawing/2014/main" id="{27CE2609-37DA-4C4C-BF45-E56CE85AA41D}"/>
               </a:ext>
             </a:extLst>
           </p:cNvPr>
@@ -8928,7 +8928,7 @@
           <p:cNvPr id="10" name="Text Placeholder 7">
             <a:extLst>
               <a:ext uri="{FF2B5EF4-FFF2-40B4-BE49-F238E27FC236}">
-                <a16:creationId xmlns:a16="http://schemas.microsoft.com/office/drawing/2014/main" xmlns="" id="{D8D7F005-BA7C-423E-87B0-6782D88233F6}"/>
+                <a16:creationId xmlns="" xmlns:a16="http://schemas.microsoft.com/office/drawing/2014/main" id="{D8D7F005-BA7C-423E-87B0-6782D88233F6}"/>
               </a:ext>
             </a:extLst>
           </p:cNvPr>
@@ -9014,7 +9014,7 @@
           <p:cNvPr id="11" name="Text Placeholder 7">
             <a:extLst>
               <a:ext uri="{FF2B5EF4-FFF2-40B4-BE49-F238E27FC236}">
-                <a16:creationId xmlns:a16="http://schemas.microsoft.com/office/drawing/2014/main" xmlns="" id="{27CE2609-37DA-4C4C-BF45-E56CE85AA41D}"/>
+                <a16:creationId xmlns="" xmlns:a16="http://schemas.microsoft.com/office/drawing/2014/main" id="{27CE2609-37DA-4C4C-BF45-E56CE85AA41D}"/>
               </a:ext>
             </a:extLst>
           </p:cNvPr>
@@ -9128,7 +9128,7 @@
           <p:cNvPr id="12" name="Text Placeholder 7">
             <a:extLst>
               <a:ext uri="{FF2B5EF4-FFF2-40B4-BE49-F238E27FC236}">
-                <a16:creationId xmlns:a16="http://schemas.microsoft.com/office/drawing/2014/main" xmlns="" id="{D8D7F005-BA7C-423E-87B0-6782D88233F6}"/>
+                <a16:creationId xmlns="" xmlns:a16="http://schemas.microsoft.com/office/drawing/2014/main" id="{D8D7F005-BA7C-423E-87B0-6782D88233F6}"/>
               </a:ext>
             </a:extLst>
           </p:cNvPr>
@@ -9259,7 +9259,7 @@
           <a:graphicData uri="http://schemas.openxmlformats.org/presentationml/2006/ole">
             <mc:AlternateContent xmlns:mc="http://schemas.openxmlformats.org/markup-compatibility/2006">
               <mc:Choice xmlns:v="urn:schemas-microsoft-com:vml" Requires="v">
-                <p:oleObj spid="_x0000_s8244" name="think-cell Slide" r:id="rId4" imgW="270" imgH="270" progId="TCLayout.ActiveDocument.1">
+                <p:oleObj spid="_x0000_s8245" name="think-cell Slide" r:id="rId4" imgW="270" imgH="270" progId="TCLayout.ActiveDocument.1">
                   <p:embed/>
                 </p:oleObj>
               </mc:Choice>
@@ -9727,7 +9727,7 @@
           <p:cNvPr id="12" name="Freeform: Shape 11">
             <a:extLst>
               <a:ext uri="{FF2B5EF4-FFF2-40B4-BE49-F238E27FC236}">
-                <a16:creationId xmlns:a16="http://schemas.microsoft.com/office/drawing/2014/main" xmlns="" id="{F5F5AEA1-6A77-4676-B8B3-EF658F5F8430}"/>
+                <a16:creationId xmlns="" xmlns:a16="http://schemas.microsoft.com/office/drawing/2014/main" id="{F5F5AEA1-6A77-4676-B8B3-EF658F5F8430}"/>
               </a:ext>
             </a:extLst>
           </p:cNvPr>
@@ -9920,7 +9920,7 @@
           <p:cNvPr id="26" name="Text Placeholder 4">
             <a:extLst>
               <a:ext uri="{FF2B5EF4-FFF2-40B4-BE49-F238E27FC236}">
-                <a16:creationId xmlns:a16="http://schemas.microsoft.com/office/drawing/2014/main" xmlns="" id="{7E551D69-F21D-4601-B4BD-97ECB52F39D6}"/>
+                <a16:creationId xmlns="" xmlns:a16="http://schemas.microsoft.com/office/drawing/2014/main" id="{7E551D69-F21D-4601-B4BD-97ECB52F39D6}"/>
               </a:ext>
             </a:extLst>
           </p:cNvPr>
@@ -9980,7 +9980,7 @@
           <p:cNvPr id="23" name="Text Placeholder 4">
             <a:extLst>
               <a:ext uri="{FF2B5EF4-FFF2-40B4-BE49-F238E27FC236}">
-                <a16:creationId xmlns:a16="http://schemas.microsoft.com/office/drawing/2014/main" xmlns="" id="{BC359575-5CC3-4B2F-91E7-19D6A150BE7B}"/>
+                <a16:creationId xmlns="" xmlns:a16="http://schemas.microsoft.com/office/drawing/2014/main" id="{BC359575-5CC3-4B2F-91E7-19D6A150BE7B}"/>
               </a:ext>
             </a:extLst>
           </p:cNvPr>
@@ -10040,7 +10040,7 @@
           <p:cNvPr id="24" name="Text Placeholder 7">
             <a:extLst>
               <a:ext uri="{FF2B5EF4-FFF2-40B4-BE49-F238E27FC236}">
-                <a16:creationId xmlns:a16="http://schemas.microsoft.com/office/drawing/2014/main" xmlns="" id="{53745724-67BB-4475-9660-FEEE12268615}"/>
+                <a16:creationId xmlns="" xmlns:a16="http://schemas.microsoft.com/office/drawing/2014/main" id="{53745724-67BB-4475-9660-FEEE12268615}"/>
               </a:ext>
             </a:extLst>
           </p:cNvPr>
@@ -10114,7 +10114,7 @@
           <p:cNvPr id="27" name="Text Placeholder 7">
             <a:extLst>
               <a:ext uri="{FF2B5EF4-FFF2-40B4-BE49-F238E27FC236}">
-                <a16:creationId xmlns:a16="http://schemas.microsoft.com/office/drawing/2014/main" xmlns="" id="{C78431F2-3F85-4748-A6BC-A08250A6D354}"/>
+                <a16:creationId xmlns="" xmlns:a16="http://schemas.microsoft.com/office/drawing/2014/main" id="{C78431F2-3F85-4748-A6BC-A08250A6D354}"/>
               </a:ext>
             </a:extLst>
           </p:cNvPr>
@@ -10188,7 +10188,7 @@
           <p:cNvPr id="13" name="Oval 20">
             <a:extLst>
               <a:ext uri="{FF2B5EF4-FFF2-40B4-BE49-F238E27FC236}">
-                <a16:creationId xmlns:a16="http://schemas.microsoft.com/office/drawing/2014/main" xmlns="" id="{1EFB3510-D39A-47CF-8191-109DDF9E53D5}"/>
+                <a16:creationId xmlns="" xmlns:a16="http://schemas.microsoft.com/office/drawing/2014/main" id="{1EFB3510-D39A-47CF-8191-109DDF9E53D5}"/>
               </a:ext>
             </a:extLst>
           </p:cNvPr>
@@ -10448,7 +10448,7 @@
           <a:graphicData uri="http://schemas.openxmlformats.org/presentationml/2006/ole">
             <mc:AlternateContent xmlns:mc="http://schemas.openxmlformats.org/markup-compatibility/2006">
               <mc:Choice xmlns:v="urn:schemas-microsoft-com:vml" Requires="v">
-                <p:oleObj spid="_x0000_s9268" name="think-cell Slide" r:id="rId4" imgW="270" imgH="270" progId="TCLayout.ActiveDocument.1">
+                <p:oleObj spid="_x0000_s9269" name="think-cell Slide" r:id="rId4" imgW="270" imgH="270" progId="TCLayout.ActiveDocument.1">
                   <p:embed/>
                 </p:oleObj>
               </mc:Choice>
@@ -10557,7 +10557,7 @@
           <p:cNvPr id="3" name="Freeform: Shape 9">
             <a:extLst>
               <a:ext uri="{FF2B5EF4-FFF2-40B4-BE49-F238E27FC236}">
-                <a16:creationId xmlns:a16="http://schemas.microsoft.com/office/drawing/2014/main" xmlns="" id="{531E77B6-0DD5-446F-A826-892DFC23D785}"/>
+                <a16:creationId xmlns="" xmlns:a16="http://schemas.microsoft.com/office/drawing/2014/main" id="{531E77B6-0DD5-446F-A826-892DFC23D785}"/>
               </a:ext>
             </a:extLst>
           </p:cNvPr>
@@ -10730,7 +10730,7 @@
           <p:cNvPr id="7" name="Retângulo 43">
             <a:extLst>
               <a:ext uri="{FF2B5EF4-FFF2-40B4-BE49-F238E27FC236}">
-                <a16:creationId xmlns:a16="http://schemas.microsoft.com/office/drawing/2014/main" xmlns="" id="{25FC8637-25BD-4C09-AF25-56B4243DAB3D}"/>
+                <a16:creationId xmlns="" xmlns:a16="http://schemas.microsoft.com/office/drawing/2014/main" id="{25FC8637-25BD-4C09-AF25-56B4243DAB3D}"/>
               </a:ext>
             </a:extLst>
           </p:cNvPr>
@@ -10781,7 +10781,7 @@
           <p:cNvPr id="8" name="Text Placeholder 7">
             <a:extLst>
               <a:ext uri="{FF2B5EF4-FFF2-40B4-BE49-F238E27FC236}">
-                <a16:creationId xmlns:a16="http://schemas.microsoft.com/office/drawing/2014/main" xmlns="" id="{E824319D-02CC-441E-87B5-E9D15DE8CA35}"/>
+                <a16:creationId xmlns="" xmlns:a16="http://schemas.microsoft.com/office/drawing/2014/main" id="{E824319D-02CC-441E-87B5-E9D15DE8CA35}"/>
               </a:ext>
             </a:extLst>
           </p:cNvPr>
@@ -11393,7 +11393,7 @@
           <a:graphicData uri="http://schemas.openxmlformats.org/presentationml/2006/ole">
             <mc:AlternateContent xmlns:mc="http://schemas.openxmlformats.org/markup-compatibility/2006">
               <mc:Choice xmlns:v="urn:schemas-microsoft-com:vml" Requires="v">
-                <p:oleObj spid="_x0000_s10292" name="think-cell Slide" r:id="rId4" imgW="270" imgH="270" progId="TCLayout.ActiveDocument.1">
+                <p:oleObj spid="_x0000_s10293" name="think-cell Slide" r:id="rId4" imgW="270" imgH="270" progId="TCLayout.ActiveDocument.1">
                   <p:embed/>
                 </p:oleObj>
               </mc:Choice>
@@ -11452,7 +11452,7 @@
           <p:cNvPr id="13" name="Rectangle 12">
             <a:extLst>
               <a:ext uri="{FF2B5EF4-FFF2-40B4-BE49-F238E27FC236}">
-                <a16:creationId xmlns:a16="http://schemas.microsoft.com/office/drawing/2014/main" xmlns="" id="{9455EBB8-DB3C-45D2-B02F-0B36A58E555B}"/>
+                <a16:creationId xmlns="" xmlns:a16="http://schemas.microsoft.com/office/drawing/2014/main" id="{9455EBB8-DB3C-45D2-B02F-0B36A58E555B}"/>
               </a:ext>
             </a:extLst>
           </p:cNvPr>
@@ -11742,7 +11742,7 @@
           <p:cNvPr id="14" name="Text Placeholder 7">
             <a:extLst>
               <a:ext uri="{FF2B5EF4-FFF2-40B4-BE49-F238E27FC236}">
-                <a16:creationId xmlns:a16="http://schemas.microsoft.com/office/drawing/2014/main" xmlns="" id="{9949BCD6-E419-4ED2-9061-402DD5FF2406}"/>
+                <a16:creationId xmlns="" xmlns:a16="http://schemas.microsoft.com/office/drawing/2014/main" id="{9949BCD6-E419-4ED2-9061-402DD5FF2406}"/>
               </a:ext>
             </a:extLst>
           </p:cNvPr>
@@ -11833,7 +11833,7 @@
           <p:cNvPr id="15" name="Text Placeholder 4">
             <a:extLst>
               <a:ext uri="{FF2B5EF4-FFF2-40B4-BE49-F238E27FC236}">
-                <a16:creationId xmlns:a16="http://schemas.microsoft.com/office/drawing/2014/main" xmlns="" id="{3F6EE60C-2261-45A0-AD6F-B5F767C57B57}"/>
+                <a16:creationId xmlns="" xmlns:a16="http://schemas.microsoft.com/office/drawing/2014/main" id="{3F6EE60C-2261-45A0-AD6F-B5F767C57B57}"/>
               </a:ext>
             </a:extLst>
           </p:cNvPr>
@@ -11893,7 +11893,7 @@
           <p:cNvPr id="16" name="Text Placeholder 7">
             <a:extLst>
               <a:ext uri="{FF2B5EF4-FFF2-40B4-BE49-F238E27FC236}">
-                <a16:creationId xmlns:a16="http://schemas.microsoft.com/office/drawing/2014/main" xmlns="" id="{ABE7F41D-73F9-4353-AE3F-71AB8377048D}"/>
+                <a16:creationId xmlns="" xmlns:a16="http://schemas.microsoft.com/office/drawing/2014/main" id="{ABE7F41D-73F9-4353-AE3F-71AB8377048D}"/>
               </a:ext>
             </a:extLst>
           </p:cNvPr>
@@ -11984,7 +11984,7 @@
           <p:cNvPr id="17" name="Text Placeholder 4">
             <a:extLst>
               <a:ext uri="{FF2B5EF4-FFF2-40B4-BE49-F238E27FC236}">
-                <a16:creationId xmlns:a16="http://schemas.microsoft.com/office/drawing/2014/main" xmlns="" id="{83D9B326-443F-495A-B788-21C48AC85AE2}"/>
+                <a16:creationId xmlns="" xmlns:a16="http://schemas.microsoft.com/office/drawing/2014/main" id="{83D9B326-443F-495A-B788-21C48AC85AE2}"/>
               </a:ext>
             </a:extLst>
           </p:cNvPr>
@@ -12044,7 +12044,7 @@
           <p:cNvPr id="18" name="Text Placeholder 7">
             <a:extLst>
               <a:ext uri="{FF2B5EF4-FFF2-40B4-BE49-F238E27FC236}">
-                <a16:creationId xmlns:a16="http://schemas.microsoft.com/office/drawing/2014/main" xmlns="" id="{00358894-025F-4D0E-AF6E-F99EDF29800A}"/>
+                <a16:creationId xmlns="" xmlns:a16="http://schemas.microsoft.com/office/drawing/2014/main" id="{00358894-025F-4D0E-AF6E-F99EDF29800A}"/>
               </a:ext>
             </a:extLst>
           </p:cNvPr>
@@ -12135,7 +12135,7 @@
           <p:cNvPr id="19" name="Text Placeholder 4">
             <a:extLst>
               <a:ext uri="{FF2B5EF4-FFF2-40B4-BE49-F238E27FC236}">
-                <a16:creationId xmlns:a16="http://schemas.microsoft.com/office/drawing/2014/main" xmlns="" id="{EE5AF299-5A92-48E3-B18F-F7FE7AB9EED4}"/>
+                <a16:creationId xmlns="" xmlns:a16="http://schemas.microsoft.com/office/drawing/2014/main" id="{EE5AF299-5A92-48E3-B18F-F7FE7AB9EED4}"/>
               </a:ext>
             </a:extLst>
           </p:cNvPr>
@@ -12195,7 +12195,7 @@
           <p:cNvPr id="20" name="Text Placeholder 7">
             <a:extLst>
               <a:ext uri="{FF2B5EF4-FFF2-40B4-BE49-F238E27FC236}">
-                <a16:creationId xmlns:a16="http://schemas.microsoft.com/office/drawing/2014/main" xmlns="" id="{F951F368-6540-4675-9A52-0824638E0EF4}"/>
+                <a16:creationId xmlns="" xmlns:a16="http://schemas.microsoft.com/office/drawing/2014/main" id="{F951F368-6540-4675-9A52-0824638E0EF4}"/>
               </a:ext>
             </a:extLst>
           </p:cNvPr>
@@ -12286,7 +12286,7 @@
           <p:cNvPr id="21" name="Text Placeholder 4">
             <a:extLst>
               <a:ext uri="{FF2B5EF4-FFF2-40B4-BE49-F238E27FC236}">
-                <a16:creationId xmlns:a16="http://schemas.microsoft.com/office/drawing/2014/main" xmlns="" id="{B7C16A20-D927-494E-94A9-49AF2E1FA010}"/>
+                <a16:creationId xmlns="" xmlns:a16="http://schemas.microsoft.com/office/drawing/2014/main" id="{B7C16A20-D927-494E-94A9-49AF2E1FA010}"/>
               </a:ext>
             </a:extLst>
           </p:cNvPr>
@@ -12346,7 +12346,7 @@
           <p:cNvPr id="22" name="Text Placeholder 4">
             <a:extLst>
               <a:ext uri="{FF2B5EF4-FFF2-40B4-BE49-F238E27FC236}">
-                <a16:creationId xmlns:a16="http://schemas.microsoft.com/office/drawing/2014/main" xmlns="" id="{936BACCD-6FBF-486E-81CB-3462560DA2CE}"/>
+                <a16:creationId xmlns="" xmlns:a16="http://schemas.microsoft.com/office/drawing/2014/main" id="{936BACCD-6FBF-486E-81CB-3462560DA2CE}"/>
               </a:ext>
             </a:extLst>
           </p:cNvPr>
@@ -12406,7 +12406,7 @@
           <p:cNvPr id="23" name="Text Placeholder 4">
             <a:extLst>
               <a:ext uri="{FF2B5EF4-FFF2-40B4-BE49-F238E27FC236}">
-                <a16:creationId xmlns:a16="http://schemas.microsoft.com/office/drawing/2014/main" xmlns="" id="{48E9C506-31EA-4D04-B660-3B4DB0704112}"/>
+                <a16:creationId xmlns="" xmlns:a16="http://schemas.microsoft.com/office/drawing/2014/main" id="{48E9C506-31EA-4D04-B660-3B4DB0704112}"/>
               </a:ext>
             </a:extLst>
           </p:cNvPr>
@@ -12511,7 +12511,7 @@
           <a:graphicData uri="http://schemas.openxmlformats.org/presentationml/2006/ole">
             <mc:AlternateContent xmlns:mc="http://schemas.openxmlformats.org/markup-compatibility/2006">
               <mc:Choice xmlns:v="urn:schemas-microsoft-com:vml" Requires="v">
-                <p:oleObj spid="_x0000_s11316" name="think-cell Slide" r:id="rId4" imgW="270" imgH="270" progId="TCLayout.ActiveDocument.1">
+                <p:oleObj spid="_x0000_s11317" name="think-cell Slide" r:id="rId4" imgW="270" imgH="270" progId="TCLayout.ActiveDocument.1">
                   <p:embed/>
                 </p:oleObj>
               </mc:Choice>
@@ -12646,7 +12646,7 @@
           <a:graphicData uri="http://schemas.openxmlformats.org/presentationml/2006/ole">
             <mc:AlternateContent xmlns:mc="http://schemas.openxmlformats.org/markup-compatibility/2006">
               <mc:Choice xmlns:v="urn:schemas-microsoft-com:vml" Requires="v">
-                <p:oleObj spid="_x0000_s7220" name="think-cell Slide" r:id="rId15" imgW="270" imgH="270" progId="TCLayout.ActiveDocument.1">
+                <p:oleObj spid="_x0000_s7221" name="think-cell Slide" r:id="rId15" imgW="270" imgH="270" progId="TCLayout.ActiveDocument.1">
                   <p:embed/>
                 </p:oleObj>
               </mc:Choice>
@@ -12988,7 +12988,7 @@
           <p:cNvPr id="7" name="Retângulo 43">
             <a:extLst>
               <a:ext uri="{FF2B5EF4-FFF2-40B4-BE49-F238E27FC236}">
-                <a16:creationId xmlns:a16="http://schemas.microsoft.com/office/drawing/2014/main" xmlns="" id="{25FC8637-25BD-4C09-AF25-56B4243DAB3D}"/>
+                <a16:creationId xmlns="" xmlns:a16="http://schemas.microsoft.com/office/drawing/2014/main" id="{25FC8637-25BD-4C09-AF25-56B4243DAB3D}"/>
               </a:ext>
             </a:extLst>
           </p:cNvPr>
@@ -13039,7 +13039,7 @@
           <p:cNvPr id="6" name="Text Placeholder 7">
             <a:extLst>
               <a:ext uri="{FF2B5EF4-FFF2-40B4-BE49-F238E27FC236}">
-                <a16:creationId xmlns:a16="http://schemas.microsoft.com/office/drawing/2014/main" xmlns="" id="{E824319D-02CC-441E-87B5-E9D15DE8CA35}"/>
+                <a16:creationId xmlns="" xmlns:a16="http://schemas.microsoft.com/office/drawing/2014/main" id="{E824319D-02CC-441E-87B5-E9D15DE8CA35}"/>
               </a:ext>
             </a:extLst>
           </p:cNvPr>
@@ -13258,7 +13258,7 @@
           <p:cNvPr id="8" name="Text Placeholder 7">
             <a:extLst>
               <a:ext uri="{FF2B5EF4-FFF2-40B4-BE49-F238E27FC236}">
-                <a16:creationId xmlns:a16="http://schemas.microsoft.com/office/drawing/2014/main" xmlns="" id="{E824319D-02CC-441E-87B5-E9D15DE8CA35}"/>
+                <a16:creationId xmlns="" xmlns:a16="http://schemas.microsoft.com/office/drawing/2014/main" id="{E824319D-02CC-441E-87B5-E9D15DE8CA35}"/>
               </a:ext>
             </a:extLst>
           </p:cNvPr>
@@ -13579,7 +13579,7 @@
           <p:cNvPr id="3" name="Groupe 2">
             <a:extLst>
               <a:ext uri="{FF2B5EF4-FFF2-40B4-BE49-F238E27FC236}">
-                <a16:creationId xmlns:a16="http://schemas.microsoft.com/office/drawing/2014/main" xmlns="" id="{231F4250-75BE-456B-A9D8-680BA4145249}"/>
+                <a16:creationId xmlns="" xmlns:a16="http://schemas.microsoft.com/office/drawing/2014/main" id="{231F4250-75BE-456B-A9D8-680BA4145249}"/>
               </a:ext>
             </a:extLst>
           </p:cNvPr>
@@ -13599,7 +13599,7 @@
             <p:cNvPr id="11" name="Rectangle 10">
               <a:extLst>
                 <a:ext uri="{FF2B5EF4-FFF2-40B4-BE49-F238E27FC236}">
-                  <a16:creationId xmlns:a16="http://schemas.microsoft.com/office/drawing/2014/main" xmlns="" id="{EF1244FD-1856-4971-9A73-AD6DF3F42A90}"/>
+                  <a16:creationId xmlns="" xmlns:a16="http://schemas.microsoft.com/office/drawing/2014/main" id="{EF1244FD-1856-4971-9A73-AD6DF3F42A90}"/>
                 </a:ext>
               </a:extLst>
             </p:cNvPr>
@@ -13659,7 +13659,7 @@
             <p:cNvPr id="12" name="Rectangle 11">
               <a:extLst>
                 <a:ext uri="{FF2B5EF4-FFF2-40B4-BE49-F238E27FC236}">
-                  <a16:creationId xmlns:a16="http://schemas.microsoft.com/office/drawing/2014/main" xmlns="" id="{22B40C78-6F20-4C95-AB26-B29FEC0FF747}"/>
+                  <a16:creationId xmlns="" xmlns:a16="http://schemas.microsoft.com/office/drawing/2014/main" id="{22B40C78-6F20-4C95-AB26-B29FEC0FF747}"/>
                 </a:ext>
               </a:extLst>
             </p:cNvPr>
@@ -13719,7 +13719,7 @@
             <p:cNvPr id="13" name="Rectangle 12">
               <a:extLst>
                 <a:ext uri="{FF2B5EF4-FFF2-40B4-BE49-F238E27FC236}">
-                  <a16:creationId xmlns:a16="http://schemas.microsoft.com/office/drawing/2014/main" xmlns="" id="{1AED4E7D-39CE-49AE-9D4C-16EA940CBE5F}"/>
+                  <a16:creationId xmlns="" xmlns:a16="http://schemas.microsoft.com/office/drawing/2014/main" id="{1AED4E7D-39CE-49AE-9D4C-16EA940CBE5F}"/>
                 </a:ext>
               </a:extLst>
             </p:cNvPr>
@@ -13780,7 +13780,7 @@
           <p:cNvPr id="5" name="Groupe 4">
             <a:extLst>
               <a:ext uri="{FF2B5EF4-FFF2-40B4-BE49-F238E27FC236}">
-                <a16:creationId xmlns:a16="http://schemas.microsoft.com/office/drawing/2014/main" xmlns="" id="{CC6ACEFF-8651-4C08-BAF6-3BFAE6473DAF}"/>
+                <a16:creationId xmlns="" xmlns:a16="http://schemas.microsoft.com/office/drawing/2014/main" id="{CC6ACEFF-8651-4C08-BAF6-3BFAE6473DAF}"/>
               </a:ext>
             </a:extLst>
           </p:cNvPr>
@@ -13800,7 +13800,7 @@
             <p:cNvPr id="16" name="Rectangle 15">
               <a:extLst>
                 <a:ext uri="{FF2B5EF4-FFF2-40B4-BE49-F238E27FC236}">
-                  <a16:creationId xmlns:a16="http://schemas.microsoft.com/office/drawing/2014/main" xmlns="" id="{D27E2B2B-AB85-4173-AB1F-61084925AA83}"/>
+                  <a16:creationId xmlns="" xmlns:a16="http://schemas.microsoft.com/office/drawing/2014/main" id="{D27E2B2B-AB85-4173-AB1F-61084925AA83}"/>
                 </a:ext>
               </a:extLst>
             </p:cNvPr>
@@ -13860,7 +13860,7 @@
             <p:cNvPr id="17" name="Rectangle 16">
               <a:extLst>
                 <a:ext uri="{FF2B5EF4-FFF2-40B4-BE49-F238E27FC236}">
-                  <a16:creationId xmlns:a16="http://schemas.microsoft.com/office/drawing/2014/main" xmlns="" id="{0DDEBD8A-CA0B-4D62-9426-DFB2D4742184}"/>
+                  <a16:creationId xmlns="" xmlns:a16="http://schemas.microsoft.com/office/drawing/2014/main" id="{0DDEBD8A-CA0B-4D62-9426-DFB2D4742184}"/>
                 </a:ext>
               </a:extLst>
             </p:cNvPr>
@@ -13920,7 +13920,7 @@
             <p:cNvPr id="18" name="Rectangle 17">
               <a:extLst>
                 <a:ext uri="{FF2B5EF4-FFF2-40B4-BE49-F238E27FC236}">
-                  <a16:creationId xmlns:a16="http://schemas.microsoft.com/office/drawing/2014/main" xmlns="" id="{65515214-3AFD-4A2B-95C5-2FDFF59A1BE2}"/>
+                  <a16:creationId xmlns="" xmlns:a16="http://schemas.microsoft.com/office/drawing/2014/main" id="{65515214-3AFD-4A2B-95C5-2FDFF59A1BE2}"/>
                 </a:ext>
               </a:extLst>
             </p:cNvPr>
@@ -13980,7 +13980,7 @@
             <p:cNvPr id="19" name="Rectangle 18">
               <a:extLst>
                 <a:ext uri="{FF2B5EF4-FFF2-40B4-BE49-F238E27FC236}">
-                  <a16:creationId xmlns:a16="http://schemas.microsoft.com/office/drawing/2014/main" xmlns="" id="{D674829A-E5EF-4140-B9ED-AC7745AB028D}"/>
+                  <a16:creationId xmlns="" xmlns:a16="http://schemas.microsoft.com/office/drawing/2014/main" id="{D674829A-E5EF-4140-B9ED-AC7745AB028D}"/>
                 </a:ext>
               </a:extLst>
             </p:cNvPr>
@@ -14040,7 +14040,7 @@
             <p:cNvPr id="20" name="Rectangle 19">
               <a:extLst>
                 <a:ext uri="{FF2B5EF4-FFF2-40B4-BE49-F238E27FC236}">
-                  <a16:creationId xmlns:a16="http://schemas.microsoft.com/office/drawing/2014/main" xmlns="" id="{E59B3FCE-0262-45FE-BE39-9459C5BC7FEE}"/>
+                  <a16:creationId xmlns="" xmlns:a16="http://schemas.microsoft.com/office/drawing/2014/main" id="{E59B3FCE-0262-45FE-BE39-9459C5BC7FEE}"/>
                 </a:ext>
               </a:extLst>
             </p:cNvPr>
@@ -14100,7 +14100,7 @@
             <p:cNvPr id="22" name="Rectangle 21">
               <a:extLst>
                 <a:ext uri="{FF2B5EF4-FFF2-40B4-BE49-F238E27FC236}">
-                  <a16:creationId xmlns:a16="http://schemas.microsoft.com/office/drawing/2014/main" xmlns="" id="{F5D692DE-D6DE-4022-9F2F-5F8C1403E4D0}"/>
+                  <a16:creationId xmlns="" xmlns:a16="http://schemas.microsoft.com/office/drawing/2014/main" id="{F5D692DE-D6DE-4022-9F2F-5F8C1403E4D0}"/>
                 </a:ext>
               </a:extLst>
             </p:cNvPr>
@@ -14160,7 +14160,7 @@
             <p:cNvPr id="23" name="Rectangle 22">
               <a:extLst>
                 <a:ext uri="{FF2B5EF4-FFF2-40B4-BE49-F238E27FC236}">
-                  <a16:creationId xmlns:a16="http://schemas.microsoft.com/office/drawing/2014/main" xmlns="" id="{35EEF2F0-E01D-4851-96E7-30214EC78A3B}"/>
+                  <a16:creationId xmlns="" xmlns:a16="http://schemas.microsoft.com/office/drawing/2014/main" id="{35EEF2F0-E01D-4851-96E7-30214EC78A3B}"/>
                 </a:ext>
               </a:extLst>
             </p:cNvPr>
@@ -14220,7 +14220,7 @@
             <p:cNvPr id="24" name="Rectangle 23">
               <a:extLst>
                 <a:ext uri="{FF2B5EF4-FFF2-40B4-BE49-F238E27FC236}">
-                  <a16:creationId xmlns:a16="http://schemas.microsoft.com/office/drawing/2014/main" xmlns="" id="{468B1DDD-74B0-4453-A996-5BA8693FF545}"/>
+                  <a16:creationId xmlns="" xmlns:a16="http://schemas.microsoft.com/office/drawing/2014/main" id="{468B1DDD-74B0-4453-A996-5BA8693FF545}"/>
                 </a:ext>
               </a:extLst>
             </p:cNvPr>
@@ -14280,7 +14280,7 @@
             <p:cNvPr id="25" name="Rectangle 24">
               <a:extLst>
                 <a:ext uri="{FF2B5EF4-FFF2-40B4-BE49-F238E27FC236}">
-                  <a16:creationId xmlns:a16="http://schemas.microsoft.com/office/drawing/2014/main" xmlns="" id="{8809D5E9-1B2A-4D30-A4DD-47B7C9BBCEDC}"/>
+                  <a16:creationId xmlns="" xmlns:a16="http://schemas.microsoft.com/office/drawing/2014/main" id="{8809D5E9-1B2A-4D30-A4DD-47B7C9BBCEDC}"/>
                 </a:ext>
               </a:extLst>
             </p:cNvPr>
@@ -14340,7 +14340,7 @@
             <p:cNvPr id="26" name="Rectangle 25">
               <a:extLst>
                 <a:ext uri="{FF2B5EF4-FFF2-40B4-BE49-F238E27FC236}">
-                  <a16:creationId xmlns:a16="http://schemas.microsoft.com/office/drawing/2014/main" xmlns="" id="{995FF3A0-94CA-40BA-AF81-B777FF5FD489}"/>
+                  <a16:creationId xmlns="" xmlns:a16="http://schemas.microsoft.com/office/drawing/2014/main" id="{995FF3A0-94CA-40BA-AF81-B777FF5FD489}"/>
                 </a:ext>
               </a:extLst>
             </p:cNvPr>
@@ -14400,7 +14400,7 @@
             <p:cNvPr id="27" name="Rectangle 26">
               <a:extLst>
                 <a:ext uri="{FF2B5EF4-FFF2-40B4-BE49-F238E27FC236}">
-                  <a16:creationId xmlns:a16="http://schemas.microsoft.com/office/drawing/2014/main" xmlns="" id="{9F83F12C-5135-43B7-B1D8-A0A72DB85AED}"/>
+                  <a16:creationId xmlns="" xmlns:a16="http://schemas.microsoft.com/office/drawing/2014/main" id="{9F83F12C-5135-43B7-B1D8-A0A72DB85AED}"/>
                 </a:ext>
               </a:extLst>
             </p:cNvPr>
@@ -14460,7 +14460,7 @@
             <p:cNvPr id="28" name="Rectangle 27">
               <a:extLst>
                 <a:ext uri="{FF2B5EF4-FFF2-40B4-BE49-F238E27FC236}">
-                  <a16:creationId xmlns:a16="http://schemas.microsoft.com/office/drawing/2014/main" xmlns="" id="{256CA1CF-2C4A-42DA-94F5-CB5E5B47F24B}"/>
+                  <a16:creationId xmlns="" xmlns:a16="http://schemas.microsoft.com/office/drawing/2014/main" id="{256CA1CF-2C4A-42DA-94F5-CB5E5B47F24B}"/>
                 </a:ext>
               </a:extLst>
             </p:cNvPr>
@@ -14520,7 +14520,7 @@
             <p:cNvPr id="29" name="Rectangle 28">
               <a:extLst>
                 <a:ext uri="{FF2B5EF4-FFF2-40B4-BE49-F238E27FC236}">
-                  <a16:creationId xmlns:a16="http://schemas.microsoft.com/office/drawing/2014/main" xmlns="" id="{47F07AFA-8569-4B3B-854A-60B26629D96D}"/>
+                  <a16:creationId xmlns="" xmlns:a16="http://schemas.microsoft.com/office/drawing/2014/main" id="{47F07AFA-8569-4B3B-854A-60B26629D96D}"/>
                 </a:ext>
               </a:extLst>
             </p:cNvPr>
@@ -14580,7 +14580,7 @@
             <p:cNvPr id="30" name="Rectangle 29">
               <a:extLst>
                 <a:ext uri="{FF2B5EF4-FFF2-40B4-BE49-F238E27FC236}">
-                  <a16:creationId xmlns:a16="http://schemas.microsoft.com/office/drawing/2014/main" xmlns="" id="{8103554C-8B73-4C9A-AFFF-55D6E47A0E76}"/>
+                  <a16:creationId xmlns="" xmlns:a16="http://schemas.microsoft.com/office/drawing/2014/main" id="{8103554C-8B73-4C9A-AFFF-55D6E47A0E76}"/>
                 </a:ext>
               </a:extLst>
             </p:cNvPr>
@@ -14964,7 +14964,7 @@
   </p:txStyles>
   <p:extLst mod="1">
     <p:ext uri="{27BBF7A9-308A-43DC-89C8-2F10F3537804}">
-      <p15:sldGuideLst xmlns:p15="http://schemas.microsoft.com/office/powerpoint/2012/main" xmlns="">
+      <p15:sldGuideLst xmlns="" xmlns:p15="http://schemas.microsoft.com/office/powerpoint/2012/main">
         <p15:guide id="1" orient="horz" pos="709">
           <p15:clr>
             <a:srgbClr val="F26B43"/>
@@ -15041,7 +15041,7 @@
           <a:graphicData uri="http://schemas.openxmlformats.org/presentationml/2006/ole">
             <mc:AlternateContent xmlns:mc="http://schemas.openxmlformats.org/markup-compatibility/2006">
               <mc:Choice xmlns:v="urn:schemas-microsoft-com:vml" Requires="v">
-                <p:oleObj spid="_x0000_s13360" name="think-cell Slide" r:id="rId16" imgW="270" imgH="270" progId="TCLayout.ActiveDocument.1">
+                <p:oleObj spid="_x0000_s13361" name="think-cell Slide" r:id="rId16" imgW="270" imgH="270" progId="TCLayout.ActiveDocument.1">
                   <p:embed/>
                 </p:oleObj>
               </mc:Choice>
@@ -15383,7 +15383,7 @@
           <p:cNvPr id="7" name="Retângulo 43">
             <a:extLst>
               <a:ext uri="{FF2B5EF4-FFF2-40B4-BE49-F238E27FC236}">
-                <a16:creationId xmlns:a16="http://schemas.microsoft.com/office/drawing/2014/main" xmlns="" id="{25FC8637-25BD-4C09-AF25-56B4243DAB3D}"/>
+                <a16:creationId xmlns="" xmlns:a16="http://schemas.microsoft.com/office/drawing/2014/main" id="{25FC8637-25BD-4C09-AF25-56B4243DAB3D}"/>
               </a:ext>
             </a:extLst>
           </p:cNvPr>
@@ -15434,7 +15434,7 @@
           <p:cNvPr id="6" name="Text Placeholder 7">
             <a:extLst>
               <a:ext uri="{FF2B5EF4-FFF2-40B4-BE49-F238E27FC236}">
-                <a16:creationId xmlns:a16="http://schemas.microsoft.com/office/drawing/2014/main" xmlns="" id="{E824319D-02CC-441E-87B5-E9D15DE8CA35}"/>
+                <a16:creationId xmlns="" xmlns:a16="http://schemas.microsoft.com/office/drawing/2014/main" id="{E824319D-02CC-441E-87B5-E9D15DE8CA35}"/>
               </a:ext>
             </a:extLst>
           </p:cNvPr>
@@ -15653,7 +15653,7 @@
           <p:cNvPr id="8" name="Text Placeholder 7">
             <a:extLst>
               <a:ext uri="{FF2B5EF4-FFF2-40B4-BE49-F238E27FC236}">
-                <a16:creationId xmlns:a16="http://schemas.microsoft.com/office/drawing/2014/main" xmlns="" id="{E824319D-02CC-441E-87B5-E9D15DE8CA35}"/>
+                <a16:creationId xmlns="" xmlns:a16="http://schemas.microsoft.com/office/drawing/2014/main" id="{E824319D-02CC-441E-87B5-E9D15DE8CA35}"/>
               </a:ext>
             </a:extLst>
           </p:cNvPr>
@@ -15974,7 +15974,7 @@
           <p:cNvPr id="3" name="Groupe 2">
             <a:extLst>
               <a:ext uri="{FF2B5EF4-FFF2-40B4-BE49-F238E27FC236}">
-                <a16:creationId xmlns:a16="http://schemas.microsoft.com/office/drawing/2014/main" xmlns="" id="{231F4250-75BE-456B-A9D8-680BA4145249}"/>
+                <a16:creationId xmlns="" xmlns:a16="http://schemas.microsoft.com/office/drawing/2014/main" id="{231F4250-75BE-456B-A9D8-680BA4145249}"/>
               </a:ext>
             </a:extLst>
           </p:cNvPr>
@@ -15994,7 +15994,7 @@
             <p:cNvPr id="11" name="Rectangle 10">
               <a:extLst>
                 <a:ext uri="{FF2B5EF4-FFF2-40B4-BE49-F238E27FC236}">
-                  <a16:creationId xmlns:a16="http://schemas.microsoft.com/office/drawing/2014/main" xmlns="" id="{EF1244FD-1856-4971-9A73-AD6DF3F42A90}"/>
+                  <a16:creationId xmlns="" xmlns:a16="http://schemas.microsoft.com/office/drawing/2014/main" id="{EF1244FD-1856-4971-9A73-AD6DF3F42A90}"/>
                 </a:ext>
               </a:extLst>
             </p:cNvPr>
@@ -16054,7 +16054,7 @@
             <p:cNvPr id="12" name="Rectangle 11">
               <a:extLst>
                 <a:ext uri="{FF2B5EF4-FFF2-40B4-BE49-F238E27FC236}">
-                  <a16:creationId xmlns:a16="http://schemas.microsoft.com/office/drawing/2014/main" xmlns="" id="{22B40C78-6F20-4C95-AB26-B29FEC0FF747}"/>
+                  <a16:creationId xmlns="" xmlns:a16="http://schemas.microsoft.com/office/drawing/2014/main" id="{22B40C78-6F20-4C95-AB26-B29FEC0FF747}"/>
                 </a:ext>
               </a:extLst>
             </p:cNvPr>
@@ -16114,7 +16114,7 @@
             <p:cNvPr id="13" name="Rectangle 12">
               <a:extLst>
                 <a:ext uri="{FF2B5EF4-FFF2-40B4-BE49-F238E27FC236}">
-                  <a16:creationId xmlns:a16="http://schemas.microsoft.com/office/drawing/2014/main" xmlns="" id="{1AED4E7D-39CE-49AE-9D4C-16EA940CBE5F}"/>
+                  <a16:creationId xmlns="" xmlns:a16="http://schemas.microsoft.com/office/drawing/2014/main" id="{1AED4E7D-39CE-49AE-9D4C-16EA940CBE5F}"/>
                 </a:ext>
               </a:extLst>
             </p:cNvPr>
@@ -16175,7 +16175,7 @@
           <p:cNvPr id="5" name="Groupe 4">
             <a:extLst>
               <a:ext uri="{FF2B5EF4-FFF2-40B4-BE49-F238E27FC236}">
-                <a16:creationId xmlns:a16="http://schemas.microsoft.com/office/drawing/2014/main" xmlns="" id="{CC6ACEFF-8651-4C08-BAF6-3BFAE6473DAF}"/>
+                <a16:creationId xmlns="" xmlns:a16="http://schemas.microsoft.com/office/drawing/2014/main" id="{CC6ACEFF-8651-4C08-BAF6-3BFAE6473DAF}"/>
               </a:ext>
             </a:extLst>
           </p:cNvPr>
@@ -16195,7 +16195,7 @@
             <p:cNvPr id="16" name="Rectangle 15">
               <a:extLst>
                 <a:ext uri="{FF2B5EF4-FFF2-40B4-BE49-F238E27FC236}">
-                  <a16:creationId xmlns:a16="http://schemas.microsoft.com/office/drawing/2014/main" xmlns="" id="{D27E2B2B-AB85-4173-AB1F-61084925AA83}"/>
+                  <a16:creationId xmlns="" xmlns:a16="http://schemas.microsoft.com/office/drawing/2014/main" id="{D27E2B2B-AB85-4173-AB1F-61084925AA83}"/>
                 </a:ext>
               </a:extLst>
             </p:cNvPr>
@@ -16255,7 +16255,7 @@
             <p:cNvPr id="17" name="Rectangle 16">
               <a:extLst>
                 <a:ext uri="{FF2B5EF4-FFF2-40B4-BE49-F238E27FC236}">
-                  <a16:creationId xmlns:a16="http://schemas.microsoft.com/office/drawing/2014/main" xmlns="" id="{0DDEBD8A-CA0B-4D62-9426-DFB2D4742184}"/>
+                  <a16:creationId xmlns="" xmlns:a16="http://schemas.microsoft.com/office/drawing/2014/main" id="{0DDEBD8A-CA0B-4D62-9426-DFB2D4742184}"/>
                 </a:ext>
               </a:extLst>
             </p:cNvPr>
@@ -16315,7 +16315,7 @@
             <p:cNvPr id="18" name="Rectangle 17">
               <a:extLst>
                 <a:ext uri="{FF2B5EF4-FFF2-40B4-BE49-F238E27FC236}">
-                  <a16:creationId xmlns:a16="http://schemas.microsoft.com/office/drawing/2014/main" xmlns="" id="{65515214-3AFD-4A2B-95C5-2FDFF59A1BE2}"/>
+                  <a16:creationId xmlns="" xmlns:a16="http://schemas.microsoft.com/office/drawing/2014/main" id="{65515214-3AFD-4A2B-95C5-2FDFF59A1BE2}"/>
                 </a:ext>
               </a:extLst>
             </p:cNvPr>
@@ -16375,7 +16375,7 @@
             <p:cNvPr id="19" name="Rectangle 18">
               <a:extLst>
                 <a:ext uri="{FF2B5EF4-FFF2-40B4-BE49-F238E27FC236}">
-                  <a16:creationId xmlns:a16="http://schemas.microsoft.com/office/drawing/2014/main" xmlns="" id="{D674829A-E5EF-4140-B9ED-AC7745AB028D}"/>
+                  <a16:creationId xmlns="" xmlns:a16="http://schemas.microsoft.com/office/drawing/2014/main" id="{D674829A-E5EF-4140-B9ED-AC7745AB028D}"/>
                 </a:ext>
               </a:extLst>
             </p:cNvPr>
@@ -16435,7 +16435,7 @@
             <p:cNvPr id="20" name="Rectangle 19">
               <a:extLst>
                 <a:ext uri="{FF2B5EF4-FFF2-40B4-BE49-F238E27FC236}">
-                  <a16:creationId xmlns:a16="http://schemas.microsoft.com/office/drawing/2014/main" xmlns="" id="{E59B3FCE-0262-45FE-BE39-9459C5BC7FEE}"/>
+                  <a16:creationId xmlns="" xmlns:a16="http://schemas.microsoft.com/office/drawing/2014/main" id="{E59B3FCE-0262-45FE-BE39-9459C5BC7FEE}"/>
                 </a:ext>
               </a:extLst>
             </p:cNvPr>
@@ -16495,7 +16495,7 @@
             <p:cNvPr id="22" name="Rectangle 21">
               <a:extLst>
                 <a:ext uri="{FF2B5EF4-FFF2-40B4-BE49-F238E27FC236}">
-                  <a16:creationId xmlns:a16="http://schemas.microsoft.com/office/drawing/2014/main" xmlns="" id="{F5D692DE-D6DE-4022-9F2F-5F8C1403E4D0}"/>
+                  <a16:creationId xmlns="" xmlns:a16="http://schemas.microsoft.com/office/drawing/2014/main" id="{F5D692DE-D6DE-4022-9F2F-5F8C1403E4D0}"/>
                 </a:ext>
               </a:extLst>
             </p:cNvPr>
@@ -16555,7 +16555,7 @@
             <p:cNvPr id="23" name="Rectangle 22">
               <a:extLst>
                 <a:ext uri="{FF2B5EF4-FFF2-40B4-BE49-F238E27FC236}">
-                  <a16:creationId xmlns:a16="http://schemas.microsoft.com/office/drawing/2014/main" xmlns="" id="{35EEF2F0-E01D-4851-96E7-30214EC78A3B}"/>
+                  <a16:creationId xmlns="" xmlns:a16="http://schemas.microsoft.com/office/drawing/2014/main" id="{35EEF2F0-E01D-4851-96E7-30214EC78A3B}"/>
                 </a:ext>
               </a:extLst>
             </p:cNvPr>
@@ -16615,7 +16615,7 @@
             <p:cNvPr id="24" name="Rectangle 23">
               <a:extLst>
                 <a:ext uri="{FF2B5EF4-FFF2-40B4-BE49-F238E27FC236}">
-                  <a16:creationId xmlns:a16="http://schemas.microsoft.com/office/drawing/2014/main" xmlns="" id="{468B1DDD-74B0-4453-A996-5BA8693FF545}"/>
+                  <a16:creationId xmlns="" xmlns:a16="http://schemas.microsoft.com/office/drawing/2014/main" id="{468B1DDD-74B0-4453-A996-5BA8693FF545}"/>
                 </a:ext>
               </a:extLst>
             </p:cNvPr>
@@ -16675,7 +16675,7 @@
             <p:cNvPr id="25" name="Rectangle 24">
               <a:extLst>
                 <a:ext uri="{FF2B5EF4-FFF2-40B4-BE49-F238E27FC236}">
-                  <a16:creationId xmlns:a16="http://schemas.microsoft.com/office/drawing/2014/main" xmlns="" id="{8809D5E9-1B2A-4D30-A4DD-47B7C9BBCEDC}"/>
+                  <a16:creationId xmlns="" xmlns:a16="http://schemas.microsoft.com/office/drawing/2014/main" id="{8809D5E9-1B2A-4D30-A4DD-47B7C9BBCEDC}"/>
                 </a:ext>
               </a:extLst>
             </p:cNvPr>
@@ -16735,7 +16735,7 @@
             <p:cNvPr id="26" name="Rectangle 25">
               <a:extLst>
                 <a:ext uri="{FF2B5EF4-FFF2-40B4-BE49-F238E27FC236}">
-                  <a16:creationId xmlns:a16="http://schemas.microsoft.com/office/drawing/2014/main" xmlns="" id="{995FF3A0-94CA-40BA-AF81-B777FF5FD489}"/>
+                  <a16:creationId xmlns="" xmlns:a16="http://schemas.microsoft.com/office/drawing/2014/main" id="{995FF3A0-94CA-40BA-AF81-B777FF5FD489}"/>
                 </a:ext>
               </a:extLst>
             </p:cNvPr>
@@ -16795,7 +16795,7 @@
             <p:cNvPr id="27" name="Rectangle 26">
               <a:extLst>
                 <a:ext uri="{FF2B5EF4-FFF2-40B4-BE49-F238E27FC236}">
-                  <a16:creationId xmlns:a16="http://schemas.microsoft.com/office/drawing/2014/main" xmlns="" id="{9F83F12C-5135-43B7-B1D8-A0A72DB85AED}"/>
+                  <a16:creationId xmlns="" xmlns:a16="http://schemas.microsoft.com/office/drawing/2014/main" id="{9F83F12C-5135-43B7-B1D8-A0A72DB85AED}"/>
                 </a:ext>
               </a:extLst>
             </p:cNvPr>
@@ -16855,7 +16855,7 @@
             <p:cNvPr id="28" name="Rectangle 27">
               <a:extLst>
                 <a:ext uri="{FF2B5EF4-FFF2-40B4-BE49-F238E27FC236}">
-                  <a16:creationId xmlns:a16="http://schemas.microsoft.com/office/drawing/2014/main" xmlns="" id="{256CA1CF-2C4A-42DA-94F5-CB5E5B47F24B}"/>
+                  <a16:creationId xmlns="" xmlns:a16="http://schemas.microsoft.com/office/drawing/2014/main" id="{256CA1CF-2C4A-42DA-94F5-CB5E5B47F24B}"/>
                 </a:ext>
               </a:extLst>
             </p:cNvPr>
@@ -16915,7 +16915,7 @@
             <p:cNvPr id="29" name="Rectangle 28">
               <a:extLst>
                 <a:ext uri="{FF2B5EF4-FFF2-40B4-BE49-F238E27FC236}">
-                  <a16:creationId xmlns:a16="http://schemas.microsoft.com/office/drawing/2014/main" xmlns="" id="{47F07AFA-8569-4B3B-854A-60B26629D96D}"/>
+                  <a16:creationId xmlns="" xmlns:a16="http://schemas.microsoft.com/office/drawing/2014/main" id="{47F07AFA-8569-4B3B-854A-60B26629D96D}"/>
                 </a:ext>
               </a:extLst>
             </p:cNvPr>
@@ -16975,7 +16975,7 @@
             <p:cNvPr id="30" name="Rectangle 29">
               <a:extLst>
                 <a:ext uri="{FF2B5EF4-FFF2-40B4-BE49-F238E27FC236}">
-                  <a16:creationId xmlns:a16="http://schemas.microsoft.com/office/drawing/2014/main" xmlns="" id="{8103554C-8B73-4C9A-AFFF-55D6E47A0E76}"/>
+                  <a16:creationId xmlns="" xmlns:a16="http://schemas.microsoft.com/office/drawing/2014/main" id="{8103554C-8B73-4C9A-AFFF-55D6E47A0E76}"/>
                 </a:ext>
               </a:extLst>
             </p:cNvPr>
@@ -17360,7 +17360,7 @@
   </p:txStyles>
   <p:extLst mod="1">
     <p:ext uri="{27BBF7A9-308A-43DC-89C8-2F10F3537804}">
-      <p15:sldGuideLst xmlns:p15="http://schemas.microsoft.com/office/powerpoint/2012/main" xmlns="">
+      <p15:sldGuideLst xmlns="" xmlns:p15="http://schemas.microsoft.com/office/powerpoint/2012/main">
         <p15:guide id="1" orient="horz" pos="709">
           <p15:clr>
             <a:srgbClr val="F26B43"/>
@@ -17453,7 +17453,7 @@
           <p:cNvPr id="2" name="Freeform 5">
             <a:extLst>
               <a:ext uri="{FF2B5EF4-FFF2-40B4-BE49-F238E27FC236}">
-                <a16:creationId xmlns:a16="http://schemas.microsoft.com/office/drawing/2014/main" xmlns="" id="{097E2B3C-7165-47CD-8F90-29BD547B5A2B}"/>
+                <a16:creationId xmlns="" xmlns:a16="http://schemas.microsoft.com/office/drawing/2014/main" id="{097E2B3C-7165-47CD-8F90-29BD547B5A2B}"/>
               </a:ext>
             </a:extLst>
           </p:cNvPr>
@@ -17566,7 +17566,7 @@
           <p:cNvPr id="7" name="Espace réservé du texte 1">
             <a:extLst>
               <a:ext uri="{FF2B5EF4-FFF2-40B4-BE49-F238E27FC236}">
-                <a16:creationId xmlns:a16="http://schemas.microsoft.com/office/drawing/2014/main" xmlns="" id="{3E61A40D-4439-4E82-955B-FC636EF3CC80}"/>
+                <a16:creationId xmlns="" xmlns:a16="http://schemas.microsoft.com/office/drawing/2014/main" id="{3E61A40D-4439-4E82-955B-FC636EF3CC80}"/>
               </a:ext>
             </a:extLst>
           </p:cNvPr>
@@ -17808,7 +17808,7 @@
           <p:cNvPr id="8" name="Sous-titre 2">
             <a:extLst>
               <a:ext uri="{FF2B5EF4-FFF2-40B4-BE49-F238E27FC236}">
-                <a16:creationId xmlns:a16="http://schemas.microsoft.com/office/drawing/2014/main" xmlns="" id="{259864C7-43B5-4E4E-B76F-BA3BD78F03AA}"/>
+                <a16:creationId xmlns="" xmlns:a16="http://schemas.microsoft.com/office/drawing/2014/main" id="{259864C7-43B5-4E4E-B76F-BA3BD78F03AA}"/>
               </a:ext>
             </a:extLst>
           </p:cNvPr>
@@ -18188,7 +18188,7 @@
           <p:cNvPr id="13" name="Espace réservé du texte 1">
             <a:extLst>
               <a:ext uri="{FF2B5EF4-FFF2-40B4-BE49-F238E27FC236}">
-                <a16:creationId xmlns:a16="http://schemas.microsoft.com/office/drawing/2014/main" xmlns="" id="{3E61A40D-4439-4E82-955B-FC636EF3CC80}"/>
+                <a16:creationId xmlns="" xmlns:a16="http://schemas.microsoft.com/office/drawing/2014/main" id="{3E61A40D-4439-4E82-955B-FC636EF3CC80}"/>
               </a:ext>
             </a:extLst>
           </p:cNvPr>
@@ -18816,7 +18816,7 @@
         <p:spPr>
           <a:xfrm>
             <a:off x="683568" y="1491630"/>
-            <a:ext cx="6840760" cy="1631216"/>
+            <a:ext cx="6840760" cy="1908215"/>
           </a:xfrm>
           <a:prstGeom prst="rect">
             <a:avLst/>
@@ -18873,8 +18873,23 @@
             </a:pPr>
             <a:r>
               <a:rPr lang="es-ES" dirty="0"/>
-              <a:t>Variables y operaciones lógicas</a:t>
-            </a:r>
+              <a:t>Variables y operaciones </a:t>
+            </a:r>
+            <a:r>
+              <a:rPr lang="es-ES" dirty="0" smtClean="0"/>
+              <a:t>lógicas</a:t>
+            </a:r>
+          </a:p>
+          <a:p>
+            <a:pPr marL="799910" lvl="1" indent="-342900">
+              <a:buFont typeface="+mj-lt"/>
+              <a:buAutoNum type="arabicPeriod"/>
+            </a:pPr>
+            <a:r>
+              <a:rPr lang="es-ES" dirty="0" smtClean="0"/>
+              <a:t>Castings</a:t>
+            </a:r>
+            <a:endParaRPr lang="es-ES" dirty="0"/>
           </a:p>
           <a:p>
             <a:pPr marL="799910" lvl="1" indent="-342900">
@@ -19328,7 +19343,7 @@
   <a:extraClrSchemeLst/>
   <a:extLst>
     <a:ext uri="{05A4C25C-085E-4340-85A3-A5531E510DB2}">
-      <thm15:themeFamily xmlns:thm15="http://schemas.microsoft.com/office/thememl/2012/main" xmlns="" name="Presentación1" id="{052EE8AA-76EF-4748-835F-A6D187923361}" vid="{370F8B8F-388E-40AB-AD36-3D6D6E70E5A2}"/>
+      <thm15:themeFamily xmlns="" xmlns:thm15="http://schemas.microsoft.com/office/thememl/2012/main" name="Presentación1" id="{052EE8AA-76EF-4748-835F-A6D187923361}" vid="{370F8B8F-388E-40AB-AD36-3D6D6E70E5A2}"/>
     </a:ext>
   </a:extLst>
 </a:theme>
@@ -19529,7 +19544,7 @@
   <a:extraClrSchemeLst/>
   <a:extLst>
     <a:ext uri="{05A4C25C-085E-4340-85A3-A5531E510DB2}">
-      <thm15:themeFamily xmlns:thm15="http://schemas.microsoft.com/office/thememl/2012/main" xmlns="" name="Presentación1" id="{052EE8AA-76EF-4748-835F-A6D187923361}" vid="{370F8B8F-388E-40AB-AD36-3D6D6E70E5A2}"/>
+      <thm15:themeFamily xmlns="" xmlns:thm15="http://schemas.microsoft.com/office/thememl/2012/main" name="Presentación1" id="{052EE8AA-76EF-4748-835F-A6D187923361}" vid="{370F8B8F-388E-40AB-AD36-3D6D6E70E5A2}"/>
     </a:ext>
   </a:extLst>
 </a:theme>

</xml_diff>